<commit_message>
Updated materials about integration
</commit_message>
<xml_diff>
--- a/AlexeyAkimov/intergation_differentiation/theory.pptx
+++ b/AlexeyAkimov/intergation_differentiation/theory.pptx
@@ -7,6 +7,9 @@
   <p:sldIdLst>
     <p:sldId id="256" r:id="rId2"/>
     <p:sldId id="257" r:id="rId3"/>
+    <p:sldId id="258" r:id="rId4"/>
+    <p:sldId id="259" r:id="rId5"/>
+    <p:sldId id="260" r:id="rId6"/>
   </p:sldIdLst>
   <p:sldSz cx="12192000" cy="6858000"/>
   <p:notesSz cx="6858000" cy="9144000"/>
@@ -105,6 +108,11 @@
       </a:defRPr>
     </a:lvl9pPr>
   </p:defaultTextStyle>
+  <p:extLst>
+    <p:ext uri="{EFAFB233-063F-42B5-8137-9DF3F51BA10A}">
+      <p15:sldGuideLst xmlns:p15="http://schemas.microsoft.com/office/powerpoint/2012/main"/>
+    </p:ext>
+  </p:extLst>
 </p:presentation>
 </file>
 
@@ -255,7 +263,7 @@
           <a:p>
             <a:fld id="{972D2D44-3CA4-4BA8-8692-2B652D7EDDE5}" type="datetimeFigureOut">
               <a:rPr lang="en-US" smtClean="0"/>
-              <a:t>4/4/2023</a:t>
+              <a:t>4/6/2023</a:t>
             </a:fld>
             <a:endParaRPr lang="en-US"/>
           </a:p>
@@ -453,7 +461,7 @@
           <a:p>
             <a:fld id="{972D2D44-3CA4-4BA8-8692-2B652D7EDDE5}" type="datetimeFigureOut">
               <a:rPr lang="en-US" smtClean="0"/>
-              <a:t>4/4/2023</a:t>
+              <a:t>4/6/2023</a:t>
             </a:fld>
             <a:endParaRPr lang="en-US"/>
           </a:p>
@@ -661,7 +669,7 @@
           <a:p>
             <a:fld id="{972D2D44-3CA4-4BA8-8692-2B652D7EDDE5}" type="datetimeFigureOut">
               <a:rPr lang="en-US" smtClean="0"/>
-              <a:t>4/4/2023</a:t>
+              <a:t>4/6/2023</a:t>
             </a:fld>
             <a:endParaRPr lang="en-US"/>
           </a:p>
@@ -859,7 +867,7 @@
           <a:p>
             <a:fld id="{972D2D44-3CA4-4BA8-8692-2B652D7EDDE5}" type="datetimeFigureOut">
               <a:rPr lang="en-US" smtClean="0"/>
-              <a:t>4/4/2023</a:t>
+              <a:t>4/6/2023</a:t>
             </a:fld>
             <a:endParaRPr lang="en-US"/>
           </a:p>
@@ -1134,7 +1142,7 @@
           <a:p>
             <a:fld id="{972D2D44-3CA4-4BA8-8692-2B652D7EDDE5}" type="datetimeFigureOut">
               <a:rPr lang="en-US" smtClean="0"/>
-              <a:t>4/4/2023</a:t>
+              <a:t>4/6/2023</a:t>
             </a:fld>
             <a:endParaRPr lang="en-US"/>
           </a:p>
@@ -1399,7 +1407,7 @@
           <a:p>
             <a:fld id="{972D2D44-3CA4-4BA8-8692-2B652D7EDDE5}" type="datetimeFigureOut">
               <a:rPr lang="en-US" smtClean="0"/>
-              <a:t>4/4/2023</a:t>
+              <a:t>4/6/2023</a:t>
             </a:fld>
             <a:endParaRPr lang="en-US"/>
           </a:p>
@@ -1811,7 +1819,7 @@
           <a:p>
             <a:fld id="{972D2D44-3CA4-4BA8-8692-2B652D7EDDE5}" type="datetimeFigureOut">
               <a:rPr lang="en-US" smtClean="0"/>
-              <a:t>4/4/2023</a:t>
+              <a:t>4/6/2023</a:t>
             </a:fld>
             <a:endParaRPr lang="en-US"/>
           </a:p>
@@ -1952,7 +1960,7 @@
           <a:p>
             <a:fld id="{972D2D44-3CA4-4BA8-8692-2B652D7EDDE5}" type="datetimeFigureOut">
               <a:rPr lang="en-US" smtClean="0"/>
-              <a:t>4/4/2023</a:t>
+              <a:t>4/6/2023</a:t>
             </a:fld>
             <a:endParaRPr lang="en-US"/>
           </a:p>
@@ -2065,7 +2073,7 @@
           <a:p>
             <a:fld id="{972D2D44-3CA4-4BA8-8692-2B652D7EDDE5}" type="datetimeFigureOut">
               <a:rPr lang="en-US" smtClean="0"/>
-              <a:t>4/4/2023</a:t>
+              <a:t>4/6/2023</a:t>
             </a:fld>
             <a:endParaRPr lang="en-US"/>
           </a:p>
@@ -2376,7 +2384,7 @@
           <a:p>
             <a:fld id="{972D2D44-3CA4-4BA8-8692-2B652D7EDDE5}" type="datetimeFigureOut">
               <a:rPr lang="en-US" smtClean="0"/>
-              <a:t>4/4/2023</a:t>
+              <a:t>4/6/2023</a:t>
             </a:fld>
             <a:endParaRPr lang="en-US"/>
           </a:p>
@@ -2664,7 +2672,7 @@
           <a:p>
             <a:fld id="{972D2D44-3CA4-4BA8-8692-2B652D7EDDE5}" type="datetimeFigureOut">
               <a:rPr lang="en-US" smtClean="0"/>
-              <a:t>4/4/2023</a:t>
+              <a:t>4/6/2023</a:t>
             </a:fld>
             <a:endParaRPr lang="en-US"/>
           </a:p>
@@ -2905,7 +2913,7 @@
           <a:p>
             <a:fld id="{972D2D44-3CA4-4BA8-8692-2B652D7EDDE5}" type="datetimeFigureOut">
               <a:rPr lang="en-US" smtClean="0"/>
-              <a:t>4/4/2023</a:t>
+              <a:t>4/6/2023</a:t>
             </a:fld>
             <a:endParaRPr lang="en-US"/>
           </a:p>
@@ -3499,8 +3507,8 @@
           </a:fontRef>
         </p:style>
       </p:cxnSp>
-      <mc:AlternateContent xmlns:mc="http://schemas.openxmlformats.org/markup-compatibility/2006">
-        <mc:Choice xmlns:a14="http://schemas.microsoft.com/office/drawing/2010/main" Requires="a14">
+      <mc:AlternateContent xmlns:mc="http://schemas.openxmlformats.org/markup-compatibility/2006" xmlns:a14="http://schemas.microsoft.com/office/drawing/2010/main">
+        <mc:Choice Requires="a14">
           <p:sp>
             <p:nvSpPr>
               <p:cNvPr id="9" name="TextBox 8">
@@ -3529,6 +3537,7 @@
               </a:bodyPr>
               <a:lstStyle/>
               <a:p>
+                <a:pPr/>
                 <a14:m>
                   <m:oMathPara xmlns:m="http://schemas.openxmlformats.org/officeDocument/2006/math">
                     <m:oMathParaPr>
@@ -3722,7 +3731,7 @@
             </p:txBody>
           </p:sp>
         </mc:Choice>
-        <mc:Fallback>
+        <mc:Fallback xmlns="">
           <p:sp>
             <p:nvSpPr>
               <p:cNvPr id="9" name="TextBox 8">
@@ -3806,8 +3815,8 @@
           </a:fontRef>
         </p:style>
       </p:cxnSp>
-      <mc:AlternateContent xmlns:mc="http://schemas.openxmlformats.org/markup-compatibility/2006">
-        <mc:Choice xmlns:a14="http://schemas.microsoft.com/office/drawing/2010/main" Requires="a14">
+      <mc:AlternateContent xmlns:mc="http://schemas.openxmlformats.org/markup-compatibility/2006" xmlns:a14="http://schemas.microsoft.com/office/drawing/2010/main">
+        <mc:Choice Requires="a14">
           <p:sp>
             <p:nvSpPr>
               <p:cNvPr id="12" name="TextBox 11">
@@ -3836,6 +3845,7 @@
               </a:bodyPr>
               <a:lstStyle/>
               <a:p>
+                <a:pPr/>
                 <a14:m>
                   <m:oMathPara xmlns:m="http://schemas.openxmlformats.org/officeDocument/2006/math">
                     <m:oMathParaPr>
@@ -3874,7 +3884,7 @@
             </p:txBody>
           </p:sp>
         </mc:Choice>
-        <mc:Fallback>
+        <mc:Fallback xmlns="">
           <p:sp>
             <p:nvSpPr>
               <p:cNvPr id="12" name="TextBox 11">
@@ -3955,8 +3965,8 @@
           </a:fontRef>
         </p:style>
       </p:cxnSp>
-      <mc:AlternateContent xmlns:mc="http://schemas.openxmlformats.org/markup-compatibility/2006">
-        <mc:Choice xmlns:a14="http://schemas.microsoft.com/office/drawing/2010/main" Requires="a14">
+      <mc:AlternateContent xmlns:mc="http://schemas.openxmlformats.org/markup-compatibility/2006" xmlns:a14="http://schemas.microsoft.com/office/drawing/2010/main">
+        <mc:Choice Requires="a14">
           <p:sp>
             <p:nvSpPr>
               <p:cNvPr id="15" name="TextBox 14">
@@ -3985,6 +3995,7 @@
               </a:bodyPr>
               <a:lstStyle/>
               <a:p>
+                <a:pPr/>
                 <a14:m>
                   <m:oMathPara xmlns:m="http://schemas.openxmlformats.org/officeDocument/2006/math">
                     <m:oMathParaPr>
@@ -4005,7 +4016,7 @@
             </p:txBody>
           </p:sp>
         </mc:Choice>
-        <mc:Fallback>
+        <mc:Fallback xmlns="">
           <p:sp>
             <p:nvSpPr>
               <p:cNvPr id="15" name="TextBox 14">
@@ -4089,8 +4100,8 @@
           </a:fontRef>
         </p:style>
       </p:cxnSp>
-      <mc:AlternateContent xmlns:mc="http://schemas.openxmlformats.org/markup-compatibility/2006">
-        <mc:Choice xmlns:a14="http://schemas.microsoft.com/office/drawing/2010/main" Requires="a14">
+      <mc:AlternateContent xmlns:mc="http://schemas.openxmlformats.org/markup-compatibility/2006" xmlns:a14="http://schemas.microsoft.com/office/drawing/2010/main">
+        <mc:Choice Requires="a14">
           <p:sp>
             <p:nvSpPr>
               <p:cNvPr id="17" name="TextBox 16">
@@ -4119,6 +4130,7 @@
               </a:bodyPr>
               <a:lstStyle/>
               <a:p>
+                <a:pPr/>
                 <a14:m>
                   <m:oMathPara xmlns:m="http://schemas.openxmlformats.org/officeDocument/2006/math">
                     <m:oMathParaPr>
@@ -4169,7 +4181,7 @@
             </p:txBody>
           </p:sp>
         </mc:Choice>
-        <mc:Fallback>
+        <mc:Fallback xmlns="">
           <p:sp>
             <p:nvSpPr>
               <p:cNvPr id="17" name="TextBox 16">
@@ -4257,8 +4269,8 @@
           </a:fontRef>
         </p:style>
       </p:cxnSp>
-      <mc:AlternateContent xmlns:mc="http://schemas.openxmlformats.org/markup-compatibility/2006">
-        <mc:Choice xmlns:a14="http://schemas.microsoft.com/office/drawing/2010/main" Requires="a14">
+      <mc:AlternateContent xmlns:mc="http://schemas.openxmlformats.org/markup-compatibility/2006" xmlns:a14="http://schemas.microsoft.com/office/drawing/2010/main">
+        <mc:Choice Requires="a14">
           <p:sp>
             <p:nvSpPr>
               <p:cNvPr id="23" name="TextBox 22">
@@ -4287,6 +4299,7 @@
               </a:bodyPr>
               <a:lstStyle/>
               <a:p>
+                <a:pPr/>
                 <a14:m>
                   <m:oMathPara xmlns:m="http://schemas.openxmlformats.org/officeDocument/2006/math">
                     <m:oMathParaPr>
@@ -4498,7 +4511,7 @@
             </p:txBody>
           </p:sp>
         </mc:Choice>
-        <mc:Fallback>
+        <mc:Fallback xmlns="">
           <p:sp>
             <p:nvSpPr>
               <p:cNvPr id="23" name="TextBox 22">
@@ -4618,8 +4631,8 @@
           </a:fontRef>
         </p:style>
       </p:cxnSp>
-      <mc:AlternateContent xmlns:mc="http://schemas.openxmlformats.org/markup-compatibility/2006">
-        <mc:Choice xmlns:a14="http://schemas.microsoft.com/office/drawing/2010/main" Requires="a14">
+      <mc:AlternateContent xmlns:mc="http://schemas.openxmlformats.org/markup-compatibility/2006" xmlns:a14="http://schemas.microsoft.com/office/drawing/2010/main">
+        <mc:Choice Requires="a14">
           <p:sp>
             <p:nvSpPr>
               <p:cNvPr id="26" name="TextBox 25">
@@ -4648,6 +4661,7 @@
               </a:bodyPr>
               <a:lstStyle/>
               <a:p>
+                <a:pPr/>
                 <a14:m>
                   <m:oMathPara xmlns:m="http://schemas.openxmlformats.org/officeDocument/2006/math">
                     <m:oMathParaPr>
@@ -4698,7 +4712,7 @@
             </p:txBody>
           </p:sp>
         </mc:Choice>
-        <mc:Fallback>
+        <mc:Fallback xmlns="">
           <p:sp>
             <p:nvSpPr>
               <p:cNvPr id="26" name="TextBox 25">
@@ -4816,8 +4830,8 @@
           <a:chExt cx="0" cy="0"/>
         </a:xfrm>
       </p:grpSpPr>
-      <mc:AlternateContent xmlns:mc="http://schemas.openxmlformats.org/markup-compatibility/2006">
-        <mc:Choice xmlns:a14="http://schemas.microsoft.com/office/drawing/2010/main" Requires="a14">
+      <mc:AlternateContent xmlns:mc="http://schemas.openxmlformats.org/markup-compatibility/2006" xmlns:a14="http://schemas.microsoft.com/office/drawing/2010/main">
+        <mc:Choice Requires="a14">
           <p:sp>
             <p:nvSpPr>
               <p:cNvPr id="4" name="TextBox 3">
@@ -4846,6 +4860,7 @@
               </a:bodyPr>
               <a:lstStyle/>
               <a:p>
+                <a:pPr/>
                 <a14:m>
                   <m:oMathPara xmlns:m="http://schemas.openxmlformats.org/officeDocument/2006/math">
                     <m:oMathParaPr>
@@ -4965,7 +4980,7 @@
             </p:txBody>
           </p:sp>
         </mc:Choice>
-        <mc:Fallback>
+        <mc:Fallback xmlns="">
           <p:sp>
             <p:nvSpPr>
               <p:cNvPr id="4" name="TextBox 3">
@@ -5010,8 +5025,8 @@
           </p:sp>
         </mc:Fallback>
       </mc:AlternateContent>
-      <mc:AlternateContent xmlns:mc="http://schemas.openxmlformats.org/markup-compatibility/2006">
-        <mc:Choice xmlns:a14="http://schemas.microsoft.com/office/drawing/2010/main" Requires="a14">
+      <mc:AlternateContent xmlns:mc="http://schemas.openxmlformats.org/markup-compatibility/2006" xmlns:a14="http://schemas.microsoft.com/office/drawing/2010/main">
+        <mc:Choice Requires="a14">
           <p:sp>
             <p:nvSpPr>
               <p:cNvPr id="5" name="TextBox 4">
@@ -5040,6 +5055,7 @@
               </a:bodyPr>
               <a:lstStyle/>
               <a:p>
+                <a:pPr/>
                 <a14:m>
                   <m:oMathPara xmlns:m="http://schemas.openxmlformats.org/officeDocument/2006/math">
                     <m:oMathParaPr>
@@ -5072,7 +5088,7 @@
             </p:txBody>
           </p:sp>
         </mc:Choice>
-        <mc:Fallback>
+        <mc:Fallback xmlns="">
           <p:sp>
             <p:nvSpPr>
               <p:cNvPr id="5" name="TextBox 4">
@@ -5117,8 +5133,8 @@
           </p:sp>
         </mc:Fallback>
       </mc:AlternateContent>
-      <mc:AlternateContent xmlns:mc="http://schemas.openxmlformats.org/markup-compatibility/2006">
-        <mc:Choice xmlns:a14="http://schemas.microsoft.com/office/drawing/2010/main" Requires="a14">
+      <mc:AlternateContent xmlns:mc="http://schemas.openxmlformats.org/markup-compatibility/2006" xmlns:a14="http://schemas.microsoft.com/office/drawing/2010/main">
+        <mc:Choice Requires="a14">
           <p:sp>
             <p:nvSpPr>
               <p:cNvPr id="6" name="TextBox 5">
@@ -5147,6 +5163,7 @@
               </a:bodyPr>
               <a:lstStyle/>
               <a:p>
+                <a:pPr/>
                 <a14:m>
                   <m:oMathPara xmlns:m="http://schemas.openxmlformats.org/officeDocument/2006/math">
                     <m:oMathParaPr>
@@ -5285,7 +5302,7 @@
             </p:txBody>
           </p:sp>
         </mc:Choice>
-        <mc:Fallback>
+        <mc:Fallback xmlns="">
           <p:sp>
             <p:nvSpPr>
               <p:cNvPr id="6" name="TextBox 5">
@@ -5334,6 +5351,3505 @@
     <p:extLst>
       <p:ext uri="{BB962C8B-B14F-4D97-AF65-F5344CB8AC3E}">
         <p14:creationId xmlns:p14="http://schemas.microsoft.com/office/powerpoint/2010/main" val="4157870692"/>
+      </p:ext>
+    </p:extLst>
+  </p:cSld>
+  <p:clrMapOvr>
+    <a:masterClrMapping/>
+  </p:clrMapOvr>
+</p:sld>
+</file>
+
+<file path=ppt/slides/slide3.xml><?xml version="1.0" encoding="utf-8"?>
+<p:sld xmlns:a="http://schemas.openxmlformats.org/drawingml/2006/main" xmlns:r="http://schemas.openxmlformats.org/officeDocument/2006/relationships" xmlns:p="http://schemas.openxmlformats.org/presentationml/2006/main">
+  <p:cSld>
+    <p:spTree>
+      <p:nvGrpSpPr>
+        <p:cNvPr id="1" name=""/>
+        <p:cNvGrpSpPr/>
+        <p:nvPr/>
+      </p:nvGrpSpPr>
+      <p:grpSpPr>
+        <a:xfrm>
+          <a:off x="0" y="0"/>
+          <a:ext cx="0" cy="0"/>
+          <a:chOff x="0" y="0"/>
+          <a:chExt cx="0" cy="0"/>
+        </a:xfrm>
+      </p:grpSpPr>
+      <p:sp>
+        <p:nvSpPr>
+          <p:cNvPr id="4" name="Freeform: Shape 3">
+            <a:extLst>
+              <a:ext uri="{FF2B5EF4-FFF2-40B4-BE49-F238E27FC236}">
+                <a16:creationId xmlns:a16="http://schemas.microsoft.com/office/drawing/2014/main" id="{59DEAE87-D14A-C39A-8CC0-B6905D3CC441}"/>
+              </a:ext>
+            </a:extLst>
+          </p:cNvPr>
+          <p:cNvSpPr/>
+          <p:nvPr/>
+        </p:nvSpPr>
+        <p:spPr>
+          <a:xfrm>
+            <a:off x="2812026" y="953729"/>
+            <a:ext cx="6135329" cy="4630994"/>
+          </a:xfrm>
+          <a:custGeom>
+            <a:avLst/>
+            <a:gdLst>
+              <a:gd name="connsiteX0" fmla="*/ 0 w 4159045"/>
+              <a:gd name="connsiteY0" fmla="*/ 1012723 h 3172136"/>
+              <a:gd name="connsiteX1" fmla="*/ 1356851 w 4159045"/>
+              <a:gd name="connsiteY1" fmla="*/ 3146323 h 3172136"/>
+              <a:gd name="connsiteX2" fmla="*/ 3264309 w 4159045"/>
+              <a:gd name="connsiteY2" fmla="*/ 2054942 h 3172136"/>
+              <a:gd name="connsiteX3" fmla="*/ 4159045 w 4159045"/>
+              <a:gd name="connsiteY3" fmla="*/ 0 h 3172136"/>
+            </a:gdLst>
+            <a:ahLst/>
+            <a:cxnLst>
+              <a:cxn ang="0">
+                <a:pos x="connsiteX0" y="connsiteY0"/>
+              </a:cxn>
+              <a:cxn ang="0">
+                <a:pos x="connsiteX1" y="connsiteY1"/>
+              </a:cxn>
+              <a:cxn ang="0">
+                <a:pos x="connsiteX2" y="connsiteY2"/>
+              </a:cxn>
+              <a:cxn ang="0">
+                <a:pos x="connsiteX3" y="connsiteY3"/>
+              </a:cxn>
+            </a:cxnLst>
+            <a:rect l="l" t="t" r="r" b="b"/>
+            <a:pathLst>
+              <a:path w="4159045" h="3172136">
+                <a:moveTo>
+                  <a:pt x="0" y="1012723"/>
+                </a:moveTo>
+                <a:cubicBezTo>
+                  <a:pt x="406400" y="1992671"/>
+                  <a:pt x="812800" y="2972620"/>
+                  <a:pt x="1356851" y="3146323"/>
+                </a:cubicBezTo>
+                <a:cubicBezTo>
+                  <a:pt x="1900902" y="3320026"/>
+                  <a:pt x="2797277" y="2579329"/>
+                  <a:pt x="3264309" y="2054942"/>
+                </a:cubicBezTo>
+                <a:cubicBezTo>
+                  <a:pt x="3731341" y="1530555"/>
+                  <a:pt x="3945193" y="765277"/>
+                  <a:pt x="4159045" y="0"/>
+                </a:cubicBezTo>
+              </a:path>
+            </a:pathLst>
+          </a:custGeom>
+          <a:noFill/>
+        </p:spPr>
+        <p:style>
+          <a:lnRef idx="2">
+            <a:schemeClr val="accent1">
+              <a:shade val="50000"/>
+            </a:schemeClr>
+          </a:lnRef>
+          <a:fillRef idx="1">
+            <a:schemeClr val="accent1"/>
+          </a:fillRef>
+          <a:effectRef idx="0">
+            <a:schemeClr val="accent1"/>
+          </a:effectRef>
+          <a:fontRef idx="minor">
+            <a:schemeClr val="lt1"/>
+          </a:fontRef>
+        </p:style>
+        <p:txBody>
+          <a:bodyPr rtlCol="0" anchor="ctr"/>
+          <a:lstStyle/>
+          <a:p>
+            <a:pPr algn="ctr"/>
+            <a:endParaRPr lang="en-US"/>
+          </a:p>
+        </p:txBody>
+      </p:sp>
+      <mc:AlternateContent xmlns:mc="http://schemas.openxmlformats.org/markup-compatibility/2006">
+        <mc:Choice xmlns:a14="http://schemas.microsoft.com/office/drawing/2010/main" Requires="a14">
+          <p:sp>
+            <p:nvSpPr>
+              <p:cNvPr id="15" name="TextBox 14">
+                <a:extLst>
+                  <a:ext uri="{FF2B5EF4-FFF2-40B4-BE49-F238E27FC236}">
+                    <a16:creationId xmlns:a16="http://schemas.microsoft.com/office/drawing/2014/main" id="{0CF6C98C-A15D-7962-E45C-001663C302DC}"/>
+                  </a:ext>
+                </a:extLst>
+              </p:cNvPr>
+              <p:cNvSpPr txBox="1"/>
+              <p:nvPr/>
+            </p:nvSpPr>
+            <p:spPr>
+              <a:xfrm>
+                <a:off x="589935" y="278917"/>
+                <a:ext cx="2618153" cy="871457"/>
+              </a:xfrm>
+              <a:prstGeom prst="rect">
+                <a:avLst/>
+              </a:prstGeom>
+              <a:noFill/>
+            </p:spPr>
+            <p:txBody>
+              <a:bodyPr wrap="none" rtlCol="0">
+                <a:spAutoFit/>
+              </a:bodyPr>
+              <a:lstStyle/>
+              <a:p>
+                <a:pPr/>
+                <a14:m>
+                  <m:oMathPara xmlns:m="http://schemas.openxmlformats.org/officeDocument/2006/math">
+                    <m:oMathParaPr>
+                      <m:jc m:val="centerGroup"/>
+                    </m:oMathParaPr>
+                    <m:oMath xmlns:m="http://schemas.openxmlformats.org/officeDocument/2006/math">
+                      <m:nary>
+                        <m:naryPr>
+                          <m:ctrlPr>
+                            <a:rPr lang="en-US" b="0" i="1" smtClean="0">
+                              <a:latin typeface="Cambria Math" panose="02040503050406030204" pitchFamily="18" charset="0"/>
+                            </a:rPr>
+                          </m:ctrlPr>
+                        </m:naryPr>
+                        <m:sub>
+                          <m:r>
+                            <a:rPr lang="en-US" b="0" i="1" smtClean="0">
+                              <a:latin typeface="Cambria Math" panose="02040503050406030204" pitchFamily="18" charset="0"/>
+                            </a:rPr>
+                            <m:t>𝑎</m:t>
+                          </m:r>
+                        </m:sub>
+                        <m:sup>
+                          <m:r>
+                            <a:rPr lang="en-US" b="0" i="1" smtClean="0">
+                              <a:latin typeface="Cambria Math" panose="02040503050406030204" pitchFamily="18" charset="0"/>
+                            </a:rPr>
+                            <m:t>𝑏</m:t>
+                          </m:r>
+                        </m:sup>
+                        <m:e>
+                          <m:r>
+                            <a:rPr lang="en-US" b="0" i="1" smtClean="0">
+                              <a:latin typeface="Cambria Math" panose="02040503050406030204" pitchFamily="18" charset="0"/>
+                            </a:rPr>
+                            <m:t>𝑓</m:t>
+                          </m:r>
+                          <m:d>
+                            <m:dPr>
+                              <m:ctrlPr>
+                                <a:rPr lang="en-US" b="0" i="1" smtClean="0">
+                                  <a:latin typeface="Cambria Math" panose="02040503050406030204" pitchFamily="18" charset="0"/>
+                                </a:rPr>
+                              </m:ctrlPr>
+                            </m:dPr>
+                            <m:e>
+                              <m:r>
+                                <a:rPr lang="en-US" b="0" i="1" smtClean="0">
+                                  <a:latin typeface="Cambria Math" panose="02040503050406030204" pitchFamily="18" charset="0"/>
+                                </a:rPr>
+                                <m:t>𝑥</m:t>
+                              </m:r>
+                            </m:e>
+                          </m:d>
+                          <m:r>
+                            <a:rPr lang="en-US" b="0" i="1" smtClean="0">
+                              <a:latin typeface="Cambria Math" panose="02040503050406030204" pitchFamily="18" charset="0"/>
+                            </a:rPr>
+                            <m:t>𝑑𝑥</m:t>
+                          </m:r>
+                        </m:e>
+                      </m:nary>
+                      <m:r>
+                        <a:rPr lang="en-US" b="0" i="1" smtClean="0">
+                          <a:latin typeface="Cambria Math" panose="02040503050406030204" pitchFamily="18" charset="0"/>
+                        </a:rPr>
+                        <m:t>=</m:t>
+                      </m:r>
+                      <m:func>
+                        <m:funcPr>
+                          <m:ctrlPr>
+                            <a:rPr lang="en-US" b="0" i="1" smtClean="0">
+                              <a:latin typeface="Cambria Math" panose="02040503050406030204" pitchFamily="18" charset="0"/>
+                            </a:rPr>
+                          </m:ctrlPr>
+                        </m:funcPr>
+                        <m:fName>
+                          <m:limLow>
+                            <m:limLowPr>
+                              <m:ctrlPr>
+                                <a:rPr lang="en-US" b="0" i="1" smtClean="0">
+                                  <a:latin typeface="Cambria Math" panose="02040503050406030204" pitchFamily="18" charset="0"/>
+                                </a:rPr>
+                              </m:ctrlPr>
+                            </m:limLowPr>
+                            <m:e>
+                              <m:r>
+                                <m:rPr>
+                                  <m:sty m:val="p"/>
+                                </m:rPr>
+                                <a:rPr lang="en-US" b="0" i="0" smtClean="0">
+                                  <a:latin typeface="Cambria Math" panose="02040503050406030204" pitchFamily="18" charset="0"/>
+                                </a:rPr>
+                                <m:t>lim</m:t>
+                              </m:r>
+                            </m:e>
+                            <m:lim>
+                              <m:r>
+                                <a:rPr lang="en-US" b="0" i="1" smtClean="0">
+                                  <a:latin typeface="Cambria Math" panose="02040503050406030204" pitchFamily="18" charset="0"/>
+                                </a:rPr>
+                                <m:t>𝑁</m:t>
+                              </m:r>
+                              <m:r>
+                                <a:rPr lang="en-US" b="0" i="1" smtClean="0">
+                                  <a:latin typeface="Cambria Math" panose="02040503050406030204" pitchFamily="18" charset="0"/>
+                                </a:rPr>
+                                <m:t>→∞</m:t>
+                              </m:r>
+                            </m:lim>
+                          </m:limLow>
+                        </m:fName>
+                        <m:e>
+                          <m:nary>
+                            <m:naryPr>
+                              <m:chr m:val="∑"/>
+                              <m:ctrlPr>
+                                <a:rPr lang="en-US" i="1">
+                                  <a:latin typeface="Cambria Math" panose="02040503050406030204" pitchFamily="18" charset="0"/>
+                                </a:rPr>
+                              </m:ctrlPr>
+                            </m:naryPr>
+                            <m:sub>
+                              <m:r>
+                                <a:rPr lang="en-US" i="1">
+                                  <a:latin typeface="Cambria Math" panose="02040503050406030204" pitchFamily="18" charset="0"/>
+                                </a:rPr>
+                                <m:t>𝑛</m:t>
+                              </m:r>
+                              <m:r>
+                                <a:rPr lang="en-US" i="1">
+                                  <a:latin typeface="Cambria Math" panose="02040503050406030204" pitchFamily="18" charset="0"/>
+                                </a:rPr>
+                                <m:t>=0</m:t>
+                              </m:r>
+                            </m:sub>
+                            <m:sup>
+                              <m:r>
+                                <a:rPr lang="en-US" i="1">
+                                  <a:latin typeface="Cambria Math" panose="02040503050406030204" pitchFamily="18" charset="0"/>
+                                </a:rPr>
+                                <m:t>𝑁</m:t>
+                              </m:r>
+                            </m:sup>
+                            <m:e>
+                              <m:sSub>
+                                <m:sSubPr>
+                                  <m:ctrlPr>
+                                    <a:rPr lang="en-US" b="0" i="1" smtClean="0">
+                                      <a:latin typeface="Cambria Math" panose="02040503050406030204" pitchFamily="18" charset="0"/>
+                                    </a:rPr>
+                                  </m:ctrlPr>
+                                </m:sSubPr>
+                                <m:e>
+                                  <m:r>
+                                    <a:rPr lang="en-US" i="1">
+                                      <a:latin typeface="Cambria Math" panose="02040503050406030204" pitchFamily="18" charset="0"/>
+                                    </a:rPr>
+                                    <m:t>𝑆</m:t>
+                                  </m:r>
+                                </m:e>
+                                <m:sub>
+                                  <m:r>
+                                    <a:rPr lang="en-US" b="0" i="1" smtClean="0">
+                                      <a:latin typeface="Cambria Math" panose="02040503050406030204" pitchFamily="18" charset="0"/>
+                                    </a:rPr>
+                                    <m:t>𝑛</m:t>
+                                  </m:r>
+                                </m:sub>
+                              </m:sSub>
+                            </m:e>
+                          </m:nary>
+                        </m:e>
+                      </m:func>
+                    </m:oMath>
+                  </m:oMathPara>
+                </a14:m>
+                <a:endParaRPr lang="en-US" dirty="0"/>
+              </a:p>
+            </p:txBody>
+          </p:sp>
+        </mc:Choice>
+        <mc:Fallback>
+          <p:sp>
+            <p:nvSpPr>
+              <p:cNvPr id="15" name="TextBox 14">
+                <a:extLst>
+                  <a:ext uri="{FF2B5EF4-FFF2-40B4-BE49-F238E27FC236}">
+                    <a16:creationId xmlns:a16="http://schemas.microsoft.com/office/drawing/2014/main" id="{0CF6C98C-A15D-7962-E45C-001663C302DC}"/>
+                  </a:ext>
+                </a:extLst>
+              </p:cNvPr>
+              <p:cNvSpPr txBox="1">
+                <a:spLocks noRot="1" noChangeAspect="1" noMove="1" noResize="1" noEditPoints="1" noAdjustHandles="1" noChangeArrowheads="1" noChangeShapeType="1" noTextEdit="1"/>
+              </p:cNvSpPr>
+              <p:nvPr/>
+            </p:nvSpPr>
+            <p:spPr>
+              <a:xfrm>
+                <a:off x="589935" y="278917"/>
+                <a:ext cx="2618153" cy="871457"/>
+              </a:xfrm>
+              <a:prstGeom prst="rect">
+                <a:avLst/>
+              </a:prstGeom>
+              <a:blipFill>
+                <a:blip r:embed="rId2"/>
+                <a:stretch>
+                  <a:fillRect/>
+                </a:stretch>
+              </a:blipFill>
+            </p:spPr>
+            <p:txBody>
+              <a:bodyPr/>
+              <a:lstStyle/>
+              <a:p>
+                <a:r>
+                  <a:rPr lang="en-US">
+                    <a:noFill/>
+                  </a:rPr>
+                  <a:t> </a:t>
+                </a:r>
+              </a:p>
+            </p:txBody>
+          </p:sp>
+        </mc:Fallback>
+      </mc:AlternateContent>
+      <p:cxnSp>
+        <p:nvCxnSpPr>
+          <p:cNvPr id="21" name="Straight Connector 20">
+            <a:extLst>
+              <a:ext uri="{FF2B5EF4-FFF2-40B4-BE49-F238E27FC236}">
+                <a16:creationId xmlns:a16="http://schemas.microsoft.com/office/drawing/2014/main" id="{2B754FDB-730F-B7CE-245C-A7890286B163}"/>
+              </a:ext>
+            </a:extLst>
+          </p:cNvPr>
+          <p:cNvCxnSpPr/>
+          <p:nvPr/>
+        </p:nvCxnSpPr>
+        <p:spPr>
+          <a:xfrm>
+            <a:off x="5653548" y="4601497"/>
+            <a:ext cx="0" cy="1553497"/>
+          </a:xfrm>
+          <a:prstGeom prst="line">
+            <a:avLst/>
+          </a:prstGeom>
+        </p:spPr>
+        <p:style>
+          <a:lnRef idx="1">
+            <a:schemeClr val="accent1"/>
+          </a:lnRef>
+          <a:fillRef idx="0">
+            <a:schemeClr val="accent1"/>
+          </a:fillRef>
+          <a:effectRef idx="0">
+            <a:schemeClr val="accent1"/>
+          </a:effectRef>
+          <a:fontRef idx="minor">
+            <a:schemeClr val="tx1"/>
+          </a:fontRef>
+        </p:style>
+      </p:cxnSp>
+      <p:cxnSp>
+        <p:nvCxnSpPr>
+          <p:cNvPr id="22" name="Straight Connector 21">
+            <a:extLst>
+              <a:ext uri="{FF2B5EF4-FFF2-40B4-BE49-F238E27FC236}">
+                <a16:creationId xmlns:a16="http://schemas.microsoft.com/office/drawing/2014/main" id="{65A38524-41AD-DD82-00FA-1E8229C21206}"/>
+              </a:ext>
+            </a:extLst>
+          </p:cNvPr>
+          <p:cNvCxnSpPr>
+            <a:cxnSpLocks/>
+          </p:cNvCxnSpPr>
+          <p:nvPr/>
+        </p:nvCxnSpPr>
+        <p:spPr>
+          <a:xfrm>
+            <a:off x="7919883" y="3544528"/>
+            <a:ext cx="0" cy="2541639"/>
+          </a:xfrm>
+          <a:prstGeom prst="line">
+            <a:avLst/>
+          </a:prstGeom>
+        </p:spPr>
+        <p:style>
+          <a:lnRef idx="1">
+            <a:schemeClr val="accent1"/>
+          </a:lnRef>
+          <a:fillRef idx="0">
+            <a:schemeClr val="accent1"/>
+          </a:fillRef>
+          <a:effectRef idx="0">
+            <a:schemeClr val="accent1"/>
+          </a:effectRef>
+          <a:fontRef idx="minor">
+            <a:schemeClr val="tx1"/>
+          </a:fontRef>
+        </p:style>
+      </p:cxnSp>
+      <p:cxnSp>
+        <p:nvCxnSpPr>
+          <p:cNvPr id="25" name="Straight Arrow Connector 24">
+            <a:extLst>
+              <a:ext uri="{FF2B5EF4-FFF2-40B4-BE49-F238E27FC236}">
+                <a16:creationId xmlns:a16="http://schemas.microsoft.com/office/drawing/2014/main" id="{25757620-5469-5310-B335-13456CB7806B}"/>
+              </a:ext>
+            </a:extLst>
+          </p:cNvPr>
+          <p:cNvCxnSpPr/>
+          <p:nvPr/>
+        </p:nvCxnSpPr>
+        <p:spPr>
+          <a:xfrm>
+            <a:off x="3908322" y="6086168"/>
+            <a:ext cx="7669161" cy="0"/>
+          </a:xfrm>
+          <a:prstGeom prst="straightConnector1">
+            <a:avLst/>
+          </a:prstGeom>
+          <a:ln>
+            <a:tailEnd type="triangle"/>
+          </a:ln>
+        </p:spPr>
+        <p:style>
+          <a:lnRef idx="1">
+            <a:schemeClr val="accent1"/>
+          </a:lnRef>
+          <a:fillRef idx="0">
+            <a:schemeClr val="accent1"/>
+          </a:fillRef>
+          <a:effectRef idx="0">
+            <a:schemeClr val="accent1"/>
+          </a:effectRef>
+          <a:fontRef idx="minor">
+            <a:schemeClr val="tx1"/>
+          </a:fontRef>
+        </p:style>
+      </p:cxnSp>
+      <p:cxnSp>
+        <p:nvCxnSpPr>
+          <p:cNvPr id="27" name="Straight Arrow Connector 26">
+            <a:extLst>
+              <a:ext uri="{FF2B5EF4-FFF2-40B4-BE49-F238E27FC236}">
+                <a16:creationId xmlns:a16="http://schemas.microsoft.com/office/drawing/2014/main" id="{62875BF8-D2EA-F6EC-BFA9-F50950E6AC07}"/>
+              </a:ext>
+            </a:extLst>
+          </p:cNvPr>
+          <p:cNvCxnSpPr/>
+          <p:nvPr/>
+        </p:nvCxnSpPr>
+        <p:spPr>
+          <a:xfrm flipV="1">
+            <a:off x="4709652" y="1691148"/>
+            <a:ext cx="0" cy="4758813"/>
+          </a:xfrm>
+          <a:prstGeom prst="straightConnector1">
+            <a:avLst/>
+          </a:prstGeom>
+          <a:ln>
+            <a:tailEnd type="triangle"/>
+          </a:ln>
+        </p:spPr>
+        <p:style>
+          <a:lnRef idx="1">
+            <a:schemeClr val="accent1"/>
+          </a:lnRef>
+          <a:fillRef idx="0">
+            <a:schemeClr val="accent1"/>
+          </a:fillRef>
+          <a:effectRef idx="0">
+            <a:schemeClr val="accent1"/>
+          </a:effectRef>
+          <a:fontRef idx="minor">
+            <a:schemeClr val="tx1"/>
+          </a:fontRef>
+        </p:style>
+      </p:cxnSp>
+      <p:sp>
+        <p:nvSpPr>
+          <p:cNvPr id="29" name="TextBox 28">
+            <a:extLst>
+              <a:ext uri="{FF2B5EF4-FFF2-40B4-BE49-F238E27FC236}">
+                <a16:creationId xmlns:a16="http://schemas.microsoft.com/office/drawing/2014/main" id="{3D5F02FF-BF64-7E2E-0557-A96C6B2BD11E}"/>
+              </a:ext>
+            </a:extLst>
+          </p:cNvPr>
+          <p:cNvSpPr txBox="1"/>
+          <p:nvPr/>
+        </p:nvSpPr>
+        <p:spPr>
+          <a:xfrm>
+            <a:off x="5653548" y="6371303"/>
+            <a:ext cx="2109873" cy="369332"/>
+          </a:xfrm>
+          <a:prstGeom prst="rect">
+            <a:avLst/>
+          </a:prstGeom>
+          <a:noFill/>
+        </p:spPr>
+        <p:txBody>
+          <a:bodyPr wrap="none" rtlCol="0">
+            <a:spAutoFit/>
+          </a:bodyPr>
+          <a:lstStyle/>
+          <a:p>
+            <a:r>
+              <a:rPr lang="en-US" dirty="0"/>
+              <a:t>a                                b</a:t>
+            </a:r>
+          </a:p>
+        </p:txBody>
+      </p:sp>
+      <p:sp>
+        <p:nvSpPr>
+          <p:cNvPr id="30" name="Rectangle 29">
+            <a:extLst>
+              <a:ext uri="{FF2B5EF4-FFF2-40B4-BE49-F238E27FC236}">
+                <a16:creationId xmlns:a16="http://schemas.microsoft.com/office/drawing/2014/main" id="{3C152612-B487-CBF4-CD47-A3C1B8BE29DE}"/>
+              </a:ext>
+            </a:extLst>
+          </p:cNvPr>
+          <p:cNvSpPr/>
+          <p:nvPr/>
+        </p:nvSpPr>
+        <p:spPr>
+          <a:xfrm>
+            <a:off x="5653548" y="5378245"/>
+            <a:ext cx="186803" cy="707922"/>
+          </a:xfrm>
+          <a:prstGeom prst="rect">
+            <a:avLst/>
+          </a:prstGeom>
+        </p:spPr>
+        <p:style>
+          <a:lnRef idx="2">
+            <a:schemeClr val="accent1">
+              <a:shade val="50000"/>
+            </a:schemeClr>
+          </a:lnRef>
+          <a:fillRef idx="1">
+            <a:schemeClr val="accent1"/>
+          </a:fillRef>
+          <a:effectRef idx="0">
+            <a:schemeClr val="accent1"/>
+          </a:effectRef>
+          <a:fontRef idx="minor">
+            <a:schemeClr val="lt1"/>
+          </a:fontRef>
+        </p:style>
+        <p:txBody>
+          <a:bodyPr rtlCol="0" anchor="ctr"/>
+          <a:lstStyle/>
+          <a:p>
+            <a:pPr algn="ctr"/>
+            <a:endParaRPr lang="en-US"/>
+          </a:p>
+        </p:txBody>
+      </p:sp>
+      <p:sp>
+        <p:nvSpPr>
+          <p:cNvPr id="31" name="Rectangle 30">
+            <a:extLst>
+              <a:ext uri="{FF2B5EF4-FFF2-40B4-BE49-F238E27FC236}">
+                <a16:creationId xmlns:a16="http://schemas.microsoft.com/office/drawing/2014/main" id="{2E21FDF3-2FC9-D5F7-1101-B0A3F27C915D}"/>
+              </a:ext>
+            </a:extLst>
+          </p:cNvPr>
+          <p:cNvSpPr/>
+          <p:nvPr/>
+        </p:nvSpPr>
+        <p:spPr>
+          <a:xfrm>
+            <a:off x="5879690" y="5289755"/>
+            <a:ext cx="196640" cy="825286"/>
+          </a:xfrm>
+          <a:prstGeom prst="rect">
+            <a:avLst/>
+          </a:prstGeom>
+        </p:spPr>
+        <p:style>
+          <a:lnRef idx="2">
+            <a:schemeClr val="accent1">
+              <a:shade val="50000"/>
+            </a:schemeClr>
+          </a:lnRef>
+          <a:fillRef idx="1">
+            <a:schemeClr val="accent1"/>
+          </a:fillRef>
+          <a:effectRef idx="0">
+            <a:schemeClr val="accent1"/>
+          </a:effectRef>
+          <a:fontRef idx="minor">
+            <a:schemeClr val="lt1"/>
+          </a:fontRef>
+        </p:style>
+        <p:txBody>
+          <a:bodyPr rtlCol="0" anchor="ctr"/>
+          <a:lstStyle/>
+          <a:p>
+            <a:pPr algn="ctr"/>
+            <a:endParaRPr lang="en-US"/>
+          </a:p>
+        </p:txBody>
+      </p:sp>
+      <mc:AlternateContent xmlns:mc="http://schemas.openxmlformats.org/markup-compatibility/2006">
+        <mc:Choice xmlns:a14="http://schemas.microsoft.com/office/drawing/2010/main" Requires="a14">
+          <p:sp>
+            <p:nvSpPr>
+              <p:cNvPr id="34" name="TextBox 33">
+                <a:extLst>
+                  <a:ext uri="{FF2B5EF4-FFF2-40B4-BE49-F238E27FC236}">
+                    <a16:creationId xmlns:a16="http://schemas.microsoft.com/office/drawing/2014/main" id="{D608FC06-DD04-5ACA-7AB8-1125B2AC1178}"/>
+                  </a:ext>
+                </a:extLst>
+              </p:cNvPr>
+              <p:cNvSpPr txBox="1"/>
+              <p:nvPr/>
+            </p:nvSpPr>
+            <p:spPr>
+              <a:xfrm>
+                <a:off x="589935" y="1543665"/>
+                <a:ext cx="3564694" cy="601383"/>
+              </a:xfrm>
+              <a:prstGeom prst="rect">
+                <a:avLst/>
+              </a:prstGeom>
+              <a:noFill/>
+            </p:spPr>
+            <p:txBody>
+              <a:bodyPr wrap="none" rtlCol="0">
+                <a:spAutoFit/>
+              </a:bodyPr>
+              <a:lstStyle/>
+              <a:p>
+                <a14:m>
+                  <m:oMathPara xmlns:m="http://schemas.openxmlformats.org/officeDocument/2006/math">
+                    <m:oMathParaPr>
+                      <m:jc m:val="centerGroup"/>
+                    </m:oMathParaPr>
+                    <m:oMath xmlns:m="http://schemas.openxmlformats.org/officeDocument/2006/math">
+                      <m:r>
+                        <a:rPr lang="en-US" b="0" i="1" smtClean="0">
+                          <a:latin typeface="Cambria Math" panose="02040503050406030204" pitchFamily="18" charset="0"/>
+                        </a:rPr>
+                        <m:t>𝑀𝑖𝑑𝑝𝑜𝑖𝑛𝑡</m:t>
+                      </m:r>
+                      <m:r>
+                        <a:rPr lang="en-US" b="0" i="1" smtClean="0">
+                          <a:latin typeface="Cambria Math" panose="02040503050406030204" pitchFamily="18" charset="0"/>
+                        </a:rPr>
+                        <m:t>: </m:t>
+                      </m:r>
+                      <m:sSub>
+                        <m:sSubPr>
+                          <m:ctrlPr>
+                            <a:rPr lang="en-US" b="0" i="1" smtClean="0">
+                              <a:latin typeface="Cambria Math" panose="02040503050406030204" pitchFamily="18" charset="0"/>
+                            </a:rPr>
+                          </m:ctrlPr>
+                        </m:sSubPr>
+                        <m:e>
+                          <m:r>
+                            <a:rPr lang="en-US" b="0" i="1" smtClean="0">
+                              <a:latin typeface="Cambria Math" panose="02040503050406030204" pitchFamily="18" charset="0"/>
+                            </a:rPr>
+                            <m:t>𝑆</m:t>
+                          </m:r>
+                        </m:e>
+                        <m:sub>
+                          <m:r>
+                            <a:rPr lang="en-US" b="0" i="1" smtClean="0">
+                              <a:latin typeface="Cambria Math" panose="02040503050406030204" pitchFamily="18" charset="0"/>
+                            </a:rPr>
+                            <m:t>𝑛</m:t>
+                          </m:r>
+                        </m:sub>
+                      </m:sSub>
+                      <m:r>
+                        <a:rPr lang="en-US" b="0" i="1" smtClean="0">
+                          <a:latin typeface="Cambria Math" panose="02040503050406030204" pitchFamily="18" charset="0"/>
+                        </a:rPr>
+                        <m:t>=</m:t>
+                      </m:r>
+                      <m:r>
+                        <a:rPr lang="en-US" b="0" i="1" smtClean="0">
+                          <a:latin typeface="Cambria Math" panose="02040503050406030204" pitchFamily="18" charset="0"/>
+                        </a:rPr>
+                        <m:t>𝑓</m:t>
+                      </m:r>
+                      <m:d>
+                        <m:dPr>
+                          <m:ctrlPr>
+                            <a:rPr lang="en-US" b="0" i="1" smtClean="0">
+                              <a:latin typeface="Cambria Math" panose="02040503050406030204" pitchFamily="18" charset="0"/>
+                            </a:rPr>
+                          </m:ctrlPr>
+                        </m:dPr>
+                        <m:e>
+                          <m:f>
+                            <m:fPr>
+                              <m:ctrlPr>
+                                <a:rPr lang="en-US" b="0" i="1" smtClean="0">
+                                  <a:latin typeface="Cambria Math" panose="02040503050406030204" pitchFamily="18" charset="0"/>
+                                </a:rPr>
+                              </m:ctrlPr>
+                            </m:fPr>
+                            <m:num>
+                              <m:sSub>
+                                <m:sSubPr>
+                                  <m:ctrlPr>
+                                    <a:rPr lang="en-US" i="1">
+                                      <a:latin typeface="Cambria Math" panose="02040503050406030204" pitchFamily="18" charset="0"/>
+                                    </a:rPr>
+                                  </m:ctrlPr>
+                                </m:sSubPr>
+                                <m:e>
+                                  <m:r>
+                                    <a:rPr lang="en-US" i="1">
+                                      <a:latin typeface="Cambria Math" panose="02040503050406030204" pitchFamily="18" charset="0"/>
+                                    </a:rPr>
+                                    <m:t>𝑥</m:t>
+                                  </m:r>
+                                </m:e>
+                                <m:sub>
+                                  <m:r>
+                                    <a:rPr lang="en-US" i="1">
+                                      <a:latin typeface="Cambria Math" panose="02040503050406030204" pitchFamily="18" charset="0"/>
+                                    </a:rPr>
+                                    <m:t>𝑛</m:t>
+                                  </m:r>
+                                </m:sub>
+                              </m:sSub>
+                              <m:r>
+                                <a:rPr lang="en-US" i="1">
+                                  <a:latin typeface="Cambria Math" panose="02040503050406030204" pitchFamily="18" charset="0"/>
+                                </a:rPr>
+                                <m:t>+</m:t>
+                              </m:r>
+                              <m:sSub>
+                                <m:sSubPr>
+                                  <m:ctrlPr>
+                                    <a:rPr lang="en-US" i="1">
+                                      <a:latin typeface="Cambria Math" panose="02040503050406030204" pitchFamily="18" charset="0"/>
+                                    </a:rPr>
+                                  </m:ctrlPr>
+                                </m:sSubPr>
+                                <m:e>
+                                  <m:r>
+                                    <a:rPr lang="en-US" i="1">
+                                      <a:latin typeface="Cambria Math" panose="02040503050406030204" pitchFamily="18" charset="0"/>
+                                    </a:rPr>
+                                    <m:t>𝑥</m:t>
+                                  </m:r>
+                                </m:e>
+                                <m:sub>
+                                  <m:r>
+                                    <a:rPr lang="en-US" i="1">
+                                      <a:latin typeface="Cambria Math" panose="02040503050406030204" pitchFamily="18" charset="0"/>
+                                    </a:rPr>
+                                    <m:t>𝑛</m:t>
+                                  </m:r>
+                                  <m:r>
+                                    <a:rPr lang="en-US" i="1">
+                                      <a:latin typeface="Cambria Math" panose="02040503050406030204" pitchFamily="18" charset="0"/>
+                                    </a:rPr>
+                                    <m:t>+1</m:t>
+                                  </m:r>
+                                </m:sub>
+                              </m:sSub>
+                            </m:num>
+                            <m:den>
+                              <m:r>
+                                <a:rPr lang="en-US" b="0" i="1" smtClean="0">
+                                  <a:latin typeface="Cambria Math" panose="02040503050406030204" pitchFamily="18" charset="0"/>
+                                </a:rPr>
+                                <m:t>2</m:t>
+                              </m:r>
+                            </m:den>
+                          </m:f>
+                        </m:e>
+                      </m:d>
+                      <m:r>
+                        <a:rPr lang="en-US" b="0" i="1" smtClean="0">
+                          <a:latin typeface="Cambria Math" panose="02040503050406030204" pitchFamily="18" charset="0"/>
+                        </a:rPr>
+                        <m:t>𝑑𝑥</m:t>
+                      </m:r>
+                    </m:oMath>
+                  </m:oMathPara>
+                </a14:m>
+                <a:endParaRPr lang="en-US" dirty="0"/>
+              </a:p>
+            </p:txBody>
+          </p:sp>
+        </mc:Choice>
+        <mc:Fallback>
+          <p:sp>
+            <p:nvSpPr>
+              <p:cNvPr id="34" name="TextBox 33">
+                <a:extLst>
+                  <a:ext uri="{FF2B5EF4-FFF2-40B4-BE49-F238E27FC236}">
+                    <a16:creationId xmlns:a16="http://schemas.microsoft.com/office/drawing/2014/main" id="{D608FC06-DD04-5ACA-7AB8-1125B2AC1178}"/>
+                  </a:ext>
+                </a:extLst>
+              </p:cNvPr>
+              <p:cNvSpPr txBox="1">
+                <a:spLocks noRot="1" noChangeAspect="1" noMove="1" noResize="1" noEditPoints="1" noAdjustHandles="1" noChangeArrowheads="1" noChangeShapeType="1" noTextEdit="1"/>
+              </p:cNvSpPr>
+              <p:nvPr/>
+            </p:nvSpPr>
+            <p:spPr>
+              <a:xfrm>
+                <a:off x="589935" y="1543665"/>
+                <a:ext cx="3564694" cy="601383"/>
+              </a:xfrm>
+              <a:prstGeom prst="rect">
+                <a:avLst/>
+              </a:prstGeom>
+              <a:blipFill>
+                <a:blip r:embed="rId3"/>
+                <a:stretch>
+                  <a:fillRect/>
+                </a:stretch>
+              </a:blipFill>
+            </p:spPr>
+            <p:txBody>
+              <a:bodyPr/>
+              <a:lstStyle/>
+              <a:p>
+                <a:r>
+                  <a:rPr lang="en-US">
+                    <a:noFill/>
+                  </a:rPr>
+                  <a:t> </a:t>
+                </a:r>
+              </a:p>
+            </p:txBody>
+          </p:sp>
+        </mc:Fallback>
+      </mc:AlternateContent>
+      <p:cxnSp>
+        <p:nvCxnSpPr>
+          <p:cNvPr id="36" name="Straight Connector 35">
+            <a:extLst>
+              <a:ext uri="{FF2B5EF4-FFF2-40B4-BE49-F238E27FC236}">
+                <a16:creationId xmlns:a16="http://schemas.microsoft.com/office/drawing/2014/main" id="{24C389CC-79F7-17AD-3E5B-5FC1007AB134}"/>
+              </a:ext>
+            </a:extLst>
+          </p:cNvPr>
+          <p:cNvCxnSpPr/>
+          <p:nvPr/>
+        </p:nvCxnSpPr>
+        <p:spPr>
+          <a:xfrm flipV="1">
+            <a:off x="5653548" y="3982064"/>
+            <a:ext cx="0" cy="2281084"/>
+          </a:xfrm>
+          <a:prstGeom prst="line">
+            <a:avLst/>
+          </a:prstGeom>
+        </p:spPr>
+        <p:style>
+          <a:lnRef idx="1">
+            <a:schemeClr val="accent1"/>
+          </a:lnRef>
+          <a:fillRef idx="0">
+            <a:schemeClr val="accent1"/>
+          </a:fillRef>
+          <a:effectRef idx="0">
+            <a:schemeClr val="accent1"/>
+          </a:effectRef>
+          <a:fontRef idx="minor">
+            <a:schemeClr val="tx1"/>
+          </a:fontRef>
+        </p:style>
+      </p:cxnSp>
+      <mc:AlternateContent xmlns:mc="http://schemas.openxmlformats.org/markup-compatibility/2006">
+        <mc:Choice xmlns:a14="http://schemas.microsoft.com/office/drawing/2010/main" Requires="a14">
+          <p:sp>
+            <p:nvSpPr>
+              <p:cNvPr id="37" name="TextBox 36">
+                <a:extLst>
+                  <a:ext uri="{FF2B5EF4-FFF2-40B4-BE49-F238E27FC236}">
+                    <a16:creationId xmlns:a16="http://schemas.microsoft.com/office/drawing/2014/main" id="{13EBA8A6-9901-7190-E3EA-2D4A382F23DF}"/>
+                  </a:ext>
+                </a:extLst>
+              </p:cNvPr>
+              <p:cNvSpPr txBox="1"/>
+              <p:nvPr/>
+            </p:nvSpPr>
+            <p:spPr>
+              <a:xfrm>
+                <a:off x="5377331" y="3106371"/>
+                <a:ext cx="2694648" cy="369332"/>
+              </a:xfrm>
+              <a:prstGeom prst="rect">
+                <a:avLst/>
+              </a:prstGeom>
+              <a:noFill/>
+            </p:spPr>
+            <p:txBody>
+              <a:bodyPr wrap="none" rtlCol="0">
+                <a:spAutoFit/>
+              </a:bodyPr>
+              <a:lstStyle/>
+              <a:p>
+                <a14:m>
+                  <m:oMath xmlns:m="http://schemas.openxmlformats.org/officeDocument/2006/math">
+                    <m:sSub>
+                      <m:sSubPr>
+                        <m:ctrlPr>
+                          <a:rPr lang="en-US" b="0" i="1" smtClean="0">
+                            <a:latin typeface="Cambria Math" panose="02040503050406030204" pitchFamily="18" charset="0"/>
+                          </a:rPr>
+                        </m:ctrlPr>
+                      </m:sSubPr>
+                      <m:e>
+                        <m:r>
+                          <a:rPr lang="en-US" b="0" i="1" smtClean="0">
+                            <a:latin typeface="Cambria Math" panose="02040503050406030204" pitchFamily="18" charset="0"/>
+                          </a:rPr>
+                          <m:t>𝑥</m:t>
+                        </m:r>
+                      </m:e>
+                      <m:sub>
+                        <m:r>
+                          <a:rPr lang="en-US" b="0" i="1" smtClean="0">
+                            <a:latin typeface="Cambria Math" panose="02040503050406030204" pitchFamily="18" charset="0"/>
+                          </a:rPr>
+                          <m:t>0</m:t>
+                        </m:r>
+                      </m:sub>
+                    </m:sSub>
+                    <m:r>
+                      <a:rPr lang="en-US" b="0" i="0" smtClean="0">
+                        <a:latin typeface="Cambria Math" panose="02040503050406030204" pitchFamily="18" charset="0"/>
+                      </a:rPr>
+                      <m:t> </m:t>
+                    </m:r>
+                  </m:oMath>
+                </a14:m>
+                <a:r>
+                  <a:rPr lang="en-US" dirty="0"/>
+                  <a:t>  </a:t>
+                </a:r>
+                <a14:m>
+                  <m:oMath xmlns:m="http://schemas.openxmlformats.org/officeDocument/2006/math">
+                    <m:sSub>
+                      <m:sSubPr>
+                        <m:ctrlPr>
+                          <a:rPr lang="en-US" b="0" i="1" dirty="0" smtClean="0">
+                            <a:latin typeface="Cambria Math" panose="02040503050406030204" pitchFamily="18" charset="0"/>
+                          </a:rPr>
+                        </m:ctrlPr>
+                      </m:sSubPr>
+                      <m:e>
+                        <m:r>
+                          <a:rPr lang="en-US" b="0" i="1" dirty="0" smtClean="0">
+                            <a:latin typeface="Cambria Math" panose="02040503050406030204" pitchFamily="18" charset="0"/>
+                          </a:rPr>
+                          <m:t>𝑥</m:t>
+                        </m:r>
+                      </m:e>
+                      <m:sub>
+                        <m:r>
+                          <a:rPr lang="en-US" b="0" i="1" dirty="0" smtClean="0">
+                            <a:latin typeface="Cambria Math" panose="02040503050406030204" pitchFamily="18" charset="0"/>
+                          </a:rPr>
+                          <m:t>1</m:t>
+                        </m:r>
+                      </m:sub>
+                    </m:sSub>
+                  </m:oMath>
+                </a14:m>
+                <a:r>
+                  <a:rPr lang="en-US" dirty="0"/>
+                  <a:t>                               </a:t>
+                </a:r>
+                <a14:m>
+                  <m:oMath xmlns:m="http://schemas.openxmlformats.org/officeDocument/2006/math">
+                    <m:sSub>
+                      <m:sSubPr>
+                        <m:ctrlPr>
+                          <a:rPr lang="en-US" b="0" i="1" dirty="0" smtClean="0">
+                            <a:latin typeface="Cambria Math" panose="02040503050406030204" pitchFamily="18" charset="0"/>
+                          </a:rPr>
+                        </m:ctrlPr>
+                      </m:sSubPr>
+                      <m:e>
+                        <m:r>
+                          <a:rPr lang="en-US" b="0" i="1" dirty="0" smtClean="0">
+                            <a:latin typeface="Cambria Math" panose="02040503050406030204" pitchFamily="18" charset="0"/>
+                          </a:rPr>
+                          <m:t>𝑥</m:t>
+                        </m:r>
+                      </m:e>
+                      <m:sub>
+                        <m:r>
+                          <a:rPr lang="en-US" b="0" i="1" dirty="0" smtClean="0">
+                            <a:latin typeface="Cambria Math" panose="02040503050406030204" pitchFamily="18" charset="0"/>
+                          </a:rPr>
+                          <m:t>𝑁</m:t>
+                        </m:r>
+                      </m:sub>
+                    </m:sSub>
+                  </m:oMath>
+                </a14:m>
+                <a:endParaRPr lang="en-US" dirty="0"/>
+              </a:p>
+            </p:txBody>
+          </p:sp>
+        </mc:Choice>
+        <mc:Fallback>
+          <p:sp>
+            <p:nvSpPr>
+              <p:cNvPr id="37" name="TextBox 36">
+                <a:extLst>
+                  <a:ext uri="{FF2B5EF4-FFF2-40B4-BE49-F238E27FC236}">
+                    <a16:creationId xmlns:a16="http://schemas.microsoft.com/office/drawing/2014/main" id="{13EBA8A6-9901-7190-E3EA-2D4A382F23DF}"/>
+                  </a:ext>
+                </a:extLst>
+              </p:cNvPr>
+              <p:cNvSpPr txBox="1">
+                <a:spLocks noRot="1" noChangeAspect="1" noMove="1" noResize="1" noEditPoints="1" noAdjustHandles="1" noChangeArrowheads="1" noChangeShapeType="1" noTextEdit="1"/>
+              </p:cNvSpPr>
+              <p:nvPr/>
+            </p:nvSpPr>
+            <p:spPr>
+              <a:xfrm>
+                <a:off x="5377331" y="3106371"/>
+                <a:ext cx="2694648" cy="369332"/>
+              </a:xfrm>
+              <a:prstGeom prst="rect">
+                <a:avLst/>
+              </a:prstGeom>
+              <a:blipFill>
+                <a:blip r:embed="rId4"/>
+                <a:stretch>
+                  <a:fillRect/>
+                </a:stretch>
+              </a:blipFill>
+            </p:spPr>
+            <p:txBody>
+              <a:bodyPr/>
+              <a:lstStyle/>
+              <a:p>
+                <a:r>
+                  <a:rPr lang="en-US">
+                    <a:noFill/>
+                  </a:rPr>
+                  <a:t> </a:t>
+                </a:r>
+              </a:p>
+            </p:txBody>
+          </p:sp>
+        </mc:Fallback>
+      </mc:AlternateContent>
+      <p:sp>
+        <p:nvSpPr>
+          <p:cNvPr id="38" name="Rectangle 37">
+            <a:extLst>
+              <a:ext uri="{FF2B5EF4-FFF2-40B4-BE49-F238E27FC236}">
+                <a16:creationId xmlns:a16="http://schemas.microsoft.com/office/drawing/2014/main" id="{2D88B631-0F17-AB82-717D-C84C749C9070}"/>
+              </a:ext>
+            </a:extLst>
+          </p:cNvPr>
+          <p:cNvSpPr/>
+          <p:nvPr/>
+        </p:nvSpPr>
+        <p:spPr>
+          <a:xfrm>
+            <a:off x="7723243" y="3692012"/>
+            <a:ext cx="196640" cy="2393844"/>
+          </a:xfrm>
+          <a:prstGeom prst="rect">
+            <a:avLst/>
+          </a:prstGeom>
+        </p:spPr>
+        <p:style>
+          <a:lnRef idx="2">
+            <a:schemeClr val="accent1">
+              <a:shade val="50000"/>
+            </a:schemeClr>
+          </a:lnRef>
+          <a:fillRef idx="1">
+            <a:schemeClr val="accent1"/>
+          </a:fillRef>
+          <a:effectRef idx="0">
+            <a:schemeClr val="accent1"/>
+          </a:effectRef>
+          <a:fontRef idx="minor">
+            <a:schemeClr val="lt1"/>
+          </a:fontRef>
+        </p:style>
+        <p:txBody>
+          <a:bodyPr rtlCol="0" anchor="ctr"/>
+          <a:lstStyle/>
+          <a:p>
+            <a:pPr algn="ctr"/>
+            <a:endParaRPr lang="en-US"/>
+          </a:p>
+        </p:txBody>
+      </p:sp>
+      <p:cxnSp>
+        <p:nvCxnSpPr>
+          <p:cNvPr id="40" name="Straight Arrow Connector 39">
+            <a:extLst>
+              <a:ext uri="{FF2B5EF4-FFF2-40B4-BE49-F238E27FC236}">
+                <a16:creationId xmlns:a16="http://schemas.microsoft.com/office/drawing/2014/main" id="{8D9A18B7-ED5F-E81B-7E8B-C89CA81086EB}"/>
+              </a:ext>
+            </a:extLst>
+          </p:cNvPr>
+          <p:cNvCxnSpPr>
+            <a:endCxn id="30" idx="1"/>
+          </p:cNvCxnSpPr>
+          <p:nvPr/>
+        </p:nvCxnSpPr>
+        <p:spPr>
+          <a:xfrm>
+            <a:off x="2005781" y="2349910"/>
+            <a:ext cx="3647767" cy="3382296"/>
+          </a:xfrm>
+          <a:prstGeom prst="straightConnector1">
+            <a:avLst/>
+          </a:prstGeom>
+          <a:ln>
+            <a:tailEnd type="triangle"/>
+          </a:ln>
+        </p:spPr>
+        <p:style>
+          <a:lnRef idx="1">
+            <a:schemeClr val="accent1"/>
+          </a:lnRef>
+          <a:fillRef idx="0">
+            <a:schemeClr val="accent1"/>
+          </a:fillRef>
+          <a:effectRef idx="0">
+            <a:schemeClr val="accent1"/>
+          </a:effectRef>
+          <a:fontRef idx="minor">
+            <a:schemeClr val="tx1"/>
+          </a:fontRef>
+        </p:style>
+      </p:cxnSp>
+      <mc:AlternateContent xmlns:mc="http://schemas.openxmlformats.org/markup-compatibility/2006">
+        <mc:Choice xmlns:a14="http://schemas.microsoft.com/office/drawing/2010/main" Requires="a14">
+          <p:sp>
+            <p:nvSpPr>
+              <p:cNvPr id="41" name="TextBox 40">
+                <a:extLst>
+                  <a:ext uri="{FF2B5EF4-FFF2-40B4-BE49-F238E27FC236}">
+                    <a16:creationId xmlns:a16="http://schemas.microsoft.com/office/drawing/2014/main" id="{18B73AA8-A08F-BEB7-D1EC-C93530E9D466}"/>
+                  </a:ext>
+                </a:extLst>
+              </p:cNvPr>
+              <p:cNvSpPr txBox="1"/>
+              <p:nvPr/>
+            </p:nvSpPr>
+            <p:spPr>
+              <a:xfrm>
+                <a:off x="4709652" y="1150374"/>
+                <a:ext cx="1857753" cy="369332"/>
+              </a:xfrm>
+              <a:prstGeom prst="rect">
+                <a:avLst/>
+              </a:prstGeom>
+              <a:noFill/>
+            </p:spPr>
+            <p:txBody>
+              <a:bodyPr wrap="none" rtlCol="0">
+                <a:spAutoFit/>
+              </a:bodyPr>
+              <a:lstStyle/>
+              <a:p>
+                <a14:m>
+                  <m:oMathPara xmlns:m="http://schemas.openxmlformats.org/officeDocument/2006/math">
+                    <m:oMathParaPr>
+                      <m:jc m:val="centerGroup"/>
+                    </m:oMathParaPr>
+                    <m:oMath xmlns:m="http://schemas.openxmlformats.org/officeDocument/2006/math">
+                      <m:sSub>
+                        <m:sSubPr>
+                          <m:ctrlPr>
+                            <a:rPr lang="en-US" b="0" i="1" smtClean="0">
+                              <a:latin typeface="Cambria Math" panose="02040503050406030204" pitchFamily="18" charset="0"/>
+                            </a:rPr>
+                          </m:ctrlPr>
+                        </m:sSubPr>
+                        <m:e>
+                          <m:r>
+                            <a:rPr lang="en-US" b="0" i="1" smtClean="0">
+                              <a:latin typeface="Cambria Math" panose="02040503050406030204" pitchFamily="18" charset="0"/>
+                            </a:rPr>
+                            <m:t>𝑥</m:t>
+                          </m:r>
+                        </m:e>
+                        <m:sub>
+                          <m:r>
+                            <a:rPr lang="en-US" b="0" i="1" smtClean="0">
+                              <a:latin typeface="Cambria Math" panose="02040503050406030204" pitchFamily="18" charset="0"/>
+                            </a:rPr>
+                            <m:t>𝑛</m:t>
+                          </m:r>
+                        </m:sub>
+                      </m:sSub>
+                      <m:r>
+                        <a:rPr lang="en-US" b="0" i="1" smtClean="0">
+                          <a:latin typeface="Cambria Math" panose="02040503050406030204" pitchFamily="18" charset="0"/>
+                        </a:rPr>
+                        <m:t>=</m:t>
+                      </m:r>
+                      <m:r>
+                        <a:rPr lang="en-US" b="0" i="1" smtClean="0">
+                          <a:latin typeface="Cambria Math" panose="02040503050406030204" pitchFamily="18" charset="0"/>
+                        </a:rPr>
+                        <m:t>𝑎</m:t>
+                      </m:r>
+                      <m:r>
+                        <a:rPr lang="en-US" b="0" i="1" smtClean="0">
+                          <a:latin typeface="Cambria Math" panose="02040503050406030204" pitchFamily="18" charset="0"/>
+                        </a:rPr>
+                        <m:t>+</m:t>
+                      </m:r>
+                      <m:r>
+                        <a:rPr lang="en-US" b="0" i="1" smtClean="0">
+                          <a:latin typeface="Cambria Math" panose="02040503050406030204" pitchFamily="18" charset="0"/>
+                        </a:rPr>
+                        <m:t>𝑛</m:t>
+                      </m:r>
+                      <m:r>
+                        <a:rPr lang="en-US" b="0" i="1" smtClean="0">
+                          <a:latin typeface="Cambria Math" panose="02040503050406030204" pitchFamily="18" charset="0"/>
+                        </a:rPr>
+                        <m:t> ∗</m:t>
+                      </m:r>
+                      <m:r>
+                        <a:rPr lang="en-US" b="0" i="1" smtClean="0">
+                          <a:latin typeface="Cambria Math" panose="02040503050406030204" pitchFamily="18" charset="0"/>
+                        </a:rPr>
+                        <m:t>𝑑𝑥</m:t>
+                      </m:r>
+                    </m:oMath>
+                  </m:oMathPara>
+                </a14:m>
+                <a:endParaRPr lang="en-US" dirty="0"/>
+              </a:p>
+            </p:txBody>
+          </p:sp>
+        </mc:Choice>
+        <mc:Fallback>
+          <p:sp>
+            <p:nvSpPr>
+              <p:cNvPr id="41" name="TextBox 40">
+                <a:extLst>
+                  <a:ext uri="{FF2B5EF4-FFF2-40B4-BE49-F238E27FC236}">
+                    <a16:creationId xmlns:a16="http://schemas.microsoft.com/office/drawing/2014/main" id="{18B73AA8-A08F-BEB7-D1EC-C93530E9D466}"/>
+                  </a:ext>
+                </a:extLst>
+              </p:cNvPr>
+              <p:cNvSpPr txBox="1">
+                <a:spLocks noRot="1" noChangeAspect="1" noMove="1" noResize="1" noEditPoints="1" noAdjustHandles="1" noChangeArrowheads="1" noChangeShapeType="1" noTextEdit="1"/>
+              </p:cNvSpPr>
+              <p:nvPr/>
+            </p:nvSpPr>
+            <p:spPr>
+              <a:xfrm>
+                <a:off x="4709652" y="1150374"/>
+                <a:ext cx="1857753" cy="369332"/>
+              </a:xfrm>
+              <a:prstGeom prst="rect">
+                <a:avLst/>
+              </a:prstGeom>
+              <a:blipFill>
+                <a:blip r:embed="rId5"/>
+                <a:stretch>
+                  <a:fillRect/>
+                </a:stretch>
+              </a:blipFill>
+            </p:spPr>
+            <p:txBody>
+              <a:bodyPr/>
+              <a:lstStyle/>
+              <a:p>
+                <a:r>
+                  <a:rPr lang="en-US">
+                    <a:noFill/>
+                  </a:rPr>
+                  <a:t> </a:t>
+                </a:r>
+              </a:p>
+            </p:txBody>
+          </p:sp>
+        </mc:Fallback>
+      </mc:AlternateContent>
+      <mc:AlternateContent xmlns:mc="http://schemas.openxmlformats.org/markup-compatibility/2006">
+        <mc:Choice xmlns:a14="http://schemas.microsoft.com/office/drawing/2010/main" Requires="a14">
+          <p:sp>
+            <p:nvSpPr>
+              <p:cNvPr id="42" name="TextBox 41">
+                <a:extLst>
+                  <a:ext uri="{FF2B5EF4-FFF2-40B4-BE49-F238E27FC236}">
+                    <a16:creationId xmlns:a16="http://schemas.microsoft.com/office/drawing/2014/main" id="{8420663D-1B46-6AA1-EBFC-B4CC5062A94E}"/>
+                  </a:ext>
+                </a:extLst>
+              </p:cNvPr>
+              <p:cNvSpPr txBox="1"/>
+              <p:nvPr/>
+            </p:nvSpPr>
+            <p:spPr>
+              <a:xfrm>
+                <a:off x="7142586" y="1074697"/>
+                <a:ext cx="1342099" cy="616451"/>
+              </a:xfrm>
+              <a:prstGeom prst="rect">
+                <a:avLst/>
+              </a:prstGeom>
+              <a:noFill/>
+            </p:spPr>
+            <p:txBody>
+              <a:bodyPr wrap="none" rtlCol="0">
+                <a:spAutoFit/>
+              </a:bodyPr>
+              <a:lstStyle/>
+              <a:p>
+                <a14:m>
+                  <m:oMathPara xmlns:m="http://schemas.openxmlformats.org/officeDocument/2006/math">
+                    <m:oMathParaPr>
+                      <m:jc m:val="centerGroup"/>
+                    </m:oMathParaPr>
+                    <m:oMath xmlns:m="http://schemas.openxmlformats.org/officeDocument/2006/math">
+                      <m:r>
+                        <a:rPr lang="en-US" b="0" i="1" smtClean="0">
+                          <a:latin typeface="Cambria Math" panose="02040503050406030204" pitchFamily="18" charset="0"/>
+                        </a:rPr>
+                        <m:t>𝑑𝑥</m:t>
+                      </m:r>
+                      <m:r>
+                        <a:rPr lang="en-US" b="0" i="1" smtClean="0">
+                          <a:latin typeface="Cambria Math" panose="02040503050406030204" pitchFamily="18" charset="0"/>
+                        </a:rPr>
+                        <m:t>=</m:t>
+                      </m:r>
+                      <m:f>
+                        <m:fPr>
+                          <m:ctrlPr>
+                            <a:rPr lang="en-US" b="0" i="1" smtClean="0">
+                              <a:latin typeface="Cambria Math" panose="02040503050406030204" pitchFamily="18" charset="0"/>
+                            </a:rPr>
+                          </m:ctrlPr>
+                        </m:fPr>
+                        <m:num>
+                          <m:r>
+                            <a:rPr lang="en-US" b="0" i="1" smtClean="0">
+                              <a:latin typeface="Cambria Math" panose="02040503050406030204" pitchFamily="18" charset="0"/>
+                            </a:rPr>
+                            <m:t>𝑏</m:t>
+                          </m:r>
+                          <m:r>
+                            <a:rPr lang="en-US" b="0" i="1" smtClean="0">
+                              <a:latin typeface="Cambria Math" panose="02040503050406030204" pitchFamily="18" charset="0"/>
+                            </a:rPr>
+                            <m:t>−</m:t>
+                          </m:r>
+                          <m:r>
+                            <a:rPr lang="en-US" b="0" i="1" smtClean="0">
+                              <a:latin typeface="Cambria Math" panose="02040503050406030204" pitchFamily="18" charset="0"/>
+                            </a:rPr>
+                            <m:t>𝑎</m:t>
+                          </m:r>
+                        </m:num>
+                        <m:den>
+                          <m:r>
+                            <a:rPr lang="en-US" b="0" i="1" smtClean="0">
+                              <a:latin typeface="Cambria Math" panose="02040503050406030204" pitchFamily="18" charset="0"/>
+                            </a:rPr>
+                            <m:t>𝑁</m:t>
+                          </m:r>
+                        </m:den>
+                      </m:f>
+                    </m:oMath>
+                  </m:oMathPara>
+                </a14:m>
+                <a:endParaRPr lang="en-US" dirty="0"/>
+              </a:p>
+            </p:txBody>
+          </p:sp>
+        </mc:Choice>
+        <mc:Fallback>
+          <p:sp>
+            <p:nvSpPr>
+              <p:cNvPr id="42" name="TextBox 41">
+                <a:extLst>
+                  <a:ext uri="{FF2B5EF4-FFF2-40B4-BE49-F238E27FC236}">
+                    <a16:creationId xmlns:a16="http://schemas.microsoft.com/office/drawing/2014/main" id="{8420663D-1B46-6AA1-EBFC-B4CC5062A94E}"/>
+                  </a:ext>
+                </a:extLst>
+              </p:cNvPr>
+              <p:cNvSpPr txBox="1">
+                <a:spLocks noRot="1" noChangeAspect="1" noMove="1" noResize="1" noEditPoints="1" noAdjustHandles="1" noChangeArrowheads="1" noChangeShapeType="1" noTextEdit="1"/>
+              </p:cNvSpPr>
+              <p:nvPr/>
+            </p:nvSpPr>
+            <p:spPr>
+              <a:xfrm>
+                <a:off x="7142586" y="1074697"/>
+                <a:ext cx="1342099" cy="616451"/>
+              </a:xfrm>
+              <a:prstGeom prst="rect">
+                <a:avLst/>
+              </a:prstGeom>
+              <a:blipFill>
+                <a:blip r:embed="rId6"/>
+                <a:stretch>
+                  <a:fillRect/>
+                </a:stretch>
+              </a:blipFill>
+            </p:spPr>
+            <p:txBody>
+              <a:bodyPr/>
+              <a:lstStyle/>
+              <a:p>
+                <a:r>
+                  <a:rPr lang="en-US">
+                    <a:noFill/>
+                  </a:rPr>
+                  <a:t> </a:t>
+                </a:r>
+              </a:p>
+            </p:txBody>
+          </p:sp>
+        </mc:Fallback>
+      </mc:AlternateContent>
+      <mc:AlternateContent xmlns:mc="http://schemas.openxmlformats.org/markup-compatibility/2006">
+        <mc:Choice xmlns:a14="http://schemas.microsoft.com/office/drawing/2010/main" Requires="a14">
+          <p:sp>
+            <p:nvSpPr>
+              <p:cNvPr id="43" name="TextBox 42">
+                <a:extLst>
+                  <a:ext uri="{FF2B5EF4-FFF2-40B4-BE49-F238E27FC236}">
+                    <a16:creationId xmlns:a16="http://schemas.microsoft.com/office/drawing/2014/main" id="{B1AA74F3-1772-AF5B-4081-3813B5E926DC}"/>
+                  </a:ext>
+                </a:extLst>
+              </p:cNvPr>
+              <p:cNvSpPr txBox="1"/>
+              <p:nvPr/>
+            </p:nvSpPr>
+            <p:spPr>
+              <a:xfrm>
+                <a:off x="519165" y="3485535"/>
+                <a:ext cx="2066720" cy="902683"/>
+              </a:xfrm>
+              <a:prstGeom prst="rect">
+                <a:avLst/>
+              </a:prstGeom>
+              <a:noFill/>
+            </p:spPr>
+            <p:txBody>
+              <a:bodyPr wrap="none" rtlCol="0">
+                <a:spAutoFit/>
+              </a:bodyPr>
+              <a:lstStyle/>
+              <a:p>
+                <a14:m>
+                  <m:oMathPara xmlns:m="http://schemas.openxmlformats.org/officeDocument/2006/math">
+                    <m:oMathParaPr>
+                      <m:jc m:val="centerGroup"/>
+                    </m:oMathParaPr>
+                    <m:oMath xmlns:m="http://schemas.openxmlformats.org/officeDocument/2006/math">
+                      <m:nary>
+                        <m:naryPr>
+                          <m:ctrlPr>
+                            <a:rPr lang="en-US" b="0" i="1" smtClean="0">
+                              <a:latin typeface="Cambria Math" panose="02040503050406030204" pitchFamily="18" charset="0"/>
+                            </a:rPr>
+                          </m:ctrlPr>
+                        </m:naryPr>
+                        <m:sub>
+                          <m:r>
+                            <a:rPr lang="en-US" b="0" i="1" smtClean="0">
+                              <a:latin typeface="Cambria Math" panose="02040503050406030204" pitchFamily="18" charset="0"/>
+                            </a:rPr>
+                            <m:t>0</m:t>
+                          </m:r>
+                        </m:sub>
+                        <m:sup>
+                          <m:r>
+                            <a:rPr lang="en-US" b="0" i="1" smtClean="0">
+                              <a:latin typeface="Cambria Math" panose="02040503050406030204" pitchFamily="18" charset="0"/>
+                            </a:rPr>
+                            <m:t>1</m:t>
+                          </m:r>
+                        </m:sup>
+                        <m:e>
+                          <m:r>
+                            <a:rPr lang="en-US" b="0" i="1" smtClean="0">
+                              <a:latin typeface="Cambria Math" panose="02040503050406030204" pitchFamily="18" charset="0"/>
+                            </a:rPr>
+                            <m:t>𝑥𝑑𝑥</m:t>
+                          </m:r>
+                        </m:e>
+                      </m:nary>
+                      <m:r>
+                        <a:rPr lang="en-US" b="0" i="1" smtClean="0">
+                          <a:latin typeface="Cambria Math" panose="02040503050406030204" pitchFamily="18" charset="0"/>
+                        </a:rPr>
+                        <m:t>=</m:t>
+                      </m:r>
+                      <m:sSubSup>
+                        <m:sSubSupPr>
+                          <m:ctrlPr>
+                            <a:rPr lang="en-US" b="0" i="1" smtClean="0">
+                              <a:latin typeface="Cambria Math" panose="02040503050406030204" pitchFamily="18" charset="0"/>
+                            </a:rPr>
+                          </m:ctrlPr>
+                        </m:sSubSupPr>
+                        <m:e>
+                          <m:d>
+                            <m:dPr>
+                              <m:begChr m:val=""/>
+                              <m:endChr m:val="|"/>
+                              <m:ctrlPr>
+                                <a:rPr lang="en-US" b="0" i="1" smtClean="0">
+                                  <a:latin typeface="Cambria Math" panose="02040503050406030204" pitchFamily="18" charset="0"/>
+                                </a:rPr>
+                              </m:ctrlPr>
+                            </m:dPr>
+                            <m:e>
+                              <m:f>
+                                <m:fPr>
+                                  <m:ctrlPr>
+                                    <a:rPr lang="en-US" b="0" i="1" smtClean="0">
+                                      <a:latin typeface="Cambria Math" panose="02040503050406030204" pitchFamily="18" charset="0"/>
+                                    </a:rPr>
+                                  </m:ctrlPr>
+                                </m:fPr>
+                                <m:num>
+                                  <m:sSup>
+                                    <m:sSupPr>
+                                      <m:ctrlPr>
+                                        <a:rPr lang="en-US" b="0" i="1" smtClean="0">
+                                          <a:latin typeface="Cambria Math" panose="02040503050406030204" pitchFamily="18" charset="0"/>
+                                        </a:rPr>
+                                      </m:ctrlPr>
+                                    </m:sSupPr>
+                                    <m:e>
+                                      <m:r>
+                                        <a:rPr lang="en-US" b="0" i="1" smtClean="0">
+                                          <a:latin typeface="Cambria Math" panose="02040503050406030204" pitchFamily="18" charset="0"/>
+                                        </a:rPr>
+                                        <m:t>𝑥</m:t>
+                                      </m:r>
+                                    </m:e>
+                                    <m:sup>
+                                      <m:r>
+                                        <a:rPr lang="en-US" b="0" i="1" smtClean="0">
+                                          <a:latin typeface="Cambria Math" panose="02040503050406030204" pitchFamily="18" charset="0"/>
+                                        </a:rPr>
+                                        <m:t>2</m:t>
+                                      </m:r>
+                                    </m:sup>
+                                  </m:sSup>
+                                </m:num>
+                                <m:den>
+                                  <m:r>
+                                    <a:rPr lang="en-US" b="0" i="1" smtClean="0">
+                                      <a:latin typeface="Cambria Math" panose="02040503050406030204" pitchFamily="18" charset="0"/>
+                                    </a:rPr>
+                                    <m:t>2</m:t>
+                                  </m:r>
+                                </m:den>
+                              </m:f>
+                            </m:e>
+                          </m:d>
+                        </m:e>
+                        <m:sub>
+                          <m:r>
+                            <a:rPr lang="en-US" b="0" i="1" smtClean="0">
+                              <a:latin typeface="Cambria Math" panose="02040503050406030204" pitchFamily="18" charset="0"/>
+                            </a:rPr>
+                            <m:t>0</m:t>
+                          </m:r>
+                        </m:sub>
+                        <m:sup>
+                          <m:r>
+                            <a:rPr lang="en-US" b="0" i="1" smtClean="0">
+                              <a:latin typeface="Cambria Math" panose="02040503050406030204" pitchFamily="18" charset="0"/>
+                            </a:rPr>
+                            <m:t>1</m:t>
+                          </m:r>
+                        </m:sup>
+                      </m:sSubSup>
+                      <m:r>
+                        <a:rPr lang="en-US" b="0" i="1" smtClean="0">
+                          <a:latin typeface="Cambria Math" panose="02040503050406030204" pitchFamily="18" charset="0"/>
+                        </a:rPr>
+                        <m:t>=</m:t>
+                      </m:r>
+                      <m:f>
+                        <m:fPr>
+                          <m:ctrlPr>
+                            <a:rPr lang="en-US" i="1">
+                              <a:latin typeface="Cambria Math" panose="02040503050406030204" pitchFamily="18" charset="0"/>
+                            </a:rPr>
+                          </m:ctrlPr>
+                        </m:fPr>
+                        <m:num>
+                          <m:r>
+                            <a:rPr lang="en-US" b="0" i="1" smtClean="0">
+                              <a:latin typeface="Cambria Math" panose="02040503050406030204" pitchFamily="18" charset="0"/>
+                            </a:rPr>
+                            <m:t>1</m:t>
+                          </m:r>
+                        </m:num>
+                        <m:den>
+                          <m:r>
+                            <a:rPr lang="en-US" i="1">
+                              <a:latin typeface="Cambria Math" panose="02040503050406030204" pitchFamily="18" charset="0"/>
+                            </a:rPr>
+                            <m:t>2</m:t>
+                          </m:r>
+                        </m:den>
+                      </m:f>
+                    </m:oMath>
+                  </m:oMathPara>
+                </a14:m>
+                <a:endParaRPr lang="en-US" dirty="0"/>
+              </a:p>
+            </p:txBody>
+          </p:sp>
+        </mc:Choice>
+        <mc:Fallback>
+          <p:sp>
+            <p:nvSpPr>
+              <p:cNvPr id="43" name="TextBox 42">
+                <a:extLst>
+                  <a:ext uri="{FF2B5EF4-FFF2-40B4-BE49-F238E27FC236}">
+                    <a16:creationId xmlns:a16="http://schemas.microsoft.com/office/drawing/2014/main" id="{B1AA74F3-1772-AF5B-4081-3813B5E926DC}"/>
+                  </a:ext>
+                </a:extLst>
+              </p:cNvPr>
+              <p:cNvSpPr txBox="1">
+                <a:spLocks noRot="1" noChangeAspect="1" noMove="1" noResize="1" noEditPoints="1" noAdjustHandles="1" noChangeArrowheads="1" noChangeShapeType="1" noTextEdit="1"/>
+              </p:cNvSpPr>
+              <p:nvPr/>
+            </p:nvSpPr>
+            <p:spPr>
+              <a:xfrm>
+                <a:off x="519165" y="3485535"/>
+                <a:ext cx="2066720" cy="902683"/>
+              </a:xfrm>
+              <a:prstGeom prst="rect">
+                <a:avLst/>
+              </a:prstGeom>
+              <a:blipFill>
+                <a:blip r:embed="rId7"/>
+                <a:stretch>
+                  <a:fillRect/>
+                </a:stretch>
+              </a:blipFill>
+            </p:spPr>
+            <p:txBody>
+              <a:bodyPr/>
+              <a:lstStyle/>
+              <a:p>
+                <a:r>
+                  <a:rPr lang="en-US">
+                    <a:noFill/>
+                  </a:rPr>
+                  <a:t> </a:t>
+                </a:r>
+              </a:p>
+            </p:txBody>
+          </p:sp>
+        </mc:Fallback>
+      </mc:AlternateContent>
+    </p:spTree>
+    <p:extLst>
+      <p:ext uri="{BB962C8B-B14F-4D97-AF65-F5344CB8AC3E}">
+        <p14:creationId xmlns:p14="http://schemas.microsoft.com/office/powerpoint/2010/main" val="2265964965"/>
+      </p:ext>
+    </p:extLst>
+  </p:cSld>
+  <p:clrMapOvr>
+    <a:masterClrMapping/>
+  </p:clrMapOvr>
+</p:sld>
+</file>
+
+<file path=ppt/slides/slide4.xml><?xml version="1.0" encoding="utf-8"?>
+<p:sld xmlns:a="http://schemas.openxmlformats.org/drawingml/2006/main" xmlns:r="http://schemas.openxmlformats.org/officeDocument/2006/relationships" xmlns:p="http://schemas.openxmlformats.org/presentationml/2006/main">
+  <p:cSld>
+    <p:spTree>
+      <p:nvGrpSpPr>
+        <p:cNvPr id="1" name=""/>
+        <p:cNvGrpSpPr/>
+        <p:nvPr/>
+      </p:nvGrpSpPr>
+      <p:grpSpPr>
+        <a:xfrm>
+          <a:off x="0" y="0"/>
+          <a:ext cx="0" cy="0"/>
+          <a:chOff x="0" y="0"/>
+          <a:chExt cx="0" cy="0"/>
+        </a:xfrm>
+      </p:grpSpPr>
+      <mc:AlternateContent xmlns:mc="http://schemas.openxmlformats.org/markup-compatibility/2006">
+        <mc:Choice xmlns:a14="http://schemas.microsoft.com/office/drawing/2010/main" Requires="a14">
+          <p:sp>
+            <p:nvSpPr>
+              <p:cNvPr id="4" name="TextBox 3">
+                <a:extLst>
+                  <a:ext uri="{FF2B5EF4-FFF2-40B4-BE49-F238E27FC236}">
+                    <a16:creationId xmlns:a16="http://schemas.microsoft.com/office/drawing/2014/main" id="{C2CBB4A5-6A48-466F-E1F8-14E2D4601A65}"/>
+                  </a:ext>
+                </a:extLst>
+              </p:cNvPr>
+              <p:cNvSpPr txBox="1"/>
+              <p:nvPr/>
+            </p:nvSpPr>
+            <p:spPr>
+              <a:xfrm>
+                <a:off x="1573162" y="639096"/>
+                <a:ext cx="1273169" cy="618887"/>
+              </a:xfrm>
+              <a:prstGeom prst="rect">
+                <a:avLst/>
+              </a:prstGeom>
+              <a:noFill/>
+            </p:spPr>
+            <p:txBody>
+              <a:bodyPr wrap="none" rtlCol="0">
+                <a:spAutoFit/>
+              </a:bodyPr>
+              <a:lstStyle/>
+              <a:p>
+                <a14:m>
+                  <m:oMathPara xmlns:m="http://schemas.openxmlformats.org/officeDocument/2006/math">
+                    <m:oMathParaPr>
+                      <m:jc m:val="centerGroup"/>
+                    </m:oMathParaPr>
+                    <m:oMath xmlns:m="http://schemas.openxmlformats.org/officeDocument/2006/math">
+                      <m:f>
+                        <m:fPr>
+                          <m:ctrlPr>
+                            <a:rPr lang="en-US" b="0" i="1" smtClean="0">
+                              <a:latin typeface="Cambria Math" panose="02040503050406030204" pitchFamily="18" charset="0"/>
+                            </a:rPr>
+                          </m:ctrlPr>
+                        </m:fPr>
+                        <m:num>
+                          <m:r>
+                            <a:rPr lang="en-US" b="0" i="1" smtClean="0">
+                              <a:latin typeface="Cambria Math" panose="02040503050406030204" pitchFamily="18" charset="0"/>
+                            </a:rPr>
+                            <m:t>𝑑𝑓</m:t>
+                          </m:r>
+                        </m:num>
+                        <m:den>
+                          <m:r>
+                            <a:rPr lang="en-US" b="0" i="1" smtClean="0">
+                              <a:latin typeface="Cambria Math" panose="02040503050406030204" pitchFamily="18" charset="0"/>
+                            </a:rPr>
+                            <m:t>𝑑𝑥</m:t>
+                          </m:r>
+                        </m:den>
+                      </m:f>
+                      <m:r>
+                        <a:rPr lang="en-US" b="0" i="1" smtClean="0">
+                          <a:latin typeface="Cambria Math" panose="02040503050406030204" pitchFamily="18" charset="0"/>
+                        </a:rPr>
+                        <m:t>=</m:t>
+                      </m:r>
+                      <m:r>
+                        <a:rPr lang="en-US" b="0" i="1" smtClean="0">
+                          <a:latin typeface="Cambria Math" panose="02040503050406030204" pitchFamily="18" charset="0"/>
+                        </a:rPr>
+                        <m:t>𝑔</m:t>
+                      </m:r>
+                      <m:r>
+                        <a:rPr lang="en-US" b="0" i="1" smtClean="0">
+                          <a:latin typeface="Cambria Math" panose="02040503050406030204" pitchFamily="18" charset="0"/>
+                        </a:rPr>
+                        <m:t>(</m:t>
+                      </m:r>
+                      <m:r>
+                        <a:rPr lang="en-US" b="0" i="1" smtClean="0">
+                          <a:latin typeface="Cambria Math" panose="02040503050406030204" pitchFamily="18" charset="0"/>
+                        </a:rPr>
+                        <m:t>𝑥</m:t>
+                      </m:r>
+                      <m:r>
+                        <a:rPr lang="en-US" b="0" i="1" smtClean="0">
+                          <a:latin typeface="Cambria Math" panose="02040503050406030204" pitchFamily="18" charset="0"/>
+                        </a:rPr>
+                        <m:t>)</m:t>
+                      </m:r>
+                    </m:oMath>
+                  </m:oMathPara>
+                </a14:m>
+                <a:endParaRPr lang="en-US" dirty="0"/>
+              </a:p>
+            </p:txBody>
+          </p:sp>
+        </mc:Choice>
+        <mc:Fallback>
+          <p:sp>
+            <p:nvSpPr>
+              <p:cNvPr id="4" name="TextBox 3">
+                <a:extLst>
+                  <a:ext uri="{FF2B5EF4-FFF2-40B4-BE49-F238E27FC236}">
+                    <a16:creationId xmlns:a16="http://schemas.microsoft.com/office/drawing/2014/main" id="{C2CBB4A5-6A48-466F-E1F8-14E2D4601A65}"/>
+                  </a:ext>
+                </a:extLst>
+              </p:cNvPr>
+              <p:cNvSpPr txBox="1">
+                <a:spLocks noRot="1" noChangeAspect="1" noMove="1" noResize="1" noEditPoints="1" noAdjustHandles="1" noChangeArrowheads="1" noChangeShapeType="1" noTextEdit="1"/>
+              </p:cNvSpPr>
+              <p:nvPr/>
+            </p:nvSpPr>
+            <p:spPr>
+              <a:xfrm>
+                <a:off x="1573162" y="639096"/>
+                <a:ext cx="1273169" cy="618887"/>
+              </a:xfrm>
+              <a:prstGeom prst="rect">
+                <a:avLst/>
+              </a:prstGeom>
+              <a:blipFill>
+                <a:blip r:embed="rId2"/>
+                <a:stretch>
+                  <a:fillRect/>
+                </a:stretch>
+              </a:blipFill>
+            </p:spPr>
+            <p:txBody>
+              <a:bodyPr/>
+              <a:lstStyle/>
+              <a:p>
+                <a:r>
+                  <a:rPr lang="en-US">
+                    <a:noFill/>
+                  </a:rPr>
+                  <a:t> </a:t>
+                </a:r>
+              </a:p>
+            </p:txBody>
+          </p:sp>
+        </mc:Fallback>
+      </mc:AlternateContent>
+      <mc:AlternateContent xmlns:mc="http://schemas.openxmlformats.org/markup-compatibility/2006">
+        <mc:Choice xmlns:a14="http://schemas.microsoft.com/office/drawing/2010/main" Requires="a14">
+          <p:sp>
+            <p:nvSpPr>
+              <p:cNvPr id="5" name="TextBox 4">
+                <a:extLst>
+                  <a:ext uri="{FF2B5EF4-FFF2-40B4-BE49-F238E27FC236}">
+                    <a16:creationId xmlns:a16="http://schemas.microsoft.com/office/drawing/2014/main" id="{ED709F5D-5F2C-7EA7-F473-980B47CC1E7D}"/>
+                  </a:ext>
+                </a:extLst>
+              </p:cNvPr>
+              <p:cNvSpPr txBox="1"/>
+              <p:nvPr/>
+            </p:nvSpPr>
+            <p:spPr>
+              <a:xfrm>
+                <a:off x="1450259" y="1794386"/>
+                <a:ext cx="3952172" cy="720647"/>
+              </a:xfrm>
+              <a:prstGeom prst="rect">
+                <a:avLst/>
+              </a:prstGeom>
+              <a:noFill/>
+            </p:spPr>
+            <p:txBody>
+              <a:bodyPr wrap="none" rtlCol="0">
+                <a:spAutoFit/>
+              </a:bodyPr>
+              <a:lstStyle/>
+              <a:p>
+                <a14:m>
+                  <m:oMathPara xmlns:m="http://schemas.openxmlformats.org/officeDocument/2006/math">
+                    <m:oMathParaPr>
+                      <m:jc m:val="centerGroup"/>
+                    </m:oMathParaPr>
+                    <m:oMath xmlns:m="http://schemas.openxmlformats.org/officeDocument/2006/math">
+                      <m:r>
+                        <a:rPr lang="en-US" b="0" i="1" smtClean="0">
+                          <a:latin typeface="Cambria Math" panose="02040503050406030204" pitchFamily="18" charset="0"/>
+                        </a:rPr>
+                        <m:t>𝑓</m:t>
+                      </m:r>
+                      <m:d>
+                        <m:dPr>
+                          <m:ctrlPr>
+                            <a:rPr lang="en-US" b="0" i="1" smtClean="0">
+                              <a:latin typeface="Cambria Math" panose="02040503050406030204" pitchFamily="18" charset="0"/>
+                            </a:rPr>
+                          </m:ctrlPr>
+                        </m:dPr>
+                        <m:e>
+                          <m:r>
+                            <a:rPr lang="en-US" b="0" i="1" smtClean="0">
+                              <a:latin typeface="Cambria Math" panose="02040503050406030204" pitchFamily="18" charset="0"/>
+                            </a:rPr>
+                            <m:t>𝑏</m:t>
+                          </m:r>
+                        </m:e>
+                      </m:d>
+                      <m:r>
+                        <a:rPr lang="en-US" b="0" i="1" smtClean="0">
+                          <a:latin typeface="Cambria Math" panose="02040503050406030204" pitchFamily="18" charset="0"/>
+                        </a:rPr>
+                        <m:t>−</m:t>
+                      </m:r>
+                      <m:r>
+                        <a:rPr lang="en-US" b="0" i="1" smtClean="0">
+                          <a:latin typeface="Cambria Math" panose="02040503050406030204" pitchFamily="18" charset="0"/>
+                        </a:rPr>
+                        <m:t>𝑓</m:t>
+                      </m:r>
+                      <m:r>
+                        <a:rPr lang="en-US" b="0" i="1" smtClean="0">
+                          <a:latin typeface="Cambria Math" panose="02040503050406030204" pitchFamily="18" charset="0"/>
+                        </a:rPr>
+                        <m:t>(</m:t>
+                      </m:r>
+                      <m:r>
+                        <a:rPr lang="en-US" b="0" i="1" smtClean="0">
+                          <a:latin typeface="Cambria Math" panose="02040503050406030204" pitchFamily="18" charset="0"/>
+                        </a:rPr>
+                        <m:t>𝑎</m:t>
+                      </m:r>
+                      <m:r>
+                        <a:rPr lang="en-US" b="0" i="1" smtClean="0">
+                          <a:latin typeface="Cambria Math" panose="02040503050406030204" pitchFamily="18" charset="0"/>
+                        </a:rPr>
+                        <m:t>)=</m:t>
+                      </m:r>
+                      <m:nary>
+                        <m:naryPr>
+                          <m:ctrlPr>
+                            <a:rPr lang="en-US" b="0" i="1" smtClean="0">
+                              <a:latin typeface="Cambria Math" panose="02040503050406030204" pitchFamily="18" charset="0"/>
+                            </a:rPr>
+                          </m:ctrlPr>
+                        </m:naryPr>
+                        <m:sub>
+                          <m:r>
+                            <a:rPr lang="en-US" b="0" i="1" smtClean="0">
+                              <a:latin typeface="Cambria Math" panose="02040503050406030204" pitchFamily="18" charset="0"/>
+                            </a:rPr>
+                            <m:t>𝑎</m:t>
+                          </m:r>
+                        </m:sub>
+                        <m:sup>
+                          <m:r>
+                            <a:rPr lang="en-US" b="0" i="1" smtClean="0">
+                              <a:latin typeface="Cambria Math" panose="02040503050406030204" pitchFamily="18" charset="0"/>
+                            </a:rPr>
+                            <m:t>𝑏</m:t>
+                          </m:r>
+                        </m:sup>
+                        <m:e>
+                          <m:f>
+                            <m:fPr>
+                              <m:ctrlPr>
+                                <a:rPr lang="en-US" i="1">
+                                  <a:latin typeface="Cambria Math" panose="02040503050406030204" pitchFamily="18" charset="0"/>
+                                </a:rPr>
+                              </m:ctrlPr>
+                            </m:fPr>
+                            <m:num>
+                              <m:r>
+                                <a:rPr lang="en-US" i="1">
+                                  <a:latin typeface="Cambria Math" panose="02040503050406030204" pitchFamily="18" charset="0"/>
+                                </a:rPr>
+                                <m:t>𝑑𝑓</m:t>
+                              </m:r>
+                            </m:num>
+                            <m:den>
+                              <m:r>
+                                <a:rPr lang="en-US" i="1">
+                                  <a:latin typeface="Cambria Math" panose="02040503050406030204" pitchFamily="18" charset="0"/>
+                                </a:rPr>
+                                <m:t>𝑑𝑥</m:t>
+                              </m:r>
+                            </m:den>
+                          </m:f>
+                          <m:r>
+                            <a:rPr lang="en-US" b="0" i="1" smtClean="0">
+                              <a:latin typeface="Cambria Math" panose="02040503050406030204" pitchFamily="18" charset="0"/>
+                            </a:rPr>
+                            <m:t>𝑑𝑥</m:t>
+                          </m:r>
+                        </m:e>
+                      </m:nary>
+                      <m:r>
+                        <a:rPr lang="en-US" b="0" i="1" smtClean="0">
+                          <a:latin typeface="Cambria Math" panose="02040503050406030204" pitchFamily="18" charset="0"/>
+                        </a:rPr>
+                        <m:t>=</m:t>
+                      </m:r>
+                      <m:nary>
+                        <m:naryPr>
+                          <m:ctrlPr>
+                            <a:rPr lang="en-US" i="1">
+                              <a:latin typeface="Cambria Math" panose="02040503050406030204" pitchFamily="18" charset="0"/>
+                            </a:rPr>
+                          </m:ctrlPr>
+                        </m:naryPr>
+                        <m:sub>
+                          <m:r>
+                            <a:rPr lang="en-US" i="1">
+                              <a:latin typeface="Cambria Math" panose="02040503050406030204" pitchFamily="18" charset="0"/>
+                            </a:rPr>
+                            <m:t>𝑎</m:t>
+                          </m:r>
+                        </m:sub>
+                        <m:sup>
+                          <m:r>
+                            <a:rPr lang="en-US" i="1">
+                              <a:latin typeface="Cambria Math" panose="02040503050406030204" pitchFamily="18" charset="0"/>
+                            </a:rPr>
+                            <m:t>𝑏</m:t>
+                          </m:r>
+                        </m:sup>
+                        <m:e>
+                          <m:r>
+                            <a:rPr lang="en-US" i="1">
+                              <a:latin typeface="Cambria Math" panose="02040503050406030204" pitchFamily="18" charset="0"/>
+                            </a:rPr>
+                            <m:t>𝑔</m:t>
+                          </m:r>
+                          <m:r>
+                            <a:rPr lang="en-US" i="1">
+                              <a:latin typeface="Cambria Math" panose="02040503050406030204" pitchFamily="18" charset="0"/>
+                            </a:rPr>
+                            <m:t>(</m:t>
+                          </m:r>
+                          <m:r>
+                            <a:rPr lang="en-US" i="1">
+                              <a:latin typeface="Cambria Math" panose="02040503050406030204" pitchFamily="18" charset="0"/>
+                            </a:rPr>
+                            <m:t>𝑥</m:t>
+                          </m:r>
+                          <m:r>
+                            <a:rPr lang="en-US" i="1">
+                              <a:latin typeface="Cambria Math" panose="02040503050406030204" pitchFamily="18" charset="0"/>
+                            </a:rPr>
+                            <m:t>)</m:t>
+                          </m:r>
+                          <m:r>
+                            <a:rPr lang="en-US" i="1">
+                              <a:latin typeface="Cambria Math" panose="02040503050406030204" pitchFamily="18" charset="0"/>
+                            </a:rPr>
+                            <m:t>𝑑𝑥</m:t>
+                          </m:r>
+                        </m:e>
+                      </m:nary>
+                    </m:oMath>
+                  </m:oMathPara>
+                </a14:m>
+                <a:endParaRPr lang="en-US" dirty="0"/>
+              </a:p>
+            </p:txBody>
+          </p:sp>
+        </mc:Choice>
+        <mc:Fallback>
+          <p:sp>
+            <p:nvSpPr>
+              <p:cNvPr id="5" name="TextBox 4">
+                <a:extLst>
+                  <a:ext uri="{FF2B5EF4-FFF2-40B4-BE49-F238E27FC236}">
+                    <a16:creationId xmlns:a16="http://schemas.microsoft.com/office/drawing/2014/main" id="{ED709F5D-5F2C-7EA7-F473-980B47CC1E7D}"/>
+                  </a:ext>
+                </a:extLst>
+              </p:cNvPr>
+              <p:cNvSpPr txBox="1">
+                <a:spLocks noRot="1" noChangeAspect="1" noMove="1" noResize="1" noEditPoints="1" noAdjustHandles="1" noChangeArrowheads="1" noChangeShapeType="1" noTextEdit="1"/>
+              </p:cNvSpPr>
+              <p:nvPr/>
+            </p:nvSpPr>
+            <p:spPr>
+              <a:xfrm>
+                <a:off x="1450259" y="1794386"/>
+                <a:ext cx="3952172" cy="720647"/>
+              </a:xfrm>
+              <a:prstGeom prst="rect">
+                <a:avLst/>
+              </a:prstGeom>
+              <a:blipFill>
+                <a:blip r:embed="rId3"/>
+                <a:stretch>
+                  <a:fillRect/>
+                </a:stretch>
+              </a:blipFill>
+            </p:spPr>
+            <p:txBody>
+              <a:bodyPr/>
+              <a:lstStyle/>
+              <a:p>
+                <a:r>
+                  <a:rPr lang="en-US">
+                    <a:noFill/>
+                  </a:rPr>
+                  <a:t> </a:t>
+                </a:r>
+              </a:p>
+            </p:txBody>
+          </p:sp>
+        </mc:Fallback>
+      </mc:AlternateContent>
+      <p:sp>
+        <p:nvSpPr>
+          <p:cNvPr id="6" name="TextBox 5">
+            <a:extLst>
+              <a:ext uri="{FF2B5EF4-FFF2-40B4-BE49-F238E27FC236}">
+                <a16:creationId xmlns:a16="http://schemas.microsoft.com/office/drawing/2014/main" id="{2786B505-AC21-BFCA-979C-39BA514B3129}"/>
+              </a:ext>
+            </a:extLst>
+          </p:cNvPr>
+          <p:cNvSpPr txBox="1"/>
+          <p:nvPr/>
+        </p:nvSpPr>
+        <p:spPr>
+          <a:xfrm>
+            <a:off x="7004010" y="639096"/>
+            <a:ext cx="45719" cy="369332"/>
+          </a:xfrm>
+          <a:prstGeom prst="rect">
+            <a:avLst/>
+          </a:prstGeom>
+          <a:noFill/>
+        </p:spPr>
+        <p:txBody>
+          <a:bodyPr wrap="square" rtlCol="0">
+            <a:spAutoFit/>
+          </a:bodyPr>
+          <a:lstStyle/>
+          <a:p>
+            <a:r>
+              <a:rPr lang="en-US" dirty="0"/>
+              <a:t> </a:t>
+            </a:r>
+          </a:p>
+        </p:txBody>
+      </p:sp>
+      <mc:AlternateContent xmlns:mc="http://schemas.openxmlformats.org/markup-compatibility/2006">
+        <mc:Choice xmlns:a14="http://schemas.microsoft.com/office/drawing/2010/main" Requires="a14">
+          <p:sp>
+            <p:nvSpPr>
+              <p:cNvPr id="7" name="TextBox 6">
+                <a:extLst>
+                  <a:ext uri="{FF2B5EF4-FFF2-40B4-BE49-F238E27FC236}">
+                    <a16:creationId xmlns:a16="http://schemas.microsoft.com/office/drawing/2014/main" id="{6F023D71-26CC-EF65-0B78-15550C8E02BC}"/>
+                  </a:ext>
+                </a:extLst>
+              </p:cNvPr>
+              <p:cNvSpPr txBox="1"/>
+              <p:nvPr/>
+            </p:nvSpPr>
+            <p:spPr>
+              <a:xfrm>
+                <a:off x="6508955" y="757084"/>
+                <a:ext cx="2833211" cy="668581"/>
+              </a:xfrm>
+              <a:prstGeom prst="rect">
+                <a:avLst/>
+              </a:prstGeom>
+              <a:noFill/>
+            </p:spPr>
+            <p:txBody>
+              <a:bodyPr wrap="none" rtlCol="0">
+                <a:spAutoFit/>
+              </a:bodyPr>
+              <a:lstStyle/>
+              <a:p>
+                <a14:m>
+                  <m:oMathPara xmlns:m="http://schemas.openxmlformats.org/officeDocument/2006/math">
+                    <m:oMathParaPr>
+                      <m:jc m:val="centerGroup"/>
+                    </m:oMathParaPr>
+                    <m:oMath xmlns:m="http://schemas.openxmlformats.org/officeDocument/2006/math">
+                      <m:r>
+                        <a:rPr lang="en-US" b="0" i="1" smtClean="0">
+                          <a:latin typeface="Cambria Math" panose="02040503050406030204" pitchFamily="18" charset="0"/>
+                        </a:rPr>
+                        <m:t>𝑎</m:t>
+                      </m:r>
+                      <m:r>
+                        <a:rPr lang="en-US" b="0" i="1" smtClean="0">
+                          <a:latin typeface="Cambria Math" panose="02040503050406030204" pitchFamily="18" charset="0"/>
+                        </a:rPr>
+                        <m:t>=</m:t>
+                      </m:r>
+                      <m:sSub>
+                        <m:sSubPr>
+                          <m:ctrlPr>
+                            <a:rPr lang="en-US" b="0" i="1" smtClean="0">
+                              <a:latin typeface="Cambria Math" panose="02040503050406030204" pitchFamily="18" charset="0"/>
+                            </a:rPr>
+                          </m:ctrlPr>
+                        </m:sSubPr>
+                        <m:e>
+                          <m:r>
+                            <a:rPr lang="en-US" b="0" i="1" smtClean="0">
+                              <a:latin typeface="Cambria Math" panose="02040503050406030204" pitchFamily="18" charset="0"/>
+                            </a:rPr>
+                            <m:t>𝑥</m:t>
+                          </m:r>
+                        </m:e>
+                        <m:sub>
+                          <m:r>
+                            <a:rPr lang="en-US" b="0" i="1" smtClean="0">
+                              <a:latin typeface="Cambria Math" panose="02040503050406030204" pitchFamily="18" charset="0"/>
+                            </a:rPr>
+                            <m:t>0</m:t>
+                          </m:r>
+                        </m:sub>
+                      </m:sSub>
+                      <m:r>
+                        <a:rPr lang="en-US" b="0" i="1" smtClean="0">
+                          <a:latin typeface="Cambria Math" panose="02040503050406030204" pitchFamily="18" charset="0"/>
+                        </a:rPr>
+                        <m:t> </m:t>
+                      </m:r>
+                      <m:r>
+                        <a:rPr lang="en-US" b="0" i="1" smtClean="0">
+                          <a:latin typeface="Cambria Math" panose="02040503050406030204" pitchFamily="18" charset="0"/>
+                        </a:rPr>
+                        <m:t>𝑖𝑛</m:t>
+                      </m:r>
+                      <m:r>
+                        <a:rPr lang="en-US" b="0" i="1" smtClean="0">
+                          <a:latin typeface="Cambria Math" panose="02040503050406030204" pitchFamily="18" charset="0"/>
+                        </a:rPr>
+                        <m:t> </m:t>
+                      </m:r>
+                      <m:r>
+                        <a:rPr lang="en-US" b="0" i="1" smtClean="0">
+                          <a:latin typeface="Cambria Math" panose="02040503050406030204" pitchFamily="18" charset="0"/>
+                        </a:rPr>
+                        <m:t>𝑡h𝑒</m:t>
+                      </m:r>
+                      <m:r>
+                        <a:rPr lang="en-US" b="0" i="1" smtClean="0">
+                          <a:latin typeface="Cambria Math" panose="02040503050406030204" pitchFamily="18" charset="0"/>
+                        </a:rPr>
+                        <m:t> </m:t>
+                      </m:r>
+                      <m:r>
+                        <a:rPr lang="en-US" b="0" i="1" smtClean="0">
+                          <a:latin typeface="Cambria Math" panose="02040503050406030204" pitchFamily="18" charset="0"/>
+                        </a:rPr>
+                        <m:t>𝑎𝑠𝑠𝑖𝑔𝑛𝑚𝑒𝑛𝑡</m:t>
+                      </m:r>
+                    </m:oMath>
+                  </m:oMathPara>
+                </a14:m>
+                <a:endParaRPr lang="en-US" b="0" dirty="0"/>
+              </a:p>
+              <a:p>
+                <a14:m>
+                  <m:oMathPara xmlns:m="http://schemas.openxmlformats.org/officeDocument/2006/math">
+                    <m:oMathParaPr>
+                      <m:jc m:val="centerGroup"/>
+                    </m:oMathParaPr>
+                    <m:oMath xmlns:m="http://schemas.openxmlformats.org/officeDocument/2006/math">
+                      <m:r>
+                        <a:rPr lang="en-US" b="0" i="1" smtClean="0">
+                          <a:latin typeface="Cambria Math" panose="02040503050406030204" pitchFamily="18" charset="0"/>
+                        </a:rPr>
+                        <m:t>𝑏</m:t>
+                      </m:r>
+                      <m:r>
+                        <a:rPr lang="en-US" b="0" i="1" smtClean="0">
+                          <a:latin typeface="Cambria Math" panose="02040503050406030204" pitchFamily="18" charset="0"/>
+                        </a:rPr>
+                        <m:t>=</m:t>
+                      </m:r>
+                      <m:sSub>
+                        <m:sSubPr>
+                          <m:ctrlPr>
+                            <a:rPr lang="en-US" b="0" i="1" smtClean="0">
+                              <a:latin typeface="Cambria Math" panose="02040503050406030204" pitchFamily="18" charset="0"/>
+                            </a:rPr>
+                          </m:ctrlPr>
+                        </m:sSubPr>
+                        <m:e>
+                          <m:r>
+                            <a:rPr lang="en-US" b="0" i="1" smtClean="0">
+                              <a:latin typeface="Cambria Math" panose="02040503050406030204" pitchFamily="18" charset="0"/>
+                            </a:rPr>
+                            <m:t>𝑥</m:t>
+                          </m:r>
+                        </m:e>
+                        <m:sub>
+                          <m:r>
+                            <a:rPr lang="en-US" b="0" i="1" smtClean="0">
+                              <a:latin typeface="Cambria Math" panose="02040503050406030204" pitchFamily="18" charset="0"/>
+                            </a:rPr>
+                            <m:t>𝑓</m:t>
+                          </m:r>
+                        </m:sub>
+                      </m:sSub>
+                    </m:oMath>
+                  </m:oMathPara>
+                </a14:m>
+                <a:endParaRPr lang="en-US" dirty="0"/>
+              </a:p>
+            </p:txBody>
+          </p:sp>
+        </mc:Choice>
+        <mc:Fallback>
+          <p:sp>
+            <p:nvSpPr>
+              <p:cNvPr id="7" name="TextBox 6">
+                <a:extLst>
+                  <a:ext uri="{FF2B5EF4-FFF2-40B4-BE49-F238E27FC236}">
+                    <a16:creationId xmlns:a16="http://schemas.microsoft.com/office/drawing/2014/main" id="{6F023D71-26CC-EF65-0B78-15550C8E02BC}"/>
+                  </a:ext>
+                </a:extLst>
+              </p:cNvPr>
+              <p:cNvSpPr txBox="1">
+                <a:spLocks noRot="1" noChangeAspect="1" noMove="1" noResize="1" noEditPoints="1" noAdjustHandles="1" noChangeArrowheads="1" noChangeShapeType="1" noTextEdit="1"/>
+              </p:cNvSpPr>
+              <p:nvPr/>
+            </p:nvSpPr>
+            <p:spPr>
+              <a:xfrm>
+                <a:off x="6508955" y="757084"/>
+                <a:ext cx="2833211" cy="668581"/>
+              </a:xfrm>
+              <a:prstGeom prst="rect">
+                <a:avLst/>
+              </a:prstGeom>
+              <a:blipFill>
+                <a:blip r:embed="rId4"/>
+                <a:stretch>
+                  <a:fillRect b="-5455"/>
+                </a:stretch>
+              </a:blipFill>
+            </p:spPr>
+            <p:txBody>
+              <a:bodyPr/>
+              <a:lstStyle/>
+              <a:p>
+                <a:r>
+                  <a:rPr lang="en-US">
+                    <a:noFill/>
+                  </a:rPr>
+                  <a:t> </a:t>
+                </a:r>
+              </a:p>
+            </p:txBody>
+          </p:sp>
+        </mc:Fallback>
+      </mc:AlternateContent>
+      <mc:AlternateContent xmlns:mc="http://schemas.openxmlformats.org/markup-compatibility/2006">
+        <mc:Choice xmlns:a14="http://schemas.microsoft.com/office/drawing/2010/main" Requires="a14">
+          <p:sp>
+            <p:nvSpPr>
+              <p:cNvPr id="8" name="TextBox 7">
+                <a:extLst>
+                  <a:ext uri="{FF2B5EF4-FFF2-40B4-BE49-F238E27FC236}">
+                    <a16:creationId xmlns:a16="http://schemas.microsoft.com/office/drawing/2014/main" id="{AB52C599-89DC-B0F5-1F75-03F15A1B268A}"/>
+                  </a:ext>
+                </a:extLst>
+              </p:cNvPr>
+              <p:cNvSpPr txBox="1"/>
+              <p:nvPr/>
+            </p:nvSpPr>
+            <p:spPr>
+              <a:xfrm>
+                <a:off x="1356853" y="3068676"/>
+                <a:ext cx="2949525" cy="726674"/>
+              </a:xfrm>
+              <a:prstGeom prst="rect">
+                <a:avLst/>
+              </a:prstGeom>
+              <a:noFill/>
+            </p:spPr>
+            <p:txBody>
+              <a:bodyPr wrap="none" rtlCol="0">
+                <a:spAutoFit/>
+              </a:bodyPr>
+              <a:lstStyle/>
+              <a:p>
+                <a14:m>
+                  <m:oMathPara xmlns:m="http://schemas.openxmlformats.org/officeDocument/2006/math">
+                    <m:oMathParaPr>
+                      <m:jc m:val="centerGroup"/>
+                    </m:oMathParaPr>
+                    <m:oMath xmlns:m="http://schemas.openxmlformats.org/officeDocument/2006/math">
+                      <m:r>
+                        <a:rPr lang="en-US" b="0" i="1" smtClean="0">
+                          <a:latin typeface="Cambria Math" panose="02040503050406030204" pitchFamily="18" charset="0"/>
+                        </a:rPr>
+                        <m:t>𝑓</m:t>
+                      </m:r>
+                      <m:d>
+                        <m:dPr>
+                          <m:ctrlPr>
+                            <a:rPr lang="en-US" b="0" i="1" smtClean="0">
+                              <a:latin typeface="Cambria Math" panose="02040503050406030204" pitchFamily="18" charset="0"/>
+                            </a:rPr>
+                          </m:ctrlPr>
+                        </m:dPr>
+                        <m:e>
+                          <m:r>
+                            <a:rPr lang="en-US" b="0" i="1" smtClean="0">
+                              <a:latin typeface="Cambria Math" panose="02040503050406030204" pitchFamily="18" charset="0"/>
+                            </a:rPr>
+                            <m:t>𝑥</m:t>
+                          </m:r>
+                        </m:e>
+                      </m:d>
+                      <m:r>
+                        <a:rPr lang="en-US" b="0" i="1" smtClean="0">
+                          <a:latin typeface="Cambria Math" panose="02040503050406030204" pitchFamily="18" charset="0"/>
+                        </a:rPr>
+                        <m:t>=</m:t>
+                      </m:r>
+                      <m:r>
+                        <a:rPr lang="en-US" i="1">
+                          <a:latin typeface="Cambria Math" panose="02040503050406030204" pitchFamily="18" charset="0"/>
+                        </a:rPr>
+                        <m:t>𝑓</m:t>
+                      </m:r>
+                      <m:d>
+                        <m:dPr>
+                          <m:ctrlPr>
+                            <a:rPr lang="en-US" i="1">
+                              <a:latin typeface="Cambria Math" panose="02040503050406030204" pitchFamily="18" charset="0"/>
+                            </a:rPr>
+                          </m:ctrlPr>
+                        </m:dPr>
+                        <m:e>
+                          <m:sSub>
+                            <m:sSubPr>
+                              <m:ctrlPr>
+                                <a:rPr lang="en-US" b="0" i="1" smtClean="0">
+                                  <a:latin typeface="Cambria Math" panose="02040503050406030204" pitchFamily="18" charset="0"/>
+                                </a:rPr>
+                              </m:ctrlPr>
+                            </m:sSubPr>
+                            <m:e>
+                              <m:r>
+                                <a:rPr lang="en-US" b="0" i="1" smtClean="0">
+                                  <a:latin typeface="Cambria Math" panose="02040503050406030204" pitchFamily="18" charset="0"/>
+                                </a:rPr>
+                                <m:t>𝑥</m:t>
+                              </m:r>
+                            </m:e>
+                            <m:sub>
+                              <m:r>
+                                <a:rPr lang="en-US" b="0" i="1" smtClean="0">
+                                  <a:latin typeface="Cambria Math" panose="02040503050406030204" pitchFamily="18" charset="0"/>
+                                </a:rPr>
+                                <m:t>0</m:t>
+                              </m:r>
+                            </m:sub>
+                          </m:sSub>
+                        </m:e>
+                      </m:d>
+                      <m:r>
+                        <a:rPr lang="en-US" b="0" i="1" smtClean="0">
+                          <a:latin typeface="Cambria Math" panose="02040503050406030204" pitchFamily="18" charset="0"/>
+                        </a:rPr>
+                        <m:t>+</m:t>
+                      </m:r>
+                      <m:nary>
+                        <m:naryPr>
+                          <m:ctrlPr>
+                            <a:rPr lang="en-US" i="1">
+                              <a:latin typeface="Cambria Math" panose="02040503050406030204" pitchFamily="18" charset="0"/>
+                            </a:rPr>
+                          </m:ctrlPr>
+                        </m:naryPr>
+                        <m:sub>
+                          <m:sSub>
+                            <m:sSubPr>
+                              <m:ctrlPr>
+                                <a:rPr lang="en-US" b="0" i="1" smtClean="0">
+                                  <a:latin typeface="Cambria Math" panose="02040503050406030204" pitchFamily="18" charset="0"/>
+                                </a:rPr>
+                              </m:ctrlPr>
+                            </m:sSubPr>
+                            <m:e>
+                              <m:r>
+                                <a:rPr lang="en-US" b="0" i="1" smtClean="0">
+                                  <a:latin typeface="Cambria Math" panose="02040503050406030204" pitchFamily="18" charset="0"/>
+                                </a:rPr>
+                                <m:t>𝑥</m:t>
+                              </m:r>
+                            </m:e>
+                            <m:sub>
+                              <m:r>
+                                <a:rPr lang="en-US" b="0" i="1" smtClean="0">
+                                  <a:latin typeface="Cambria Math" panose="02040503050406030204" pitchFamily="18" charset="0"/>
+                                </a:rPr>
+                                <m:t>0</m:t>
+                              </m:r>
+                            </m:sub>
+                          </m:sSub>
+                        </m:sub>
+                        <m:sup>
+                          <m:r>
+                            <a:rPr lang="en-US" b="0" i="1" smtClean="0">
+                              <a:latin typeface="Cambria Math" panose="02040503050406030204" pitchFamily="18" charset="0"/>
+                            </a:rPr>
+                            <m:t>𝑥</m:t>
+                          </m:r>
+                        </m:sup>
+                        <m:e>
+                          <m:r>
+                            <a:rPr lang="en-US" i="1">
+                              <a:latin typeface="Cambria Math" panose="02040503050406030204" pitchFamily="18" charset="0"/>
+                            </a:rPr>
+                            <m:t>𝑔</m:t>
+                          </m:r>
+                          <m:r>
+                            <a:rPr lang="en-US" i="1">
+                              <a:latin typeface="Cambria Math" panose="02040503050406030204" pitchFamily="18" charset="0"/>
+                            </a:rPr>
+                            <m:t>(</m:t>
+                          </m:r>
+                          <m:r>
+                            <a:rPr lang="en-US" b="0" i="1" smtClean="0">
+                              <a:latin typeface="Cambria Math" panose="02040503050406030204" pitchFamily="18" charset="0"/>
+                            </a:rPr>
+                            <m:t>𝑥</m:t>
+                          </m:r>
+                          <m:r>
+                            <a:rPr lang="en-US" b="0" i="1" smtClean="0">
+                              <a:latin typeface="Cambria Math" panose="02040503050406030204" pitchFamily="18" charset="0"/>
+                            </a:rPr>
+                            <m:t>′)</m:t>
+                          </m:r>
+                          <m:r>
+                            <a:rPr lang="en-US" i="1">
+                              <a:latin typeface="Cambria Math" panose="02040503050406030204" pitchFamily="18" charset="0"/>
+                            </a:rPr>
+                            <m:t>𝑑𝑥</m:t>
+                          </m:r>
+                          <m:r>
+                            <a:rPr lang="en-US" b="0" i="1" smtClean="0">
+                              <a:latin typeface="Cambria Math" panose="02040503050406030204" pitchFamily="18" charset="0"/>
+                            </a:rPr>
+                            <m:t>′</m:t>
+                          </m:r>
+                        </m:e>
+                      </m:nary>
+                    </m:oMath>
+                  </m:oMathPara>
+                </a14:m>
+                <a:endParaRPr lang="en-US" dirty="0"/>
+              </a:p>
+            </p:txBody>
+          </p:sp>
+        </mc:Choice>
+        <mc:Fallback>
+          <p:sp>
+            <p:nvSpPr>
+              <p:cNvPr id="8" name="TextBox 7">
+                <a:extLst>
+                  <a:ext uri="{FF2B5EF4-FFF2-40B4-BE49-F238E27FC236}">
+                    <a16:creationId xmlns:a16="http://schemas.microsoft.com/office/drawing/2014/main" id="{AB52C599-89DC-B0F5-1F75-03F15A1B268A}"/>
+                  </a:ext>
+                </a:extLst>
+              </p:cNvPr>
+              <p:cNvSpPr txBox="1">
+                <a:spLocks noRot="1" noChangeAspect="1" noMove="1" noResize="1" noEditPoints="1" noAdjustHandles="1" noChangeArrowheads="1" noChangeShapeType="1" noTextEdit="1"/>
+              </p:cNvSpPr>
+              <p:nvPr/>
+            </p:nvSpPr>
+            <p:spPr>
+              <a:xfrm>
+                <a:off x="1356853" y="3068676"/>
+                <a:ext cx="2949525" cy="726674"/>
+              </a:xfrm>
+              <a:prstGeom prst="rect">
+                <a:avLst/>
+              </a:prstGeom>
+              <a:blipFill>
+                <a:blip r:embed="rId5"/>
+                <a:stretch>
+                  <a:fillRect/>
+                </a:stretch>
+              </a:blipFill>
+            </p:spPr>
+            <p:txBody>
+              <a:bodyPr/>
+              <a:lstStyle/>
+              <a:p>
+                <a:r>
+                  <a:rPr lang="en-US">
+                    <a:noFill/>
+                  </a:rPr>
+                  <a:t> </a:t>
+                </a:r>
+              </a:p>
+            </p:txBody>
+          </p:sp>
+        </mc:Fallback>
+      </mc:AlternateContent>
+      <mc:AlternateContent xmlns:mc="http://schemas.openxmlformats.org/markup-compatibility/2006">
+        <mc:Choice xmlns:a14="http://schemas.microsoft.com/office/drawing/2010/main" Requires="a14">
+          <p:sp>
+            <p:nvSpPr>
+              <p:cNvPr id="9" name="TextBox 8">
+                <a:extLst>
+                  <a:ext uri="{FF2B5EF4-FFF2-40B4-BE49-F238E27FC236}">
+                    <a16:creationId xmlns:a16="http://schemas.microsoft.com/office/drawing/2014/main" id="{51E8A71C-7B24-4DBB-A905-0C49DD1133AD}"/>
+                  </a:ext>
+                </a:extLst>
+              </p:cNvPr>
+              <p:cNvSpPr txBox="1"/>
+              <p:nvPr/>
+            </p:nvSpPr>
+            <p:spPr>
+              <a:xfrm>
+                <a:off x="1204453" y="4253463"/>
+                <a:ext cx="6172844" cy="729110"/>
+              </a:xfrm>
+              <a:prstGeom prst="rect">
+                <a:avLst/>
+              </a:prstGeom>
+              <a:noFill/>
+            </p:spPr>
+            <p:txBody>
+              <a:bodyPr wrap="none" rtlCol="0">
+                <a:spAutoFit/>
+              </a:bodyPr>
+              <a:lstStyle/>
+              <a:p>
+                <a14:m>
+                  <m:oMathPara xmlns:m="http://schemas.openxmlformats.org/officeDocument/2006/math">
+                    <m:oMathParaPr>
+                      <m:jc m:val="centerGroup"/>
+                    </m:oMathParaPr>
+                    <m:oMath xmlns:m="http://schemas.openxmlformats.org/officeDocument/2006/math">
+                      <m:r>
+                        <a:rPr lang="en-US" b="0" i="1" smtClean="0">
+                          <a:latin typeface="Cambria Math" panose="02040503050406030204" pitchFamily="18" charset="0"/>
+                        </a:rPr>
+                        <m:t>𝑓</m:t>
+                      </m:r>
+                      <m:d>
+                        <m:dPr>
+                          <m:ctrlPr>
+                            <a:rPr lang="en-US" b="0" i="1" smtClean="0">
+                              <a:latin typeface="Cambria Math" panose="02040503050406030204" pitchFamily="18" charset="0"/>
+                            </a:rPr>
+                          </m:ctrlPr>
+                        </m:dPr>
+                        <m:e>
+                          <m:r>
+                            <a:rPr lang="en-US" b="0" i="1" smtClean="0">
+                              <a:latin typeface="Cambria Math" panose="02040503050406030204" pitchFamily="18" charset="0"/>
+                            </a:rPr>
+                            <m:t>𝑥</m:t>
+                          </m:r>
+                          <m:r>
+                            <a:rPr lang="en-US" b="0" i="1" smtClean="0">
+                              <a:latin typeface="Cambria Math" panose="02040503050406030204" pitchFamily="18" charset="0"/>
+                            </a:rPr>
+                            <m:t>+</m:t>
+                          </m:r>
+                          <m:r>
+                            <a:rPr lang="en-US" b="0" i="1" smtClean="0">
+                              <a:latin typeface="Cambria Math" panose="02040503050406030204" pitchFamily="18" charset="0"/>
+                            </a:rPr>
+                            <m:t>𝑑𝑥</m:t>
+                          </m:r>
+                        </m:e>
+                      </m:d>
+                      <m:r>
+                        <a:rPr lang="en-US" b="0" i="1" smtClean="0">
+                          <a:latin typeface="Cambria Math" panose="02040503050406030204" pitchFamily="18" charset="0"/>
+                        </a:rPr>
+                        <m:t>=</m:t>
+                      </m:r>
+                      <m:r>
+                        <a:rPr lang="en-US" i="1">
+                          <a:latin typeface="Cambria Math" panose="02040503050406030204" pitchFamily="18" charset="0"/>
+                        </a:rPr>
+                        <m:t>𝑓</m:t>
+                      </m:r>
+                      <m:d>
+                        <m:dPr>
+                          <m:ctrlPr>
+                            <a:rPr lang="en-US" i="1">
+                              <a:latin typeface="Cambria Math" panose="02040503050406030204" pitchFamily="18" charset="0"/>
+                            </a:rPr>
+                          </m:ctrlPr>
+                        </m:dPr>
+                        <m:e>
+                          <m:r>
+                            <a:rPr lang="en-US" b="0" i="1" smtClean="0">
+                              <a:latin typeface="Cambria Math" panose="02040503050406030204" pitchFamily="18" charset="0"/>
+                            </a:rPr>
+                            <m:t>𝑥</m:t>
+                          </m:r>
+                        </m:e>
+                      </m:d>
+                      <m:r>
+                        <a:rPr lang="en-US" b="0" i="1" smtClean="0">
+                          <a:latin typeface="Cambria Math" panose="02040503050406030204" pitchFamily="18" charset="0"/>
+                        </a:rPr>
+                        <m:t>+</m:t>
+                      </m:r>
+                      <m:nary>
+                        <m:naryPr>
+                          <m:ctrlPr>
+                            <a:rPr lang="en-US" i="1">
+                              <a:latin typeface="Cambria Math" panose="02040503050406030204" pitchFamily="18" charset="0"/>
+                            </a:rPr>
+                          </m:ctrlPr>
+                        </m:naryPr>
+                        <m:sub>
+                          <m:r>
+                            <a:rPr lang="en-US" b="0" i="1" smtClean="0">
+                              <a:latin typeface="Cambria Math" panose="02040503050406030204" pitchFamily="18" charset="0"/>
+                            </a:rPr>
+                            <m:t>𝑥</m:t>
+                          </m:r>
+                        </m:sub>
+                        <m:sup>
+                          <m:r>
+                            <a:rPr lang="en-US" b="0" i="1" smtClean="0">
+                              <a:latin typeface="Cambria Math" panose="02040503050406030204" pitchFamily="18" charset="0"/>
+                            </a:rPr>
+                            <m:t>𝑥</m:t>
+                          </m:r>
+                          <m:r>
+                            <a:rPr lang="en-US" b="0" i="1" smtClean="0">
+                              <a:latin typeface="Cambria Math" panose="02040503050406030204" pitchFamily="18" charset="0"/>
+                            </a:rPr>
+                            <m:t>+</m:t>
+                          </m:r>
+                          <m:r>
+                            <a:rPr lang="en-US" b="0" i="1" smtClean="0">
+                              <a:latin typeface="Cambria Math" panose="02040503050406030204" pitchFamily="18" charset="0"/>
+                            </a:rPr>
+                            <m:t>𝑑𝑥</m:t>
+                          </m:r>
+                        </m:sup>
+                        <m:e>
+                          <m:r>
+                            <a:rPr lang="en-US" i="1">
+                              <a:latin typeface="Cambria Math" panose="02040503050406030204" pitchFamily="18" charset="0"/>
+                            </a:rPr>
+                            <m:t>𝑔</m:t>
+                          </m:r>
+                          <m:r>
+                            <a:rPr lang="en-US" i="1">
+                              <a:latin typeface="Cambria Math" panose="02040503050406030204" pitchFamily="18" charset="0"/>
+                            </a:rPr>
+                            <m:t>(</m:t>
+                          </m:r>
+                          <m:r>
+                            <a:rPr lang="en-US" b="0" i="1" smtClean="0">
+                              <a:latin typeface="Cambria Math" panose="02040503050406030204" pitchFamily="18" charset="0"/>
+                            </a:rPr>
+                            <m:t>𝑥</m:t>
+                          </m:r>
+                          <m:r>
+                            <a:rPr lang="en-US" b="0" i="1" smtClean="0">
+                              <a:latin typeface="Cambria Math" panose="02040503050406030204" pitchFamily="18" charset="0"/>
+                            </a:rPr>
+                            <m:t>′)</m:t>
+                          </m:r>
+                          <m:r>
+                            <a:rPr lang="en-US" i="1">
+                              <a:latin typeface="Cambria Math" panose="02040503050406030204" pitchFamily="18" charset="0"/>
+                            </a:rPr>
+                            <m:t>𝑑𝑥</m:t>
+                          </m:r>
+                          <m:r>
+                            <a:rPr lang="en-US" b="0" i="1" smtClean="0">
+                              <a:latin typeface="Cambria Math" panose="02040503050406030204" pitchFamily="18" charset="0"/>
+                            </a:rPr>
+                            <m:t>′</m:t>
+                          </m:r>
+                        </m:e>
+                      </m:nary>
+                      <m:r>
+                        <a:rPr lang="en-US" b="0" i="1" smtClean="0">
+                          <a:latin typeface="Cambria Math" panose="02040503050406030204" pitchFamily="18" charset="0"/>
+                        </a:rPr>
+                        <m:t>≈</m:t>
+                      </m:r>
+                      <m:r>
+                        <a:rPr lang="en-US" b="0" i="1" smtClean="0">
+                          <a:latin typeface="Cambria Math" panose="02040503050406030204" pitchFamily="18" charset="0"/>
+                        </a:rPr>
+                        <m:t>𝑓</m:t>
+                      </m:r>
+                      <m:d>
+                        <m:dPr>
+                          <m:ctrlPr>
+                            <a:rPr lang="en-US" b="0" i="1" smtClean="0">
+                              <a:latin typeface="Cambria Math" panose="02040503050406030204" pitchFamily="18" charset="0"/>
+                            </a:rPr>
+                          </m:ctrlPr>
+                        </m:dPr>
+                        <m:e>
+                          <m:r>
+                            <a:rPr lang="en-US" b="0" i="1" smtClean="0">
+                              <a:latin typeface="Cambria Math" panose="02040503050406030204" pitchFamily="18" charset="0"/>
+                            </a:rPr>
+                            <m:t>𝑥</m:t>
+                          </m:r>
+                        </m:e>
+                      </m:d>
+                      <m:r>
+                        <a:rPr lang="en-US" b="0" i="1" smtClean="0">
+                          <a:latin typeface="Cambria Math" panose="02040503050406030204" pitchFamily="18" charset="0"/>
+                        </a:rPr>
+                        <m:t>+</m:t>
+                      </m:r>
+                      <m:r>
+                        <a:rPr lang="en-US" b="0" i="1" smtClean="0">
+                          <a:latin typeface="Cambria Math" panose="02040503050406030204" pitchFamily="18" charset="0"/>
+                        </a:rPr>
+                        <m:t>𝑔</m:t>
+                      </m:r>
+                      <m:d>
+                        <m:dPr>
+                          <m:ctrlPr>
+                            <a:rPr lang="en-US" b="0" i="1" smtClean="0">
+                              <a:latin typeface="Cambria Math" panose="02040503050406030204" pitchFamily="18" charset="0"/>
+                            </a:rPr>
+                          </m:ctrlPr>
+                        </m:dPr>
+                        <m:e>
+                          <m:r>
+                            <a:rPr lang="en-US" b="0" i="1" smtClean="0">
+                              <a:latin typeface="Cambria Math" panose="02040503050406030204" pitchFamily="18" charset="0"/>
+                            </a:rPr>
+                            <m:t>𝑥</m:t>
+                          </m:r>
+                          <m:r>
+                            <a:rPr lang="en-US" b="0" i="1" smtClean="0">
+                              <a:latin typeface="Cambria Math" panose="02040503050406030204" pitchFamily="18" charset="0"/>
+                            </a:rPr>
+                            <m:t>+</m:t>
+                          </m:r>
+                          <m:f>
+                            <m:fPr>
+                              <m:ctrlPr>
+                                <a:rPr lang="en-US" b="0" i="1" smtClean="0">
+                                  <a:latin typeface="Cambria Math" panose="02040503050406030204" pitchFamily="18" charset="0"/>
+                                </a:rPr>
+                              </m:ctrlPr>
+                            </m:fPr>
+                            <m:num>
+                              <m:r>
+                                <a:rPr lang="en-US" i="1">
+                                  <a:latin typeface="Cambria Math" panose="02040503050406030204" pitchFamily="18" charset="0"/>
+                                </a:rPr>
+                                <m:t>𝑑𝑥</m:t>
+                              </m:r>
+                            </m:num>
+                            <m:den>
+                              <m:r>
+                                <a:rPr lang="en-US" b="0" i="1" smtClean="0">
+                                  <a:latin typeface="Cambria Math" panose="02040503050406030204" pitchFamily="18" charset="0"/>
+                                </a:rPr>
+                                <m:t>2</m:t>
+                              </m:r>
+                            </m:den>
+                          </m:f>
+                        </m:e>
+                      </m:d>
+                      <m:r>
+                        <a:rPr lang="en-US" b="0" i="1" smtClean="0">
+                          <a:latin typeface="Cambria Math" panose="02040503050406030204" pitchFamily="18" charset="0"/>
+                        </a:rPr>
+                        <m:t>𝑑𝑥</m:t>
+                      </m:r>
+                    </m:oMath>
+                  </m:oMathPara>
+                </a14:m>
+                <a:endParaRPr lang="en-US" dirty="0"/>
+              </a:p>
+            </p:txBody>
+          </p:sp>
+        </mc:Choice>
+        <mc:Fallback>
+          <p:sp>
+            <p:nvSpPr>
+              <p:cNvPr id="9" name="TextBox 8">
+                <a:extLst>
+                  <a:ext uri="{FF2B5EF4-FFF2-40B4-BE49-F238E27FC236}">
+                    <a16:creationId xmlns:a16="http://schemas.microsoft.com/office/drawing/2014/main" id="{51E8A71C-7B24-4DBB-A905-0C49DD1133AD}"/>
+                  </a:ext>
+                </a:extLst>
+              </p:cNvPr>
+              <p:cNvSpPr txBox="1">
+                <a:spLocks noRot="1" noChangeAspect="1" noMove="1" noResize="1" noEditPoints="1" noAdjustHandles="1" noChangeArrowheads="1" noChangeShapeType="1" noTextEdit="1"/>
+              </p:cNvSpPr>
+              <p:nvPr/>
+            </p:nvSpPr>
+            <p:spPr>
+              <a:xfrm>
+                <a:off x="1204453" y="4253463"/>
+                <a:ext cx="6172844" cy="729110"/>
+              </a:xfrm>
+              <a:prstGeom prst="rect">
+                <a:avLst/>
+              </a:prstGeom>
+              <a:blipFill>
+                <a:blip r:embed="rId6"/>
+                <a:stretch>
+                  <a:fillRect/>
+                </a:stretch>
+              </a:blipFill>
+            </p:spPr>
+            <p:txBody>
+              <a:bodyPr/>
+              <a:lstStyle/>
+              <a:p>
+                <a:r>
+                  <a:rPr lang="en-US">
+                    <a:noFill/>
+                  </a:rPr>
+                  <a:t> </a:t>
+                </a:r>
+              </a:p>
+            </p:txBody>
+          </p:sp>
+        </mc:Fallback>
+      </mc:AlternateContent>
+    </p:spTree>
+    <p:extLst>
+      <p:ext uri="{BB962C8B-B14F-4D97-AF65-F5344CB8AC3E}">
+        <p14:creationId xmlns:p14="http://schemas.microsoft.com/office/powerpoint/2010/main" val="646025802"/>
+      </p:ext>
+    </p:extLst>
+  </p:cSld>
+  <p:clrMapOvr>
+    <a:masterClrMapping/>
+  </p:clrMapOvr>
+</p:sld>
+</file>
+
+<file path=ppt/slides/slide5.xml><?xml version="1.0" encoding="utf-8"?>
+<p:sld xmlns:a="http://schemas.openxmlformats.org/drawingml/2006/main" xmlns:r="http://schemas.openxmlformats.org/officeDocument/2006/relationships" xmlns:p="http://schemas.openxmlformats.org/presentationml/2006/main">
+  <p:cSld>
+    <p:spTree>
+      <p:nvGrpSpPr>
+        <p:cNvPr id="1" name=""/>
+        <p:cNvGrpSpPr/>
+        <p:nvPr/>
+      </p:nvGrpSpPr>
+      <p:grpSpPr>
+        <a:xfrm>
+          <a:off x="0" y="0"/>
+          <a:ext cx="0" cy="0"/>
+          <a:chOff x="0" y="0"/>
+          <a:chExt cx="0" cy="0"/>
+        </a:xfrm>
+      </p:grpSpPr>
+      <p:sp>
+        <p:nvSpPr>
+          <p:cNvPr id="4" name="Rectangle 3">
+            <a:extLst>
+              <a:ext uri="{FF2B5EF4-FFF2-40B4-BE49-F238E27FC236}">
+                <a16:creationId xmlns:a16="http://schemas.microsoft.com/office/drawing/2014/main" id="{7E3FE447-1E78-9D67-B6C1-4BB53332EE79}"/>
+              </a:ext>
+            </a:extLst>
+          </p:cNvPr>
+          <p:cNvSpPr/>
+          <p:nvPr/>
+        </p:nvSpPr>
+        <p:spPr>
+          <a:xfrm>
+            <a:off x="3529782" y="963561"/>
+            <a:ext cx="4409768" cy="4365523"/>
+          </a:xfrm>
+          <a:prstGeom prst="rect">
+            <a:avLst/>
+          </a:prstGeom>
+        </p:spPr>
+        <p:style>
+          <a:lnRef idx="2">
+            <a:schemeClr val="accent1">
+              <a:shade val="50000"/>
+            </a:schemeClr>
+          </a:lnRef>
+          <a:fillRef idx="1">
+            <a:schemeClr val="accent1"/>
+          </a:fillRef>
+          <a:effectRef idx="0">
+            <a:schemeClr val="accent1"/>
+          </a:effectRef>
+          <a:fontRef idx="minor">
+            <a:schemeClr val="lt1"/>
+          </a:fontRef>
+        </p:style>
+        <p:txBody>
+          <a:bodyPr rtlCol="0" anchor="ctr"/>
+          <a:lstStyle/>
+          <a:p>
+            <a:pPr algn="ctr"/>
+            <a:endParaRPr lang="en-US"/>
+          </a:p>
+        </p:txBody>
+      </p:sp>
+      <p:sp>
+        <p:nvSpPr>
+          <p:cNvPr id="5" name="Oval 4">
+            <a:extLst>
+              <a:ext uri="{FF2B5EF4-FFF2-40B4-BE49-F238E27FC236}">
+                <a16:creationId xmlns:a16="http://schemas.microsoft.com/office/drawing/2014/main" id="{912956DA-32D9-E476-0933-8570714CD25B}"/>
+              </a:ext>
+            </a:extLst>
+          </p:cNvPr>
+          <p:cNvSpPr/>
+          <p:nvPr/>
+        </p:nvSpPr>
+        <p:spPr>
+          <a:xfrm>
+            <a:off x="3529781" y="963560"/>
+            <a:ext cx="4409768" cy="4365523"/>
+          </a:xfrm>
+          <a:prstGeom prst="ellipse">
+            <a:avLst/>
+          </a:prstGeom>
+          <a:solidFill>
+            <a:srgbClr val="FF0000"/>
+          </a:solidFill>
+        </p:spPr>
+        <p:style>
+          <a:lnRef idx="2">
+            <a:schemeClr val="accent1">
+              <a:shade val="50000"/>
+            </a:schemeClr>
+          </a:lnRef>
+          <a:fillRef idx="1">
+            <a:schemeClr val="accent1"/>
+          </a:fillRef>
+          <a:effectRef idx="0">
+            <a:schemeClr val="accent1"/>
+          </a:effectRef>
+          <a:fontRef idx="minor">
+            <a:schemeClr val="lt1"/>
+          </a:fontRef>
+        </p:style>
+        <p:txBody>
+          <a:bodyPr rtlCol="0" anchor="ctr"/>
+          <a:lstStyle/>
+          <a:p>
+            <a:pPr algn="ctr"/>
+            <a:endParaRPr lang="en-US"/>
+          </a:p>
+        </p:txBody>
+      </p:sp>
+      <p:sp>
+        <p:nvSpPr>
+          <p:cNvPr id="6" name="TextBox 5">
+            <a:extLst>
+              <a:ext uri="{FF2B5EF4-FFF2-40B4-BE49-F238E27FC236}">
+                <a16:creationId xmlns:a16="http://schemas.microsoft.com/office/drawing/2014/main" id="{EC05E3FE-CD3F-4EDA-2A34-00A2C2F1385D}"/>
+              </a:ext>
+            </a:extLst>
+          </p:cNvPr>
+          <p:cNvSpPr txBox="1"/>
+          <p:nvPr/>
+        </p:nvSpPr>
+        <p:spPr>
+          <a:xfrm>
+            <a:off x="3431458" y="5840361"/>
+            <a:ext cx="4650632" cy="369332"/>
+          </a:xfrm>
+          <a:prstGeom prst="rect">
+            <a:avLst/>
+          </a:prstGeom>
+          <a:noFill/>
+        </p:spPr>
+        <p:txBody>
+          <a:bodyPr wrap="none" rtlCol="0">
+            <a:spAutoFit/>
+          </a:bodyPr>
+          <a:lstStyle/>
+          <a:p>
+            <a:r>
+              <a:rPr lang="en-US" dirty="0"/>
+              <a:t>0                                                                                2</a:t>
+            </a:r>
+          </a:p>
+        </p:txBody>
+      </p:sp>
+      <mc:AlternateContent xmlns:mc="http://schemas.openxmlformats.org/markup-compatibility/2006">
+        <mc:Choice xmlns:a14="http://schemas.microsoft.com/office/drawing/2010/main" Requires="a14">
+          <p:sp>
+            <p:nvSpPr>
+              <p:cNvPr id="7" name="TextBox 6">
+                <a:extLst>
+                  <a:ext uri="{FF2B5EF4-FFF2-40B4-BE49-F238E27FC236}">
+                    <a16:creationId xmlns:a16="http://schemas.microsoft.com/office/drawing/2014/main" id="{48E2FE94-8A15-2948-B228-70958E647586}"/>
+                  </a:ext>
+                </a:extLst>
+              </p:cNvPr>
+              <p:cNvSpPr txBox="1"/>
+              <p:nvPr/>
+            </p:nvSpPr>
+            <p:spPr>
+              <a:xfrm>
+                <a:off x="9085006" y="1317523"/>
+                <a:ext cx="1055865" cy="369332"/>
+              </a:xfrm>
+              <a:prstGeom prst="rect">
+                <a:avLst/>
+              </a:prstGeom>
+              <a:noFill/>
+            </p:spPr>
+            <p:txBody>
+              <a:bodyPr wrap="none" rtlCol="0">
+                <a:spAutoFit/>
+              </a:bodyPr>
+              <a:lstStyle/>
+              <a:p>
+                <a14:m>
+                  <m:oMathPara xmlns:m="http://schemas.openxmlformats.org/officeDocument/2006/math">
+                    <m:oMathParaPr>
+                      <m:jc m:val="centerGroup"/>
+                    </m:oMathParaPr>
+                    <m:oMath xmlns:m="http://schemas.openxmlformats.org/officeDocument/2006/math">
+                      <m:r>
+                        <a:rPr lang="en-US" b="0" i="1" smtClean="0">
+                          <a:latin typeface="Cambria Math" panose="02040503050406030204" pitchFamily="18" charset="0"/>
+                        </a:rPr>
+                        <m:t>𝐴</m:t>
+                      </m:r>
+                      <m:r>
+                        <a:rPr lang="en-US" b="0" i="1" smtClean="0">
+                          <a:latin typeface="Cambria Math" panose="02040503050406030204" pitchFamily="18" charset="0"/>
+                        </a:rPr>
+                        <m:t>=</m:t>
+                      </m:r>
+                      <m:r>
+                        <a:rPr lang="en-US" b="0" i="1" smtClean="0">
+                          <a:latin typeface="Cambria Math" panose="02040503050406030204" pitchFamily="18" charset="0"/>
+                        </a:rPr>
+                        <m:t>𝜋</m:t>
+                      </m:r>
+                      <m:sSup>
+                        <m:sSupPr>
+                          <m:ctrlPr>
+                            <a:rPr lang="en-US" b="0" i="1" smtClean="0">
+                              <a:latin typeface="Cambria Math" panose="02040503050406030204" pitchFamily="18" charset="0"/>
+                            </a:rPr>
+                          </m:ctrlPr>
+                        </m:sSupPr>
+                        <m:e>
+                          <m:r>
+                            <a:rPr lang="en-US" b="0" i="1" smtClean="0">
+                              <a:latin typeface="Cambria Math" panose="02040503050406030204" pitchFamily="18" charset="0"/>
+                            </a:rPr>
+                            <m:t>𝑟</m:t>
+                          </m:r>
+                        </m:e>
+                        <m:sup>
+                          <m:r>
+                            <a:rPr lang="en-US" b="0" i="1" smtClean="0">
+                              <a:latin typeface="Cambria Math" panose="02040503050406030204" pitchFamily="18" charset="0"/>
+                            </a:rPr>
+                            <m:t>2</m:t>
+                          </m:r>
+                        </m:sup>
+                      </m:sSup>
+                    </m:oMath>
+                  </m:oMathPara>
+                </a14:m>
+                <a:endParaRPr lang="en-US" dirty="0"/>
+              </a:p>
+            </p:txBody>
+          </p:sp>
+        </mc:Choice>
+        <mc:Fallback>
+          <p:sp>
+            <p:nvSpPr>
+              <p:cNvPr id="7" name="TextBox 6">
+                <a:extLst>
+                  <a:ext uri="{FF2B5EF4-FFF2-40B4-BE49-F238E27FC236}">
+                    <a16:creationId xmlns:a16="http://schemas.microsoft.com/office/drawing/2014/main" id="{48E2FE94-8A15-2948-B228-70958E647586}"/>
+                  </a:ext>
+                </a:extLst>
+              </p:cNvPr>
+              <p:cNvSpPr txBox="1">
+                <a:spLocks noRot="1" noChangeAspect="1" noMove="1" noResize="1" noEditPoints="1" noAdjustHandles="1" noChangeArrowheads="1" noChangeShapeType="1" noTextEdit="1"/>
+              </p:cNvSpPr>
+              <p:nvPr/>
+            </p:nvSpPr>
+            <p:spPr>
+              <a:xfrm>
+                <a:off x="9085006" y="1317523"/>
+                <a:ext cx="1055865" cy="369332"/>
+              </a:xfrm>
+              <a:prstGeom prst="rect">
+                <a:avLst/>
+              </a:prstGeom>
+              <a:blipFill>
+                <a:blip r:embed="rId2"/>
+                <a:stretch>
+                  <a:fillRect/>
+                </a:stretch>
+              </a:blipFill>
+            </p:spPr>
+            <p:txBody>
+              <a:bodyPr/>
+              <a:lstStyle/>
+              <a:p>
+                <a:r>
+                  <a:rPr lang="en-US">
+                    <a:noFill/>
+                  </a:rPr>
+                  <a:t> </a:t>
+                </a:r>
+              </a:p>
+            </p:txBody>
+          </p:sp>
+        </mc:Fallback>
+      </mc:AlternateContent>
+      <mc:AlternateContent xmlns:mc="http://schemas.openxmlformats.org/markup-compatibility/2006">
+        <mc:Choice xmlns:a14="http://schemas.microsoft.com/office/drawing/2010/main" Requires="a14">
+          <p:sp>
+            <p:nvSpPr>
+              <p:cNvPr id="8" name="TextBox 7">
+                <a:extLst>
+                  <a:ext uri="{FF2B5EF4-FFF2-40B4-BE49-F238E27FC236}">
+                    <a16:creationId xmlns:a16="http://schemas.microsoft.com/office/drawing/2014/main" id="{FCCE2B6C-AAFF-BCAA-4184-2F7CE58F617D}"/>
+                  </a:ext>
+                </a:extLst>
+              </p:cNvPr>
+              <p:cNvSpPr txBox="1"/>
+              <p:nvPr/>
+            </p:nvSpPr>
+            <p:spPr>
+              <a:xfrm>
+                <a:off x="8898194" y="2163097"/>
+                <a:ext cx="1643783" cy="689997"/>
+              </a:xfrm>
+              <a:prstGeom prst="rect">
+                <a:avLst/>
+              </a:prstGeom>
+              <a:noFill/>
+            </p:spPr>
+            <p:txBody>
+              <a:bodyPr wrap="none" rtlCol="0">
+                <a:spAutoFit/>
+              </a:bodyPr>
+              <a:lstStyle/>
+              <a:p>
+                <a14:m>
+                  <m:oMathPara xmlns:m="http://schemas.openxmlformats.org/officeDocument/2006/math">
+                    <m:oMathParaPr>
+                      <m:jc m:val="centerGroup"/>
+                    </m:oMathParaPr>
+                    <m:oMath xmlns:m="http://schemas.openxmlformats.org/officeDocument/2006/math">
+                      <m:f>
+                        <m:fPr>
+                          <m:ctrlPr>
+                            <a:rPr lang="en-US" b="0" i="1" smtClean="0">
+                              <a:latin typeface="Cambria Math" panose="02040503050406030204" pitchFamily="18" charset="0"/>
+                            </a:rPr>
+                          </m:ctrlPr>
+                        </m:fPr>
+                        <m:num>
+                          <m:sSub>
+                            <m:sSubPr>
+                              <m:ctrlPr>
+                                <a:rPr lang="en-US" b="0" i="1" smtClean="0">
+                                  <a:latin typeface="Cambria Math" panose="02040503050406030204" pitchFamily="18" charset="0"/>
+                                </a:rPr>
+                              </m:ctrlPr>
+                            </m:sSubPr>
+                            <m:e>
+                              <m:r>
+                                <a:rPr lang="en-US" b="0" i="1" smtClean="0">
+                                  <a:latin typeface="Cambria Math" panose="02040503050406030204" pitchFamily="18" charset="0"/>
+                                </a:rPr>
+                                <m:t>𝑆</m:t>
+                              </m:r>
+                            </m:e>
+                            <m:sub>
+                              <m:r>
+                                <a:rPr lang="en-US" b="0" i="1" smtClean="0">
+                                  <a:latin typeface="Cambria Math" panose="02040503050406030204" pitchFamily="18" charset="0"/>
+                                </a:rPr>
+                                <m:t>𝑐𝑖𝑟</m:t>
+                              </m:r>
+                            </m:sub>
+                          </m:sSub>
+                        </m:num>
+                        <m:den>
+                          <m:sSub>
+                            <m:sSubPr>
+                              <m:ctrlPr>
+                                <a:rPr lang="en-US" i="1">
+                                  <a:latin typeface="Cambria Math" panose="02040503050406030204" pitchFamily="18" charset="0"/>
+                                </a:rPr>
+                              </m:ctrlPr>
+                            </m:sSubPr>
+                            <m:e>
+                              <m:r>
+                                <a:rPr lang="en-US" i="1">
+                                  <a:latin typeface="Cambria Math" panose="02040503050406030204" pitchFamily="18" charset="0"/>
+                                </a:rPr>
+                                <m:t>𝑆</m:t>
+                              </m:r>
+                            </m:e>
+                            <m:sub>
+                              <m:r>
+                                <a:rPr lang="en-US" i="1">
+                                  <a:latin typeface="Cambria Math" panose="02040503050406030204" pitchFamily="18" charset="0"/>
+                                </a:rPr>
+                                <m:t>𝑠𝑞</m:t>
+                              </m:r>
+                            </m:sub>
+                          </m:sSub>
+                        </m:den>
+                      </m:f>
+                      <m:r>
+                        <a:rPr lang="en-US" b="0" i="1" smtClean="0">
+                          <a:latin typeface="Cambria Math" panose="02040503050406030204" pitchFamily="18" charset="0"/>
+                        </a:rPr>
+                        <m:t>=</m:t>
+                      </m:r>
+                      <m:sSub>
+                        <m:sSubPr>
+                          <m:ctrlPr>
+                            <a:rPr lang="en-US" b="0" i="1" smtClean="0">
+                              <a:latin typeface="Cambria Math" panose="02040503050406030204" pitchFamily="18" charset="0"/>
+                            </a:rPr>
+                          </m:ctrlPr>
+                        </m:sSubPr>
+                        <m:e>
+                          <m:r>
+                            <a:rPr lang="en-US" b="0" i="1" smtClean="0">
+                              <a:latin typeface="Cambria Math" panose="02040503050406030204" pitchFamily="18" charset="0"/>
+                            </a:rPr>
+                            <m:t>𝑝</m:t>
+                          </m:r>
+                        </m:e>
+                        <m:sub>
+                          <m:r>
+                            <a:rPr lang="en-US" b="0" i="1" smtClean="0">
+                              <a:latin typeface="Cambria Math" panose="02040503050406030204" pitchFamily="18" charset="0"/>
+                            </a:rPr>
+                            <m:t>𝑖𝑛</m:t>
+                          </m:r>
+                        </m:sub>
+                      </m:sSub>
+                      <m:r>
+                        <a:rPr lang="en-US" b="0" i="1" smtClean="0">
+                          <a:latin typeface="Cambria Math" panose="02040503050406030204" pitchFamily="18" charset="0"/>
+                        </a:rPr>
+                        <m:t>=</m:t>
+                      </m:r>
+                      <m:f>
+                        <m:fPr>
+                          <m:ctrlPr>
+                            <a:rPr lang="en-US" b="0" i="1" smtClean="0">
+                              <a:latin typeface="Cambria Math" panose="02040503050406030204" pitchFamily="18" charset="0"/>
+                            </a:rPr>
+                          </m:ctrlPr>
+                        </m:fPr>
+                        <m:num>
+                          <m:r>
+                            <a:rPr lang="en-US" b="0" i="1" smtClean="0">
+                              <a:latin typeface="Cambria Math" panose="02040503050406030204" pitchFamily="18" charset="0"/>
+                            </a:rPr>
+                            <m:t>𝜋</m:t>
+                          </m:r>
+                        </m:num>
+                        <m:den>
+                          <m:r>
+                            <a:rPr lang="en-US" b="0" i="1" smtClean="0">
+                              <a:latin typeface="Cambria Math" panose="02040503050406030204" pitchFamily="18" charset="0"/>
+                            </a:rPr>
+                            <m:t>4</m:t>
+                          </m:r>
+                        </m:den>
+                      </m:f>
+                    </m:oMath>
+                  </m:oMathPara>
+                </a14:m>
+                <a:endParaRPr lang="en-US" dirty="0"/>
+              </a:p>
+            </p:txBody>
+          </p:sp>
+        </mc:Choice>
+        <mc:Fallback>
+          <p:sp>
+            <p:nvSpPr>
+              <p:cNvPr id="8" name="TextBox 7">
+                <a:extLst>
+                  <a:ext uri="{FF2B5EF4-FFF2-40B4-BE49-F238E27FC236}">
+                    <a16:creationId xmlns:a16="http://schemas.microsoft.com/office/drawing/2014/main" id="{FCCE2B6C-AAFF-BCAA-4184-2F7CE58F617D}"/>
+                  </a:ext>
+                </a:extLst>
+              </p:cNvPr>
+              <p:cNvSpPr txBox="1">
+                <a:spLocks noRot="1" noChangeAspect="1" noMove="1" noResize="1" noEditPoints="1" noAdjustHandles="1" noChangeArrowheads="1" noChangeShapeType="1" noTextEdit="1"/>
+              </p:cNvSpPr>
+              <p:nvPr/>
+            </p:nvSpPr>
+            <p:spPr>
+              <a:xfrm>
+                <a:off x="8898194" y="2163097"/>
+                <a:ext cx="1643783" cy="689997"/>
+              </a:xfrm>
+              <a:prstGeom prst="rect">
+                <a:avLst/>
+              </a:prstGeom>
+              <a:blipFill>
+                <a:blip r:embed="rId3"/>
+                <a:stretch>
+                  <a:fillRect/>
+                </a:stretch>
+              </a:blipFill>
+            </p:spPr>
+            <p:txBody>
+              <a:bodyPr/>
+              <a:lstStyle/>
+              <a:p>
+                <a:r>
+                  <a:rPr lang="en-US">
+                    <a:noFill/>
+                  </a:rPr>
+                  <a:t> </a:t>
+                </a:r>
+              </a:p>
+            </p:txBody>
+          </p:sp>
+        </mc:Fallback>
+      </mc:AlternateContent>
+    </p:spTree>
+    <p:extLst>
+      <p:ext uri="{BB962C8B-B14F-4D97-AF65-F5344CB8AC3E}">
+        <p14:creationId xmlns:p14="http://schemas.microsoft.com/office/powerpoint/2010/main" val="1409371328"/>
       </p:ext>
     </p:extLst>
   </p:cSld>

</xml_diff>

<commit_message>
Added today's lecture materials and also some stuff from the last week
</commit_message>
<xml_diff>
--- a/AlexeyAkimov/intergation_differentiation/theory.pptx
+++ b/AlexeyAkimov/intergation_differentiation/theory.pptx
@@ -263,7 +263,7 @@
           <a:p>
             <a:fld id="{972D2D44-3CA4-4BA8-8692-2B652D7EDDE5}" type="datetimeFigureOut">
               <a:rPr lang="en-US" smtClean="0"/>
-              <a:t>4/6/2023</a:t>
+              <a:t>4/13/2023</a:t>
             </a:fld>
             <a:endParaRPr lang="en-US"/>
           </a:p>
@@ -461,7 +461,7 @@
           <a:p>
             <a:fld id="{972D2D44-3CA4-4BA8-8692-2B652D7EDDE5}" type="datetimeFigureOut">
               <a:rPr lang="en-US" smtClean="0"/>
-              <a:t>4/6/2023</a:t>
+              <a:t>4/13/2023</a:t>
             </a:fld>
             <a:endParaRPr lang="en-US"/>
           </a:p>
@@ -669,7 +669,7 @@
           <a:p>
             <a:fld id="{972D2D44-3CA4-4BA8-8692-2B652D7EDDE5}" type="datetimeFigureOut">
               <a:rPr lang="en-US" smtClean="0"/>
-              <a:t>4/6/2023</a:t>
+              <a:t>4/13/2023</a:t>
             </a:fld>
             <a:endParaRPr lang="en-US"/>
           </a:p>
@@ -867,7 +867,7 @@
           <a:p>
             <a:fld id="{972D2D44-3CA4-4BA8-8692-2B652D7EDDE5}" type="datetimeFigureOut">
               <a:rPr lang="en-US" smtClean="0"/>
-              <a:t>4/6/2023</a:t>
+              <a:t>4/13/2023</a:t>
             </a:fld>
             <a:endParaRPr lang="en-US"/>
           </a:p>
@@ -1142,7 +1142,7 @@
           <a:p>
             <a:fld id="{972D2D44-3CA4-4BA8-8692-2B652D7EDDE5}" type="datetimeFigureOut">
               <a:rPr lang="en-US" smtClean="0"/>
-              <a:t>4/6/2023</a:t>
+              <a:t>4/13/2023</a:t>
             </a:fld>
             <a:endParaRPr lang="en-US"/>
           </a:p>
@@ -1407,7 +1407,7 @@
           <a:p>
             <a:fld id="{972D2D44-3CA4-4BA8-8692-2B652D7EDDE5}" type="datetimeFigureOut">
               <a:rPr lang="en-US" smtClean="0"/>
-              <a:t>4/6/2023</a:t>
+              <a:t>4/13/2023</a:t>
             </a:fld>
             <a:endParaRPr lang="en-US"/>
           </a:p>
@@ -1819,7 +1819,7 @@
           <a:p>
             <a:fld id="{972D2D44-3CA4-4BA8-8692-2B652D7EDDE5}" type="datetimeFigureOut">
               <a:rPr lang="en-US" smtClean="0"/>
-              <a:t>4/6/2023</a:t>
+              <a:t>4/13/2023</a:t>
             </a:fld>
             <a:endParaRPr lang="en-US"/>
           </a:p>
@@ -1960,7 +1960,7 @@
           <a:p>
             <a:fld id="{972D2D44-3CA4-4BA8-8692-2B652D7EDDE5}" type="datetimeFigureOut">
               <a:rPr lang="en-US" smtClean="0"/>
-              <a:t>4/6/2023</a:t>
+              <a:t>4/13/2023</a:t>
             </a:fld>
             <a:endParaRPr lang="en-US"/>
           </a:p>
@@ -2073,7 +2073,7 @@
           <a:p>
             <a:fld id="{972D2D44-3CA4-4BA8-8692-2B652D7EDDE5}" type="datetimeFigureOut">
               <a:rPr lang="en-US" smtClean="0"/>
-              <a:t>4/6/2023</a:t>
+              <a:t>4/13/2023</a:t>
             </a:fld>
             <a:endParaRPr lang="en-US"/>
           </a:p>
@@ -2384,7 +2384,7 @@
           <a:p>
             <a:fld id="{972D2D44-3CA4-4BA8-8692-2B652D7EDDE5}" type="datetimeFigureOut">
               <a:rPr lang="en-US" smtClean="0"/>
-              <a:t>4/6/2023</a:t>
+              <a:t>4/13/2023</a:t>
             </a:fld>
             <a:endParaRPr lang="en-US"/>
           </a:p>
@@ -2672,7 +2672,7 @@
           <a:p>
             <a:fld id="{972D2D44-3CA4-4BA8-8692-2B652D7EDDE5}" type="datetimeFigureOut">
               <a:rPr lang="en-US" smtClean="0"/>
-              <a:t>4/6/2023</a:t>
+              <a:t>4/13/2023</a:t>
             </a:fld>
             <a:endParaRPr lang="en-US"/>
           </a:p>
@@ -2913,7 +2913,7 @@
           <a:p>
             <a:fld id="{972D2D44-3CA4-4BA8-8692-2B652D7EDDE5}" type="datetimeFigureOut">
               <a:rPr lang="en-US" smtClean="0"/>
-              <a:t>4/6/2023</a:t>
+              <a:t>4/13/2023</a:t>
             </a:fld>
             <a:endParaRPr lang="en-US"/>
           </a:p>
@@ -5472,8 +5472,8 @@
           </a:p>
         </p:txBody>
       </p:sp>
-      <mc:AlternateContent xmlns:mc="http://schemas.openxmlformats.org/markup-compatibility/2006">
-        <mc:Choice xmlns:a14="http://schemas.microsoft.com/office/drawing/2010/main" Requires="a14">
+      <mc:AlternateContent xmlns:mc="http://schemas.openxmlformats.org/markup-compatibility/2006" xmlns:a14="http://schemas.microsoft.com/office/drawing/2010/main">
+        <mc:Choice Requires="a14">
           <p:sp>
             <p:nvSpPr>
               <p:cNvPr id="15" name="TextBox 14">
@@ -5685,7 +5685,7 @@
             </p:txBody>
           </p:sp>
         </mc:Choice>
-        <mc:Fallback>
+        <mc:Fallback xmlns="">
           <p:sp>
             <p:nvSpPr>
               <p:cNvPr id="15" name="TextBox 14">
@@ -6009,8 +6009,8 @@
           </a:p>
         </p:txBody>
       </p:sp>
-      <mc:AlternateContent xmlns:mc="http://schemas.openxmlformats.org/markup-compatibility/2006">
-        <mc:Choice xmlns:a14="http://schemas.microsoft.com/office/drawing/2010/main" Requires="a14">
+      <mc:AlternateContent xmlns:mc="http://schemas.openxmlformats.org/markup-compatibility/2006" xmlns:a14="http://schemas.microsoft.com/office/drawing/2010/main">
+        <mc:Choice Requires="a14">
           <p:sp>
             <p:nvSpPr>
               <p:cNvPr id="34" name="TextBox 33">
@@ -6039,6 +6039,7 @@
               </a:bodyPr>
               <a:lstStyle/>
               <a:p>
+                <a:pPr/>
                 <a14:m>
                   <m:oMathPara xmlns:m="http://schemas.openxmlformats.org/officeDocument/2006/math">
                     <m:oMathParaPr>
@@ -6200,7 +6201,7 @@
             </p:txBody>
           </p:sp>
         </mc:Choice>
-        <mc:Fallback>
+        <mc:Fallback xmlns="">
           <p:sp>
             <p:nvSpPr>
               <p:cNvPr id="34" name="TextBox 33">
@@ -6281,8 +6282,8 @@
           </a:fontRef>
         </p:style>
       </p:cxnSp>
-      <mc:AlternateContent xmlns:mc="http://schemas.openxmlformats.org/markup-compatibility/2006">
-        <mc:Choice xmlns:a14="http://schemas.microsoft.com/office/drawing/2010/main" Requires="a14">
+      <mc:AlternateContent xmlns:mc="http://schemas.openxmlformats.org/markup-compatibility/2006" xmlns:a14="http://schemas.microsoft.com/office/drawing/2010/main">
+        <mc:Choice Requires="a14">
           <p:sp>
             <p:nvSpPr>
               <p:cNvPr id="37" name="TextBox 36">
@@ -6417,7 +6418,7 @@
             </p:txBody>
           </p:sp>
         </mc:Choice>
-        <mc:Fallback>
+        <mc:Fallback xmlns="">
           <p:sp>
             <p:nvSpPr>
               <p:cNvPr id="37" name="TextBox 36">
@@ -6549,8 +6550,8 @@
           </a:fontRef>
         </p:style>
       </p:cxnSp>
-      <mc:AlternateContent xmlns:mc="http://schemas.openxmlformats.org/markup-compatibility/2006">
-        <mc:Choice xmlns:a14="http://schemas.microsoft.com/office/drawing/2010/main" Requires="a14">
+      <mc:AlternateContent xmlns:mc="http://schemas.openxmlformats.org/markup-compatibility/2006" xmlns:a14="http://schemas.microsoft.com/office/drawing/2010/main">
+        <mc:Choice Requires="a14">
           <p:sp>
             <p:nvSpPr>
               <p:cNvPr id="41" name="TextBox 40">
@@ -6579,6 +6580,7 @@
               </a:bodyPr>
               <a:lstStyle/>
               <a:p>
+                <a:pPr/>
                 <a14:m>
                   <m:oMathPara xmlns:m="http://schemas.openxmlformats.org/officeDocument/2006/math">
                     <m:oMathParaPr>
@@ -6654,7 +6656,7 @@
             </p:txBody>
           </p:sp>
         </mc:Choice>
-        <mc:Fallback>
+        <mc:Fallback xmlns="">
           <p:sp>
             <p:nvSpPr>
               <p:cNvPr id="41" name="TextBox 40">
@@ -6699,8 +6701,8 @@
           </p:sp>
         </mc:Fallback>
       </mc:AlternateContent>
-      <mc:AlternateContent xmlns:mc="http://schemas.openxmlformats.org/markup-compatibility/2006">
-        <mc:Choice xmlns:a14="http://schemas.microsoft.com/office/drawing/2010/main" Requires="a14">
+      <mc:AlternateContent xmlns:mc="http://schemas.openxmlformats.org/markup-compatibility/2006" xmlns:a14="http://schemas.microsoft.com/office/drawing/2010/main">
+        <mc:Choice Requires="a14">
           <p:sp>
             <p:nvSpPr>
               <p:cNvPr id="42" name="TextBox 41">
@@ -6729,6 +6731,7 @@
               </a:bodyPr>
               <a:lstStyle/>
               <a:p>
+                <a:pPr/>
                 <a14:m>
                   <m:oMathPara xmlns:m="http://schemas.openxmlformats.org/officeDocument/2006/math">
                     <m:oMathParaPr>
@@ -6792,7 +6795,7 @@
             </p:txBody>
           </p:sp>
         </mc:Choice>
-        <mc:Fallback>
+        <mc:Fallback xmlns="">
           <p:sp>
             <p:nvSpPr>
               <p:cNvPr id="42" name="TextBox 41">
@@ -6837,8 +6840,8 @@
           </p:sp>
         </mc:Fallback>
       </mc:AlternateContent>
-      <mc:AlternateContent xmlns:mc="http://schemas.openxmlformats.org/markup-compatibility/2006">
-        <mc:Choice xmlns:a14="http://schemas.microsoft.com/office/drawing/2010/main" Requires="a14">
+      <mc:AlternateContent xmlns:mc="http://schemas.openxmlformats.org/markup-compatibility/2006" xmlns:a14="http://schemas.microsoft.com/office/drawing/2010/main">
+        <mc:Choice Requires="a14">
           <p:sp>
             <p:nvSpPr>
               <p:cNvPr id="43" name="TextBox 42">
@@ -6867,6 +6870,7 @@
               </a:bodyPr>
               <a:lstStyle/>
               <a:p>
+                <a:pPr/>
                 <a14:m>
                   <m:oMathPara xmlns:m="http://schemas.openxmlformats.org/officeDocument/2006/math">
                     <m:oMathParaPr>
@@ -7035,7 +7039,7 @@
             </p:txBody>
           </p:sp>
         </mc:Choice>
-        <mc:Fallback>
+        <mc:Fallback xmlns="">
           <p:sp>
             <p:nvSpPr>
               <p:cNvPr id="43" name="TextBox 42">
@@ -7110,8 +7114,8 @@
           <a:chExt cx="0" cy="0"/>
         </a:xfrm>
       </p:grpSpPr>
-      <mc:AlternateContent xmlns:mc="http://schemas.openxmlformats.org/markup-compatibility/2006">
-        <mc:Choice xmlns:a14="http://schemas.microsoft.com/office/drawing/2010/main" Requires="a14">
+      <mc:AlternateContent xmlns:mc="http://schemas.openxmlformats.org/markup-compatibility/2006" xmlns:a14="http://schemas.microsoft.com/office/drawing/2010/main">
+        <mc:Choice Requires="a14">
           <p:sp>
             <p:nvSpPr>
               <p:cNvPr id="4" name="TextBox 3">
@@ -7140,6 +7144,7 @@
               </a:bodyPr>
               <a:lstStyle/>
               <a:p>
+                <a:pPr/>
                 <a14:m>
                   <m:oMathPara xmlns:m="http://schemas.openxmlformats.org/officeDocument/2006/math">
                     <m:oMathParaPr>
@@ -7209,7 +7214,7 @@
             </p:txBody>
           </p:sp>
         </mc:Choice>
-        <mc:Fallback>
+        <mc:Fallback xmlns="">
           <p:sp>
             <p:nvSpPr>
               <p:cNvPr id="4" name="TextBox 3">
@@ -7254,8 +7259,8 @@
           </p:sp>
         </mc:Fallback>
       </mc:AlternateContent>
-      <mc:AlternateContent xmlns:mc="http://schemas.openxmlformats.org/markup-compatibility/2006">
-        <mc:Choice xmlns:a14="http://schemas.microsoft.com/office/drawing/2010/main" Requires="a14">
+      <mc:AlternateContent xmlns:mc="http://schemas.openxmlformats.org/markup-compatibility/2006" xmlns:a14="http://schemas.microsoft.com/office/drawing/2010/main">
+        <mc:Choice Requires="a14">
           <p:sp>
             <p:nvSpPr>
               <p:cNvPr id="5" name="TextBox 4">
@@ -7284,6 +7289,7 @@
               </a:bodyPr>
               <a:lstStyle/>
               <a:p>
+                <a:pPr/>
                 <a14:m>
                   <m:oMathPara xmlns:m="http://schemas.openxmlformats.org/officeDocument/2006/math">
                     <m:oMathParaPr>
@@ -7472,7 +7478,7 @@
             </p:txBody>
           </p:sp>
         </mc:Choice>
-        <mc:Fallback>
+        <mc:Fallback xmlns="">
           <p:sp>
             <p:nvSpPr>
               <p:cNvPr id="5" name="TextBox 4">
@@ -7552,8 +7558,8 @@
           </a:p>
         </p:txBody>
       </p:sp>
-      <mc:AlternateContent xmlns:mc="http://schemas.openxmlformats.org/markup-compatibility/2006">
-        <mc:Choice xmlns:a14="http://schemas.microsoft.com/office/drawing/2010/main" Requires="a14">
+      <mc:AlternateContent xmlns:mc="http://schemas.openxmlformats.org/markup-compatibility/2006" xmlns:a14="http://schemas.microsoft.com/office/drawing/2010/main">
+        <mc:Choice Requires="a14">
           <p:sp>
             <p:nvSpPr>
               <p:cNvPr id="7" name="TextBox 6">
@@ -7582,6 +7588,7 @@
               </a:bodyPr>
               <a:lstStyle/>
               <a:p>
+                <a:pPr/>
                 <a14:m>
                   <m:oMathPara xmlns:m="http://schemas.openxmlformats.org/officeDocument/2006/math">
                     <m:oMathParaPr>
@@ -7667,6 +7674,7 @@
                 <a:endParaRPr lang="en-US" b="0" dirty="0"/>
               </a:p>
               <a:p>
+                <a:pPr/>
                 <a14:m>
                   <m:oMathPara xmlns:m="http://schemas.openxmlformats.org/officeDocument/2006/math">
                     <m:oMathParaPr>
@@ -7718,7 +7726,7 @@
             </p:txBody>
           </p:sp>
         </mc:Choice>
-        <mc:Fallback>
+        <mc:Fallback xmlns="">
           <p:sp>
             <p:nvSpPr>
               <p:cNvPr id="7" name="TextBox 6">
@@ -7763,8 +7771,8 @@
           </p:sp>
         </mc:Fallback>
       </mc:AlternateContent>
-      <mc:AlternateContent xmlns:mc="http://schemas.openxmlformats.org/markup-compatibility/2006">
-        <mc:Choice xmlns:a14="http://schemas.microsoft.com/office/drawing/2010/main" Requires="a14">
+      <mc:AlternateContent xmlns:mc="http://schemas.openxmlformats.org/markup-compatibility/2006" xmlns:a14="http://schemas.microsoft.com/office/drawing/2010/main">
+        <mc:Choice Requires="a14">
           <p:sp>
             <p:nvSpPr>
               <p:cNvPr id="8" name="TextBox 7">
@@ -7793,6 +7801,7 @@
               </a:bodyPr>
               <a:lstStyle/>
               <a:p>
+                <a:pPr/>
                 <a14:m>
                   <m:oMathPara xmlns:m="http://schemas.openxmlformats.org/officeDocument/2006/math">
                     <m:oMathParaPr>
@@ -7966,7 +7975,7 @@
             </p:txBody>
           </p:sp>
         </mc:Choice>
-        <mc:Fallback>
+        <mc:Fallback xmlns="">
           <p:sp>
             <p:nvSpPr>
               <p:cNvPr id="8" name="TextBox 7">
@@ -8011,8 +8020,8 @@
           </p:sp>
         </mc:Fallback>
       </mc:AlternateContent>
-      <mc:AlternateContent xmlns:mc="http://schemas.openxmlformats.org/markup-compatibility/2006">
-        <mc:Choice xmlns:a14="http://schemas.microsoft.com/office/drawing/2010/main" Requires="a14">
+      <mc:AlternateContent xmlns:mc="http://schemas.openxmlformats.org/markup-compatibility/2006" xmlns:a14="http://schemas.microsoft.com/office/drawing/2010/main">
+        <mc:Choice Requires="a14">
           <p:sp>
             <p:nvSpPr>
               <p:cNvPr id="9" name="TextBox 8">
@@ -8041,6 +8050,7 @@
               </a:bodyPr>
               <a:lstStyle/>
               <a:p>
+                <a:pPr/>
                 <a14:m>
                   <m:oMathPara xmlns:m="http://schemas.openxmlformats.org/officeDocument/2006/math">
                     <m:oMathParaPr>
@@ -8295,7 +8305,7 @@
             </p:txBody>
           </p:sp>
         </mc:Choice>
-        <mc:Fallback>
+        <mc:Fallback xmlns="">
           <p:sp>
             <p:nvSpPr>
               <p:cNvPr id="9" name="TextBox 8">
@@ -8320,6 +8330,553 @@
               </a:prstGeom>
               <a:blipFill>
                 <a:blip r:embed="rId6"/>
+                <a:stretch>
+                  <a:fillRect/>
+                </a:stretch>
+              </a:blipFill>
+            </p:spPr>
+            <p:txBody>
+              <a:bodyPr/>
+              <a:lstStyle/>
+              <a:p>
+                <a:r>
+                  <a:rPr lang="en-US">
+                    <a:noFill/>
+                  </a:rPr>
+                  <a:t> </a:t>
+                </a:r>
+              </a:p>
+            </p:txBody>
+          </p:sp>
+        </mc:Fallback>
+      </mc:AlternateContent>
+      <mc:AlternateContent xmlns:mc="http://schemas.openxmlformats.org/markup-compatibility/2006">
+        <mc:Choice xmlns:a14="http://schemas.microsoft.com/office/drawing/2010/main" Requires="a14">
+          <p:sp>
+            <p:nvSpPr>
+              <p:cNvPr id="2" name="TextBox 1">
+                <a:extLst>
+                  <a:ext uri="{FF2B5EF4-FFF2-40B4-BE49-F238E27FC236}">
+                    <a16:creationId xmlns:a16="http://schemas.microsoft.com/office/drawing/2014/main" id="{DCEB59F9-920B-BBF0-2F98-E8024243D131}"/>
+                  </a:ext>
+                </a:extLst>
+              </p:cNvPr>
+              <p:cNvSpPr txBox="1"/>
+              <p:nvPr/>
+            </p:nvSpPr>
+            <p:spPr>
+              <a:xfrm>
+                <a:off x="4916131" y="5736361"/>
+                <a:ext cx="6405793" cy="729110"/>
+              </a:xfrm>
+              <a:prstGeom prst="rect">
+                <a:avLst/>
+              </a:prstGeom>
+              <a:noFill/>
+            </p:spPr>
+            <p:txBody>
+              <a:bodyPr wrap="none" rtlCol="0">
+                <a:spAutoFit/>
+              </a:bodyPr>
+              <a:lstStyle/>
+              <a:p>
+                <a:pPr/>
+                <a14:m>
+                  <m:oMathPara xmlns:m="http://schemas.openxmlformats.org/officeDocument/2006/math">
+                    <m:oMathParaPr>
+                      <m:jc m:val="centerGroup"/>
+                    </m:oMathParaPr>
+                    <m:oMath xmlns:m="http://schemas.openxmlformats.org/officeDocument/2006/math">
+                      <m:r>
+                        <a:rPr lang="en-US" b="0" i="1" smtClean="0">
+                          <a:latin typeface="Cambria Math" panose="02040503050406030204" pitchFamily="18" charset="0"/>
+                        </a:rPr>
+                        <m:t>𝑥</m:t>
+                      </m:r>
+                      <m:d>
+                        <m:dPr>
+                          <m:ctrlPr>
+                            <a:rPr lang="en-US" b="0" i="1" smtClean="0">
+                              <a:latin typeface="Cambria Math" panose="02040503050406030204" pitchFamily="18" charset="0"/>
+                            </a:rPr>
+                          </m:ctrlPr>
+                        </m:dPr>
+                        <m:e>
+                          <m:r>
+                            <a:rPr lang="en-US" b="0" i="1" smtClean="0">
+                              <a:latin typeface="Cambria Math" panose="02040503050406030204" pitchFamily="18" charset="0"/>
+                            </a:rPr>
+                            <m:t>𝑡</m:t>
+                          </m:r>
+                          <m:r>
+                            <a:rPr lang="en-US" b="0" i="1" smtClean="0">
+                              <a:latin typeface="Cambria Math" panose="02040503050406030204" pitchFamily="18" charset="0"/>
+                            </a:rPr>
+                            <m:t>+</m:t>
+                          </m:r>
+                          <m:r>
+                            <a:rPr lang="en-US" b="0" i="1" smtClean="0">
+                              <a:latin typeface="Cambria Math" panose="02040503050406030204" pitchFamily="18" charset="0"/>
+                            </a:rPr>
+                            <m:t>𝑑𝑡</m:t>
+                          </m:r>
+                        </m:e>
+                      </m:d>
+                      <m:r>
+                        <a:rPr lang="en-US" b="0" i="1" smtClean="0">
+                          <a:latin typeface="Cambria Math" panose="02040503050406030204" pitchFamily="18" charset="0"/>
+                        </a:rPr>
+                        <m:t>=</m:t>
+                      </m:r>
+                      <m:r>
+                        <a:rPr lang="en-US" b="0" i="1" smtClean="0">
+                          <a:latin typeface="Cambria Math" panose="02040503050406030204" pitchFamily="18" charset="0"/>
+                        </a:rPr>
+                        <m:t>𝑥</m:t>
+                      </m:r>
+                      <m:d>
+                        <m:dPr>
+                          <m:ctrlPr>
+                            <a:rPr lang="en-US" i="1">
+                              <a:latin typeface="Cambria Math" panose="02040503050406030204" pitchFamily="18" charset="0"/>
+                            </a:rPr>
+                          </m:ctrlPr>
+                        </m:dPr>
+                        <m:e>
+                          <m:r>
+                            <a:rPr lang="en-US" b="0" i="1" smtClean="0">
+                              <a:latin typeface="Cambria Math" panose="02040503050406030204" pitchFamily="18" charset="0"/>
+                            </a:rPr>
+                            <m:t>𝑡</m:t>
+                          </m:r>
+                        </m:e>
+                      </m:d>
+                      <m:r>
+                        <a:rPr lang="en-US" b="0" i="1" smtClean="0">
+                          <a:latin typeface="Cambria Math" panose="02040503050406030204" pitchFamily="18" charset="0"/>
+                        </a:rPr>
+                        <m:t>+</m:t>
+                      </m:r>
+                      <m:nary>
+                        <m:naryPr>
+                          <m:ctrlPr>
+                            <a:rPr lang="en-US" i="1">
+                              <a:latin typeface="Cambria Math" panose="02040503050406030204" pitchFamily="18" charset="0"/>
+                            </a:rPr>
+                          </m:ctrlPr>
+                        </m:naryPr>
+                        <m:sub>
+                          <m:r>
+                            <a:rPr lang="en-US" b="0" i="1" smtClean="0">
+                              <a:latin typeface="Cambria Math" panose="02040503050406030204" pitchFamily="18" charset="0"/>
+                            </a:rPr>
+                            <m:t>𝑡</m:t>
+                          </m:r>
+                        </m:sub>
+                        <m:sup>
+                          <m:r>
+                            <a:rPr lang="en-US" b="0" i="1" smtClean="0">
+                              <a:latin typeface="Cambria Math" panose="02040503050406030204" pitchFamily="18" charset="0"/>
+                            </a:rPr>
+                            <m:t>𝑡</m:t>
+                          </m:r>
+                          <m:r>
+                            <a:rPr lang="en-US" b="0" i="1" smtClean="0">
+                              <a:latin typeface="Cambria Math" panose="02040503050406030204" pitchFamily="18" charset="0"/>
+                            </a:rPr>
+                            <m:t>+</m:t>
+                          </m:r>
+                          <m:r>
+                            <a:rPr lang="en-US" b="0" i="1" smtClean="0">
+                              <a:latin typeface="Cambria Math" panose="02040503050406030204" pitchFamily="18" charset="0"/>
+                            </a:rPr>
+                            <m:t>𝑑𝑡</m:t>
+                          </m:r>
+                        </m:sup>
+                        <m:e>
+                          <m:r>
+                            <a:rPr lang="en-US" i="1">
+                              <a:latin typeface="Cambria Math" panose="02040503050406030204" pitchFamily="18" charset="0"/>
+                            </a:rPr>
+                            <m:t>𝑔</m:t>
+                          </m:r>
+                          <m:r>
+                            <a:rPr lang="en-US" i="1">
+                              <a:latin typeface="Cambria Math" panose="02040503050406030204" pitchFamily="18" charset="0"/>
+                            </a:rPr>
+                            <m:t>(</m:t>
+                          </m:r>
+                          <m:r>
+                            <a:rPr lang="en-US" b="0" i="1" smtClean="0">
+                              <a:latin typeface="Cambria Math" panose="02040503050406030204" pitchFamily="18" charset="0"/>
+                            </a:rPr>
+                            <m:t>𝑡</m:t>
+                          </m:r>
+                          <m:r>
+                            <a:rPr lang="en-US" b="0" i="1" smtClean="0">
+                              <a:latin typeface="Cambria Math" panose="02040503050406030204" pitchFamily="18" charset="0"/>
+                            </a:rPr>
+                            <m:t>′)</m:t>
+                          </m:r>
+                          <m:r>
+                            <a:rPr lang="en-US" i="1">
+                              <a:latin typeface="Cambria Math" panose="02040503050406030204" pitchFamily="18" charset="0"/>
+                            </a:rPr>
+                            <m:t>𝑑</m:t>
+                          </m:r>
+                          <m:r>
+                            <a:rPr lang="en-US" b="0" i="1" smtClean="0">
+                              <a:latin typeface="Cambria Math" panose="02040503050406030204" pitchFamily="18" charset="0"/>
+                            </a:rPr>
+                            <m:t>𝑡</m:t>
+                          </m:r>
+                          <m:r>
+                            <a:rPr lang="en-US" b="0" i="1" smtClean="0">
+                              <a:latin typeface="Cambria Math" panose="02040503050406030204" pitchFamily="18" charset="0"/>
+                            </a:rPr>
+                            <m:t>′</m:t>
+                          </m:r>
+                        </m:e>
+                      </m:nary>
+                      <m:r>
+                        <a:rPr lang="en-US" b="0" i="1" smtClean="0">
+                          <a:latin typeface="Cambria Math" panose="02040503050406030204" pitchFamily="18" charset="0"/>
+                        </a:rPr>
+                        <m:t>≈</m:t>
+                      </m:r>
+                      <m:r>
+                        <a:rPr lang="en-US" b="0" i="1" smtClean="0">
+                          <a:latin typeface="Cambria Math" panose="02040503050406030204" pitchFamily="18" charset="0"/>
+                        </a:rPr>
+                        <m:t>𝑥</m:t>
+                      </m:r>
+                      <m:d>
+                        <m:dPr>
+                          <m:ctrlPr>
+                            <a:rPr lang="en-US" b="0" i="1" smtClean="0">
+                              <a:latin typeface="Cambria Math" panose="02040503050406030204" pitchFamily="18" charset="0"/>
+                            </a:rPr>
+                          </m:ctrlPr>
+                        </m:dPr>
+                        <m:e>
+                          <m:r>
+                            <a:rPr lang="en-US" b="0" i="1" smtClean="0">
+                              <a:latin typeface="Cambria Math" panose="02040503050406030204" pitchFamily="18" charset="0"/>
+                            </a:rPr>
+                            <m:t>𝑡</m:t>
+                          </m:r>
+                        </m:e>
+                      </m:d>
+                      <m:r>
+                        <a:rPr lang="en-US" b="0" i="1" smtClean="0">
+                          <a:latin typeface="Cambria Math" panose="02040503050406030204" pitchFamily="18" charset="0"/>
+                        </a:rPr>
+                        <m:t>+</m:t>
+                      </m:r>
+                      <m:r>
+                        <a:rPr lang="en-US" b="0" i="1" smtClean="0">
+                          <a:latin typeface="Cambria Math" panose="02040503050406030204" pitchFamily="18" charset="0"/>
+                        </a:rPr>
+                        <m:t>𝑔</m:t>
+                      </m:r>
+                      <m:d>
+                        <m:dPr>
+                          <m:ctrlPr>
+                            <a:rPr lang="en-US" b="0" i="1" smtClean="0">
+                              <a:latin typeface="Cambria Math" panose="02040503050406030204" pitchFamily="18" charset="0"/>
+                            </a:rPr>
+                          </m:ctrlPr>
+                        </m:dPr>
+                        <m:e>
+                          <m:r>
+                            <a:rPr lang="en-US" b="0" i="1" smtClean="0">
+                              <a:latin typeface="Cambria Math" panose="02040503050406030204" pitchFamily="18" charset="0"/>
+                            </a:rPr>
+                            <m:t>𝑡</m:t>
+                          </m:r>
+                          <m:r>
+                            <a:rPr lang="en-US" b="0" i="1" smtClean="0">
+                              <a:latin typeface="Cambria Math" panose="02040503050406030204" pitchFamily="18" charset="0"/>
+                            </a:rPr>
+                            <m:t>+</m:t>
+                          </m:r>
+                          <m:f>
+                            <m:fPr>
+                              <m:ctrlPr>
+                                <a:rPr lang="en-US" b="0" i="1" smtClean="0">
+                                  <a:latin typeface="Cambria Math" panose="02040503050406030204" pitchFamily="18" charset="0"/>
+                                </a:rPr>
+                              </m:ctrlPr>
+                            </m:fPr>
+                            <m:num>
+                              <m:r>
+                                <a:rPr lang="en-US" i="1">
+                                  <a:latin typeface="Cambria Math" panose="02040503050406030204" pitchFamily="18" charset="0"/>
+                                </a:rPr>
+                                <m:t>𝑑</m:t>
+                              </m:r>
+                              <m:r>
+                                <a:rPr lang="en-US" b="0" i="1" smtClean="0">
+                                  <a:latin typeface="Cambria Math" panose="02040503050406030204" pitchFamily="18" charset="0"/>
+                                </a:rPr>
+                                <m:t>𝑡</m:t>
+                              </m:r>
+                            </m:num>
+                            <m:den>
+                              <m:r>
+                                <a:rPr lang="en-US" b="0" i="1" smtClean="0">
+                                  <a:latin typeface="Cambria Math" panose="02040503050406030204" pitchFamily="18" charset="0"/>
+                                </a:rPr>
+                                <m:t>2</m:t>
+                              </m:r>
+                            </m:den>
+                          </m:f>
+                          <m:r>
+                            <a:rPr lang="en-US" b="0" i="1" smtClean="0">
+                              <a:latin typeface="Cambria Math" panose="02040503050406030204" pitchFamily="18" charset="0"/>
+                            </a:rPr>
+                            <m:t>;</m:t>
+                          </m:r>
+                          <m:r>
+                            <a:rPr lang="en-US" b="0" i="1" smtClean="0">
+                              <a:latin typeface="Cambria Math" panose="02040503050406030204" pitchFamily="18" charset="0"/>
+                            </a:rPr>
+                            <m:t>𝑥</m:t>
+                          </m:r>
+                          <m:r>
+                            <a:rPr lang="en-US" b="0" i="1" smtClean="0">
+                              <a:latin typeface="Cambria Math" panose="02040503050406030204" pitchFamily="18" charset="0"/>
+                            </a:rPr>
+                            <m:t>(</m:t>
+                          </m:r>
+                          <m:r>
+                            <a:rPr lang="en-US" b="0" i="1" smtClean="0">
+                              <a:latin typeface="Cambria Math" panose="02040503050406030204" pitchFamily="18" charset="0"/>
+                            </a:rPr>
+                            <m:t>𝑡</m:t>
+                          </m:r>
+                          <m:r>
+                            <a:rPr lang="en-US" b="0" i="1" smtClean="0">
+                              <a:latin typeface="Cambria Math" panose="02040503050406030204" pitchFamily="18" charset="0"/>
+                            </a:rPr>
+                            <m:t>)</m:t>
+                          </m:r>
+                        </m:e>
+                      </m:d>
+                      <m:r>
+                        <a:rPr lang="en-US" b="0" i="1" smtClean="0">
+                          <a:latin typeface="Cambria Math" panose="02040503050406030204" pitchFamily="18" charset="0"/>
+                        </a:rPr>
+                        <m:t>𝑑</m:t>
+                      </m:r>
+                      <m:r>
+                        <a:rPr lang="en-US" b="0" i="1" smtClean="0">
+                          <a:latin typeface="Cambria Math" panose="02040503050406030204" pitchFamily="18" charset="0"/>
+                        </a:rPr>
+                        <m:t>𝑡</m:t>
+                      </m:r>
+                    </m:oMath>
+                  </m:oMathPara>
+                </a14:m>
+                <a:endParaRPr lang="en-US" dirty="0"/>
+              </a:p>
+            </p:txBody>
+          </p:sp>
+        </mc:Choice>
+        <mc:Fallback>
+          <p:sp>
+            <p:nvSpPr>
+              <p:cNvPr id="2" name="TextBox 1">
+                <a:extLst>
+                  <a:ext uri="{FF2B5EF4-FFF2-40B4-BE49-F238E27FC236}">
+                    <a16:creationId xmlns:a16="http://schemas.microsoft.com/office/drawing/2014/main" id="{DCEB59F9-920B-BBF0-2F98-E8024243D131}"/>
+                  </a:ext>
+                </a:extLst>
+              </p:cNvPr>
+              <p:cNvSpPr txBox="1">
+                <a:spLocks noRot="1" noChangeAspect="1" noMove="1" noResize="1" noEditPoints="1" noAdjustHandles="1" noChangeArrowheads="1" noChangeShapeType="1" noTextEdit="1"/>
+              </p:cNvSpPr>
+              <p:nvPr/>
+            </p:nvSpPr>
+            <p:spPr>
+              <a:xfrm>
+                <a:off x="4916131" y="5736361"/>
+                <a:ext cx="6405793" cy="729110"/>
+              </a:xfrm>
+              <a:prstGeom prst="rect">
+                <a:avLst/>
+              </a:prstGeom>
+              <a:blipFill>
+                <a:blip r:embed="rId7"/>
+                <a:stretch>
+                  <a:fillRect/>
+                </a:stretch>
+              </a:blipFill>
+            </p:spPr>
+            <p:txBody>
+              <a:bodyPr/>
+              <a:lstStyle/>
+              <a:p>
+                <a:r>
+                  <a:rPr lang="en-US">
+                    <a:noFill/>
+                  </a:rPr>
+                  <a:t> </a:t>
+                </a:r>
+              </a:p>
+            </p:txBody>
+          </p:sp>
+        </mc:Fallback>
+      </mc:AlternateContent>
+      <mc:AlternateContent xmlns:mc="http://schemas.openxmlformats.org/markup-compatibility/2006">
+        <mc:Choice xmlns:a14="http://schemas.microsoft.com/office/drawing/2010/main" Requires="a14">
+          <p:sp>
+            <p:nvSpPr>
+              <p:cNvPr id="3" name="TextBox 2">
+                <a:extLst>
+                  <a:ext uri="{FF2B5EF4-FFF2-40B4-BE49-F238E27FC236}">
+                    <a16:creationId xmlns:a16="http://schemas.microsoft.com/office/drawing/2014/main" id="{54A37784-CCE5-D506-A281-AB4D366F9435}"/>
+                  </a:ext>
+                </a:extLst>
+              </p:cNvPr>
+              <p:cNvSpPr txBox="1"/>
+              <p:nvPr/>
+            </p:nvSpPr>
+            <p:spPr>
+              <a:xfrm>
+                <a:off x="1356853" y="5746181"/>
+                <a:ext cx="1453796" cy="618246"/>
+              </a:xfrm>
+              <a:prstGeom prst="rect">
+                <a:avLst/>
+              </a:prstGeom>
+              <a:noFill/>
+            </p:spPr>
+            <p:txBody>
+              <a:bodyPr wrap="none" rtlCol="0">
+                <a:spAutoFit/>
+              </a:bodyPr>
+              <a:lstStyle/>
+              <a:p>
+                <a:pPr/>
+                <a14:m>
+                  <m:oMathPara xmlns:m="http://schemas.openxmlformats.org/officeDocument/2006/math">
+                    <m:oMathParaPr>
+                      <m:jc m:val="centerGroup"/>
+                    </m:oMathParaPr>
+                    <m:oMath xmlns:m="http://schemas.openxmlformats.org/officeDocument/2006/math">
+                      <m:f>
+                        <m:fPr>
+                          <m:ctrlPr>
+                            <a:rPr lang="en-US" b="0" i="1" smtClean="0">
+                              <a:latin typeface="Cambria Math" panose="02040503050406030204" pitchFamily="18" charset="0"/>
+                            </a:rPr>
+                          </m:ctrlPr>
+                        </m:fPr>
+                        <m:num>
+                          <m:r>
+                            <a:rPr lang="en-US" b="0" i="1" smtClean="0">
+                              <a:latin typeface="Cambria Math" panose="02040503050406030204" pitchFamily="18" charset="0"/>
+                            </a:rPr>
+                            <m:t>𝑑</m:t>
+                          </m:r>
+                          <m:r>
+                            <a:rPr lang="en-US" b="0" i="1" smtClean="0">
+                              <a:latin typeface="Cambria Math" panose="02040503050406030204" pitchFamily="18" charset="0"/>
+                            </a:rPr>
+                            <m:t>𝑥</m:t>
+                          </m:r>
+                        </m:num>
+                        <m:den>
+                          <m:r>
+                            <a:rPr lang="en-US" b="0" i="1" smtClean="0">
+                              <a:latin typeface="Cambria Math" panose="02040503050406030204" pitchFamily="18" charset="0"/>
+                            </a:rPr>
+                            <m:t>𝑑</m:t>
+                          </m:r>
+                          <m:r>
+                            <a:rPr lang="en-US" b="0" i="1" smtClean="0">
+                              <a:latin typeface="Cambria Math" panose="02040503050406030204" pitchFamily="18" charset="0"/>
+                            </a:rPr>
+                            <m:t>𝑡</m:t>
+                          </m:r>
+                        </m:den>
+                      </m:f>
+                      <m:r>
+                        <a:rPr lang="en-US" b="0" i="1" smtClean="0">
+                          <a:latin typeface="Cambria Math" panose="02040503050406030204" pitchFamily="18" charset="0"/>
+                        </a:rPr>
+                        <m:t>=</m:t>
+                      </m:r>
+                      <m:r>
+                        <a:rPr lang="en-US" b="0" i="1" smtClean="0">
+                          <a:latin typeface="Cambria Math" panose="02040503050406030204" pitchFamily="18" charset="0"/>
+                        </a:rPr>
+                        <m:t>𝑔</m:t>
+                      </m:r>
+                      <m:r>
+                        <a:rPr lang="en-US" b="0" i="1" smtClean="0">
+                          <a:latin typeface="Cambria Math" panose="02040503050406030204" pitchFamily="18" charset="0"/>
+                        </a:rPr>
+                        <m:t>(</m:t>
+                      </m:r>
+                      <m:r>
+                        <a:rPr lang="en-US" b="0" i="1" smtClean="0">
+                          <a:latin typeface="Cambria Math" panose="02040503050406030204" pitchFamily="18" charset="0"/>
+                        </a:rPr>
+                        <m:t>𝑡</m:t>
+                      </m:r>
+                      <m:r>
+                        <a:rPr lang="en-US" b="0" i="1" smtClean="0">
+                          <a:latin typeface="Cambria Math" panose="02040503050406030204" pitchFamily="18" charset="0"/>
+                        </a:rPr>
+                        <m:t>,</m:t>
+                      </m:r>
+                      <m:r>
+                        <a:rPr lang="en-US" b="0" i="1" smtClean="0">
+                          <a:latin typeface="Cambria Math" panose="02040503050406030204" pitchFamily="18" charset="0"/>
+                        </a:rPr>
+                        <m:t>𝑥</m:t>
+                      </m:r>
+                      <m:r>
+                        <a:rPr lang="en-US" b="0" i="1" smtClean="0">
+                          <a:latin typeface="Cambria Math" panose="02040503050406030204" pitchFamily="18" charset="0"/>
+                        </a:rPr>
+                        <m:t>)</m:t>
+                      </m:r>
+                    </m:oMath>
+                  </m:oMathPara>
+                </a14:m>
+                <a:endParaRPr lang="en-US" dirty="0"/>
+              </a:p>
+            </p:txBody>
+          </p:sp>
+        </mc:Choice>
+        <mc:Fallback>
+          <p:sp>
+            <p:nvSpPr>
+              <p:cNvPr id="3" name="TextBox 2">
+                <a:extLst>
+                  <a:ext uri="{FF2B5EF4-FFF2-40B4-BE49-F238E27FC236}">
+                    <a16:creationId xmlns:a16="http://schemas.microsoft.com/office/drawing/2014/main" id="{54A37784-CCE5-D506-A281-AB4D366F9435}"/>
+                  </a:ext>
+                </a:extLst>
+              </p:cNvPr>
+              <p:cNvSpPr txBox="1">
+                <a:spLocks noRot="1" noChangeAspect="1" noMove="1" noResize="1" noEditPoints="1" noAdjustHandles="1" noChangeArrowheads="1" noChangeShapeType="1" noTextEdit="1"/>
+              </p:cNvSpPr>
+              <p:nvPr/>
+            </p:nvSpPr>
+            <p:spPr>
+              <a:xfrm>
+                <a:off x="1356853" y="5746181"/>
+                <a:ext cx="1453796" cy="618246"/>
+              </a:xfrm>
+              <a:prstGeom prst="rect">
+                <a:avLst/>
+              </a:prstGeom>
+              <a:blipFill>
+                <a:blip r:embed="rId8"/>
                 <a:stretch>
                   <a:fillRect/>
                 </a:stretch>
@@ -8500,8 +9057,8 @@
           </a:p>
         </p:txBody>
       </p:sp>
-      <mc:AlternateContent xmlns:mc="http://schemas.openxmlformats.org/markup-compatibility/2006">
-        <mc:Choice xmlns:a14="http://schemas.microsoft.com/office/drawing/2010/main" Requires="a14">
+      <mc:AlternateContent xmlns:mc="http://schemas.openxmlformats.org/markup-compatibility/2006" xmlns:a14="http://schemas.microsoft.com/office/drawing/2010/main">
+        <mc:Choice Requires="a14">
           <p:sp>
             <p:nvSpPr>
               <p:cNvPr id="7" name="TextBox 6">
@@ -8530,6 +9087,7 @@
               </a:bodyPr>
               <a:lstStyle/>
               <a:p>
+                <a:pPr/>
                 <a14:m>
                   <m:oMathPara xmlns:m="http://schemas.openxmlformats.org/officeDocument/2006/math">
                     <m:oMathParaPr>
@@ -8587,7 +9145,7 @@
             </p:txBody>
           </p:sp>
         </mc:Choice>
-        <mc:Fallback>
+        <mc:Fallback xmlns="">
           <p:sp>
             <p:nvSpPr>
               <p:cNvPr id="7" name="TextBox 6">
@@ -8632,8 +9190,8 @@
           </p:sp>
         </mc:Fallback>
       </mc:AlternateContent>
-      <mc:AlternateContent xmlns:mc="http://schemas.openxmlformats.org/markup-compatibility/2006">
-        <mc:Choice xmlns:a14="http://schemas.microsoft.com/office/drawing/2010/main" Requires="a14">
+      <mc:AlternateContent xmlns:mc="http://schemas.openxmlformats.org/markup-compatibility/2006" xmlns:a14="http://schemas.microsoft.com/office/drawing/2010/main">
+        <mc:Choice Requires="a14">
           <p:sp>
             <p:nvSpPr>
               <p:cNvPr id="8" name="TextBox 7">
@@ -8662,6 +9220,7 @@
               </a:bodyPr>
               <a:lstStyle/>
               <a:p>
+                <a:pPr/>
                 <a14:m>
                   <m:oMathPara xmlns:m="http://schemas.openxmlformats.org/officeDocument/2006/math">
                     <m:oMathParaPr>
@@ -8801,7 +9360,7 @@
             </p:txBody>
           </p:sp>
         </mc:Choice>
-        <mc:Fallback>
+        <mc:Fallback xmlns="">
           <p:sp>
             <p:nvSpPr>
               <p:cNvPr id="8" name="TextBox 7">

</xml_diff>